<commit_message>
Added system architecture to powerpoint
</commit_message>
<xml_diff>
--- a/Documents/PresentationFall/Fall Presentation.pptx
+++ b/Documents/PresentationFall/Fall Presentation.pptx
@@ -14377,7 +14377,7 @@
               </a:spcBef>
             </a:pPr>
             <a:r>
-              <a:rPr lang="en-US" sz="1800" b="0" strike="noStrike" spc="-1">
+              <a:rPr lang="en-US" sz="1800" b="0" strike="noStrike" spc="-1" dirty="0">
                 <a:solidFill>
                   <a:srgbClr val="808080"/>
                 </a:solidFill>
@@ -14390,7 +14390,7 @@
               </a:rPr>
               <a:t>Group 64 </a:t>
             </a:r>
-            <a:endParaRPr lang="en-US" sz="1800" b="0" strike="noStrike" spc="-1">
+            <a:endParaRPr lang="en-US" sz="1800" b="0" strike="noStrike" spc="-1" dirty="0">
               <a:solidFill>
                 <a:srgbClr val="000000"/>
               </a:solidFill>
@@ -14412,7 +14412,7 @@
               </a:spcBef>
             </a:pPr>
             <a:r>
-              <a:rPr lang="en-US" sz="1800" b="0" strike="noStrike" spc="-1">
+              <a:rPr lang="en-US" sz="1800" b="0" strike="noStrike" spc="-1" dirty="0">
                 <a:solidFill>
                   <a:srgbClr val="808080"/>
                 </a:solidFill>
@@ -14425,7 +14425,7 @@
               </a:rPr>
               <a:t>Winter is coming….</a:t>
             </a:r>
-            <a:endParaRPr lang="en-US" sz="1800" b="0" strike="noStrike" spc="-1">
+            <a:endParaRPr lang="en-US" sz="1800" b="0" strike="noStrike" spc="-1" dirty="0">
               <a:solidFill>
                 <a:srgbClr val="000000"/>
               </a:solidFill>
@@ -14447,7 +14447,7 @@
               </a:spcBef>
             </a:pPr>
             <a:r>
-              <a:rPr lang="en-US" sz="1800" b="0" strike="noStrike" spc="-1">
+              <a:rPr lang="en-US" sz="1800" b="0" strike="noStrike" spc="-1" dirty="0">
                 <a:solidFill>
                   <a:srgbClr val="808080"/>
                 </a:solidFill>
@@ -14458,9 +14458,37 @@
                 </a:uFill>
                 <a:latin typeface="Trebuchet MS"/>
               </a:rPr>
-              <a:t>Zach Lerew, Travis Hodgin,</a:t>
-            </a:r>
-            <a:endParaRPr lang="en-US" sz="1800" b="0" strike="noStrike" spc="-1">
+              <a:t>Zach Lerew, Travis </a:t>
+            </a:r>
+            <a:r>
+              <a:rPr lang="en-US" sz="1800" b="0" strike="noStrike" spc="-1" dirty="0" err="1">
+                <a:solidFill>
+                  <a:srgbClr val="808080"/>
+                </a:solidFill>
+                <a:uFill>
+                  <a:solidFill>
+                    <a:srgbClr val="FFFFFF"/>
+                  </a:solidFill>
+                </a:uFill>
+                <a:latin typeface="Trebuchet MS"/>
+              </a:rPr>
+              <a:t>Hodgin</a:t>
+            </a:r>
+            <a:r>
+              <a:rPr lang="en-US" sz="1800" b="0" strike="noStrike" spc="-1" dirty="0">
+                <a:solidFill>
+                  <a:srgbClr val="808080"/>
+                </a:solidFill>
+                <a:uFill>
+                  <a:solidFill>
+                    <a:srgbClr val="FFFFFF"/>
+                  </a:solidFill>
+                </a:uFill>
+                <a:latin typeface="Trebuchet MS"/>
+              </a:rPr>
+              <a:t>,</a:t>
+            </a:r>
+            <a:endParaRPr lang="en-US" sz="1800" b="0" strike="noStrike" spc="-1" dirty="0">
               <a:solidFill>
                 <a:srgbClr val="000000"/>
               </a:solidFill>
@@ -14482,7 +14510,7 @@
               </a:spcBef>
             </a:pPr>
             <a:r>
-              <a:rPr lang="en-US" sz="1800" b="0" strike="noStrike" spc="-1">
+              <a:rPr lang="en-US" sz="1800" b="0" strike="noStrike" spc="-1" dirty="0">
                 <a:solidFill>
                   <a:srgbClr val="808080"/>
                 </a:solidFill>
@@ -14493,9 +14521,37 @@
                 </a:uFill>
                 <a:latin typeface="Trebuchet MS"/>
               </a:rPr>
-              <a:t> Max Schmidt, Austin Hodgin </a:t>
-            </a:r>
-            <a:endParaRPr lang="en-US" sz="1800" b="0" strike="noStrike" spc="-1">
+              <a:t> Max Schmidt, Austin </a:t>
+            </a:r>
+            <a:r>
+              <a:rPr lang="en-US" sz="1800" b="0" strike="noStrike" spc="-1" dirty="0" err="1">
+                <a:solidFill>
+                  <a:srgbClr val="808080"/>
+                </a:solidFill>
+                <a:uFill>
+                  <a:solidFill>
+                    <a:srgbClr val="FFFFFF"/>
+                  </a:solidFill>
+                </a:uFill>
+                <a:latin typeface="Trebuchet MS"/>
+              </a:rPr>
+              <a:t>Hodgin</a:t>
+            </a:r>
+            <a:r>
+              <a:rPr lang="en-US" sz="1800" b="0" strike="noStrike" spc="-1" dirty="0">
+                <a:solidFill>
+                  <a:srgbClr val="808080"/>
+                </a:solidFill>
+                <a:uFill>
+                  <a:solidFill>
+                    <a:srgbClr val="FFFFFF"/>
+                  </a:solidFill>
+                </a:uFill>
+                <a:latin typeface="Trebuchet MS"/>
+              </a:rPr>
+              <a:t> </a:t>
+            </a:r>
+            <a:endParaRPr lang="en-US" sz="1800" b="0" strike="noStrike" spc="-1" dirty="0">
               <a:solidFill>
                 <a:srgbClr val="000000"/>
               </a:solidFill>

</xml_diff>

<commit_message>
added stuff to intro about problems
</commit_message>
<xml_diff>
--- a/Documents/PresentationFall/Fall Presentation.pptx
+++ b/Documents/PresentationFall/Fall Presentation.pptx
@@ -118,6 +118,11 @@
       </a:defRPr>
     </a:lvl9pPr>
   </p:defaultTextStyle>
+  <p:extLst>
+    <p:ext uri="{EFAFB233-063F-42B5-8137-9DF3F51BA10A}">
+      <p15:sldGuideLst xmlns:p15="http://schemas.microsoft.com/office/powerpoint/2012/main"/>
+    </p:ext>
+  </p:extLst>
 </p:presentation>
 </file>
 
@@ -16063,7 +16068,7 @@
         <p:spPr>
           <a:xfrm>
             <a:off x="677160" y="1463040"/>
-            <a:ext cx="8596080" cy="2874240"/>
+            <a:ext cx="8596080" cy="4785480"/>
           </a:xfrm>
           <a:prstGeom prst="rect">
             <a:avLst/>
@@ -16078,7 +16083,7 @@
           <a:lstStyle/>
           <a:p>
             <a:r>
-              <a:rPr lang="en-US" sz="1800" b="0" strike="noStrike" spc="-1">
+              <a:rPr lang="en-US" sz="1800" b="0" strike="noStrike" spc="-1" dirty="0">
                 <a:solidFill>
                   <a:srgbClr val="000000"/>
                 </a:solidFill>
@@ -16094,7 +16099,35 @@
           </a:p>
           <a:p>
             <a:r>
-              <a:rPr lang="en-US" sz="1800" b="0" strike="noStrike" spc="-1">
+              <a:rPr lang="en-US" spc="-1" dirty="0">
+                <a:solidFill>
+                  <a:srgbClr val="000000"/>
+                </a:solidFill>
+                <a:uFill>
+                  <a:solidFill>
+                    <a:srgbClr val="FFFFFF"/>
+                  </a:solidFill>
+                </a:uFill>
+                <a:latin typeface="Arial"/>
+              </a:rPr>
+              <a:t>	Conditions Outside</a:t>
+            </a:r>
+            <a:endParaRPr lang="en-US" sz="1800" b="0" strike="noStrike" spc="-1" dirty="0">
+              <a:solidFill>
+                <a:srgbClr val="000000"/>
+              </a:solidFill>
+              <a:uFill>
+                <a:solidFill>
+                  <a:srgbClr val="FFFFFF"/>
+                </a:solidFill>
+              </a:uFill>
+              <a:latin typeface="Arial"/>
+            </a:endParaRPr>
+          </a:p>
+          <a:p>
+            <a:pPr lvl="2"/>
+            <a:r>
+              <a:rPr lang="en-US" b="0" strike="noStrike" spc="-1" dirty="0">
                 <a:solidFill>
                   <a:srgbClr val="000000"/>
                 </a:solidFill>
@@ -16109,8 +16142,9 @@
             </a:r>
           </a:p>
           <a:p>
-            <a:r>
-              <a:rPr lang="en-US" sz="1800" b="0" strike="noStrike" spc="-1">
+            <a:pPr lvl="2"/>
+            <a:r>
+              <a:rPr lang="en-US" b="0" strike="noStrike" spc="-1" dirty="0">
                 <a:solidFill>
                   <a:srgbClr val="000000"/>
                 </a:solidFill>
@@ -16125,7 +16159,8 @@
             </a:r>
           </a:p>
           <a:p>
-            <a:endParaRPr lang="en-US" sz="1800" b="0" strike="noStrike" spc="-1">
+            <a:pPr lvl="2"/>
+            <a:endParaRPr lang="en-US" b="0" strike="noStrike" spc="-1" dirty="0">
               <a:solidFill>
                 <a:srgbClr val="000000"/>
               </a:solidFill>
@@ -16138,8 +16173,130 @@
             </a:endParaRPr>
           </a:p>
           <a:p>
-            <a:r>
-              <a:rPr lang="en-US" sz="1800" b="0" strike="noStrike" spc="-1">
+            <a:pPr lvl="2"/>
+            <a:r>
+              <a:rPr lang="en-US" spc="-1" dirty="0">
+                <a:solidFill>
+                  <a:srgbClr val="000000"/>
+                </a:solidFill>
+                <a:uFill>
+                  <a:solidFill>
+                    <a:srgbClr val="FFFFFF"/>
+                  </a:solidFill>
+                </a:uFill>
+                <a:latin typeface="Arial"/>
+              </a:rPr>
+              <a:t>Growing Indoors</a:t>
+            </a:r>
+          </a:p>
+          <a:p>
+            <a:pPr lvl="2"/>
+            <a:r>
+              <a:rPr lang="en-US" b="0" strike="noStrike" spc="-1" dirty="0">
+                <a:solidFill>
+                  <a:srgbClr val="000000"/>
+                </a:solidFill>
+                <a:uFill>
+                  <a:solidFill>
+                    <a:srgbClr val="FFFFFF"/>
+                  </a:solidFill>
+                </a:uFill>
+                <a:latin typeface="Arial"/>
+              </a:rPr>
+              <a:t>	Human Schedules</a:t>
+            </a:r>
+          </a:p>
+          <a:p>
+            <a:pPr lvl="2"/>
+            <a:r>
+              <a:rPr lang="en-US" spc="-1" dirty="0">
+                <a:solidFill>
+                  <a:srgbClr val="000000"/>
+                </a:solidFill>
+                <a:uFill>
+                  <a:solidFill>
+                    <a:srgbClr val="FFFFFF"/>
+                  </a:solidFill>
+                </a:uFill>
+                <a:latin typeface="Arial"/>
+              </a:rPr>
+              <a:t>	Current Systems</a:t>
+            </a:r>
+          </a:p>
+          <a:p>
+            <a:pPr lvl="2"/>
+            <a:r>
+              <a:rPr lang="en-US" b="0" strike="noStrike" spc="-1" dirty="0">
+                <a:solidFill>
+                  <a:srgbClr val="000000"/>
+                </a:solidFill>
+                <a:uFill>
+                  <a:solidFill>
+                    <a:srgbClr val="FFFFFF"/>
+                  </a:solidFill>
+                </a:uFill>
+                <a:latin typeface="Arial"/>
+              </a:rPr>
+              <a:t>		Customization</a:t>
+            </a:r>
+          </a:p>
+          <a:p>
+            <a:pPr lvl="2"/>
+            <a:r>
+              <a:rPr lang="en-US" spc="-1" dirty="0">
+                <a:solidFill>
+                  <a:srgbClr val="000000"/>
+                </a:solidFill>
+                <a:uFill>
+                  <a:solidFill>
+                    <a:srgbClr val="FFFFFF"/>
+                  </a:solidFill>
+                </a:uFill>
+                <a:latin typeface="Arial"/>
+              </a:rPr>
+              <a:t>		Price</a:t>
+            </a:r>
+            <a:endParaRPr lang="en-US" b="0" strike="noStrike" spc="-1" dirty="0">
+              <a:solidFill>
+                <a:srgbClr val="000000"/>
+              </a:solidFill>
+              <a:uFill>
+                <a:solidFill>
+                  <a:srgbClr val="FFFFFF"/>
+                </a:solidFill>
+              </a:uFill>
+              <a:latin typeface="Arial"/>
+            </a:endParaRPr>
+          </a:p>
+          <a:p>
+            <a:endParaRPr lang="en-US" sz="1800" b="0" strike="noStrike" spc="-1" dirty="0">
+              <a:solidFill>
+                <a:srgbClr val="000000"/>
+              </a:solidFill>
+              <a:uFill>
+                <a:solidFill>
+                  <a:srgbClr val="FFFFFF"/>
+                </a:solidFill>
+              </a:uFill>
+              <a:latin typeface="Arial"/>
+            </a:endParaRPr>
+          </a:p>
+          <a:p>
+            <a:endParaRPr lang="en-US" sz="1800" b="0" strike="noStrike" spc="-1" dirty="0">
+              <a:solidFill>
+                <a:srgbClr val="000000"/>
+              </a:solidFill>
+              <a:uFill>
+                <a:solidFill>
+                  <a:srgbClr val="FFFFFF"/>
+                </a:solidFill>
+              </a:uFill>
+              <a:latin typeface="Arial"/>
+            </a:endParaRPr>
+          </a:p>
+          <a:p>
+            <a:r>
+              <a:rPr lang="en-US" sz="1800" b="0" strike="noStrike" spc="-1" dirty="0">
                 <a:solidFill>
                   <a:srgbClr val="000000"/>
                 </a:solidFill>
@@ -16155,7 +16312,7 @@
           </a:p>
           <a:p>
             <a:r>
-              <a:rPr lang="en-US" sz="1800" b="0" strike="noStrike" spc="-1">
+              <a:rPr lang="en-US" sz="1800" b="0" strike="noStrike" spc="-1" dirty="0">
                 <a:solidFill>
                   <a:srgbClr val="000000"/>
                 </a:solidFill>
@@ -16171,7 +16328,7 @@
           </a:p>
           <a:p>
             <a:r>
-              <a:rPr lang="en-US" sz="1800" b="0" strike="noStrike" spc="-1">
+              <a:rPr lang="en-US" sz="1800" b="0" strike="noStrike" spc="-1" dirty="0">
                 <a:solidFill>
                   <a:srgbClr val="000000"/>
                 </a:solidFill>
@@ -16187,7 +16344,7 @@
           </a:p>
           <a:p>
             <a:r>
-              <a:rPr lang="en-US" sz="1800" b="0" strike="noStrike" spc="-1">
+              <a:rPr lang="en-US" sz="1800" b="0" strike="noStrike" spc="-1" dirty="0">
                 <a:solidFill>
                   <a:srgbClr val="000000"/>
                 </a:solidFill>
@@ -16203,7 +16360,7 @@
           </a:p>
           <a:p>
             <a:r>
-              <a:rPr lang="en-US" sz="1800" b="0" strike="noStrike" spc="-1">
+              <a:rPr lang="en-US" sz="1800" b="0" strike="noStrike" spc="-1" dirty="0">
                 <a:solidFill>
                   <a:srgbClr val="000000"/>
                 </a:solidFill>
@@ -16218,7 +16375,7 @@
             </a:r>
           </a:p>
           <a:p>
-            <a:endParaRPr lang="en-US" sz="1800" b="0" strike="noStrike" spc="-1">
+            <a:endParaRPr lang="en-US" sz="1800" b="0" strike="noStrike" spc="-1" dirty="0">
               <a:solidFill>
                 <a:srgbClr val="000000"/>
               </a:solidFill>
@@ -16231,7 +16388,7 @@
             </a:endParaRPr>
           </a:p>
           <a:p>
-            <a:endParaRPr lang="en-US" sz="1800" b="0" strike="noStrike" spc="-1">
+            <a:endParaRPr lang="en-US" sz="1800" b="0" strike="noStrike" spc="-1" dirty="0">
               <a:solidFill>
                 <a:srgbClr val="000000"/>
               </a:solidFill>

</xml_diff>

<commit_message>
Added more hardware slides.
</commit_message>
<xml_diff>
--- a/Documents/PresentationFall/Fall Presentation.pptx
+++ b/Documents/PresentationFall/Fall Presentation.pptx
@@ -6,7 +6,7 @@
     <p:sldMasterId id="2147483708" r:id="rId2"/>
   </p:sldMasterIdLst>
   <p:notesMasterIdLst>
-    <p:notesMasterId r:id="rId15"/>
+    <p:notesMasterId r:id="rId18"/>
   </p:notesMasterIdLst>
   <p:sldIdLst>
     <p:sldId id="256" r:id="rId3"/>
@@ -19,8 +19,11 @@
     <p:sldId id="262" r:id="rId10"/>
     <p:sldId id="266" r:id="rId11"/>
     <p:sldId id="265" r:id="rId12"/>
-    <p:sldId id="264" r:id="rId13"/>
-    <p:sldId id="263" r:id="rId14"/>
+    <p:sldId id="268" r:id="rId13"/>
+    <p:sldId id="269" r:id="rId14"/>
+    <p:sldId id="271" r:id="rId15"/>
+    <p:sldId id="270" r:id="rId16"/>
+    <p:sldId id="263" r:id="rId17"/>
   </p:sldIdLst>
   <p:sldSz cx="12192000" cy="6858000"/>
   <p:notesSz cx="7772400" cy="10058400"/>
@@ -1037,6 +1040,392 @@
         </p:txBody>
       </p:sp>
     </p:spTree>
+    <p:extLst>
+      <p:ext uri="{BB962C8B-B14F-4D97-AF65-F5344CB8AC3E}">
+        <p14:creationId xmlns:p14="http://schemas.microsoft.com/office/powerpoint/2010/main" val="3202538958"/>
+      </p:ext>
+    </p:extLst>
+  </p:cSld>
+  <p:clrMapOvr>
+    <a:masterClrMapping/>
+  </p:clrMapOvr>
+</p:notes>
+</file>
+
+<file path=ppt/notesSlides/notesSlide2.xml><?xml version="1.0" encoding="utf-8"?>
+<p:notes xmlns:a="http://schemas.openxmlformats.org/drawingml/2006/main" xmlns:r="http://schemas.openxmlformats.org/officeDocument/2006/relationships" xmlns:p="http://schemas.openxmlformats.org/presentationml/2006/main">
+  <p:cSld>
+    <p:spTree>
+      <p:nvGrpSpPr>
+        <p:cNvPr id="1" name=""/>
+        <p:cNvGrpSpPr/>
+        <p:nvPr/>
+      </p:nvGrpSpPr>
+      <p:grpSpPr>
+        <a:xfrm>
+          <a:off x="0" y="0"/>
+          <a:ext cx="0" cy="0"/>
+          <a:chOff x="0" y="0"/>
+          <a:chExt cx="0" cy="0"/>
+        </a:xfrm>
+      </p:grpSpPr>
+      <p:sp>
+        <p:nvSpPr>
+          <p:cNvPr id="144" name="PlaceHolder 1"/>
+          <p:cNvSpPr>
+            <a:spLocks noGrp="1"/>
+          </p:cNvSpPr>
+          <p:nvPr>
+            <p:ph type="body"/>
+          </p:nvPr>
+        </p:nvSpPr>
+        <p:spPr>
+          <a:xfrm>
+            <a:off x="777960" y="4840200"/>
+            <a:ext cx="6216120" cy="3960360"/>
+          </a:xfrm>
+          <a:prstGeom prst="rect">
+            <a:avLst/>
+          </a:prstGeom>
+        </p:spPr>
+        <p:txBody>
+          <a:bodyPr/>
+          <a:lstStyle/>
+          <a:p>
+            <a:r>
+              <a:rPr lang="en-US" sz="2000" b="0" strike="noStrike" spc="-1">
+                <a:solidFill>
+                  <a:srgbClr val="000000"/>
+                </a:solidFill>
+                <a:uFill>
+                  <a:solidFill>
+                    <a:srgbClr val="FFFFFF"/>
+                  </a:solidFill>
+                </a:uFill>
+                <a:latin typeface="Arial"/>
+              </a:rPr>
+              <a:t>Travis</a:t>
+            </a:r>
+          </a:p>
+        </p:txBody>
+      </p:sp>
+      <p:sp>
+        <p:nvSpPr>
+          <p:cNvPr id="145" name="TextShape 2"/>
+          <p:cNvSpPr txBox="1"/>
+          <p:nvPr/>
+        </p:nvSpPr>
+        <p:spPr>
+          <a:xfrm>
+            <a:off x="4402080" y="9553680"/>
+            <a:ext cx="3368160" cy="504360"/>
+          </a:xfrm>
+          <a:prstGeom prst="rect">
+            <a:avLst/>
+          </a:prstGeom>
+          <a:noFill/>
+          <a:ln>
+            <a:noFill/>
+          </a:ln>
+        </p:spPr>
+        <p:txBody>
+          <a:bodyPr anchor="b"/>
+          <a:lstStyle/>
+          <a:p>
+            <a:pPr algn="r">
+              <a:lnSpc>
+                <a:spcPct val="100000"/>
+              </a:lnSpc>
+            </a:pPr>
+            <a:fld id="{C2936A41-0F7F-481B-BBE2-6C075A014016}" type="slidenum">
+              <a:rPr lang="en-US" sz="1200" b="0" strike="noStrike" spc="-1">
+                <a:solidFill>
+                  <a:srgbClr val="000000"/>
+                </a:solidFill>
+                <a:uFill>
+                  <a:solidFill>
+                    <a:srgbClr val="FFFFFF"/>
+                  </a:solidFill>
+                </a:uFill>
+                <a:latin typeface="+mn-lt"/>
+                <a:ea typeface="+mn-ea"/>
+              </a:rPr>
+              <a:t>12</a:t>
+            </a:fld>
+            <a:endParaRPr lang="en-US" sz="1200" b="0" strike="noStrike" spc="-1">
+              <a:solidFill>
+                <a:srgbClr val="000000"/>
+              </a:solidFill>
+              <a:uFill>
+                <a:solidFill>
+                  <a:srgbClr val="FFFFFF"/>
+                </a:solidFill>
+              </a:uFill>
+              <a:latin typeface="Times New Roman"/>
+            </a:endParaRPr>
+          </a:p>
+        </p:txBody>
+      </p:sp>
+    </p:spTree>
+    <p:extLst>
+      <p:ext uri="{BB962C8B-B14F-4D97-AF65-F5344CB8AC3E}">
+        <p14:creationId xmlns:p14="http://schemas.microsoft.com/office/powerpoint/2010/main" val="3242587459"/>
+      </p:ext>
+    </p:extLst>
+  </p:cSld>
+  <p:clrMapOvr>
+    <a:masterClrMapping/>
+  </p:clrMapOvr>
+</p:notes>
+</file>
+
+<file path=ppt/notesSlides/notesSlide3.xml><?xml version="1.0" encoding="utf-8"?>
+<p:notes xmlns:a="http://schemas.openxmlformats.org/drawingml/2006/main" xmlns:r="http://schemas.openxmlformats.org/officeDocument/2006/relationships" xmlns:p="http://schemas.openxmlformats.org/presentationml/2006/main">
+  <p:cSld>
+    <p:spTree>
+      <p:nvGrpSpPr>
+        <p:cNvPr id="1" name=""/>
+        <p:cNvGrpSpPr/>
+        <p:nvPr/>
+      </p:nvGrpSpPr>
+      <p:grpSpPr>
+        <a:xfrm>
+          <a:off x="0" y="0"/>
+          <a:ext cx="0" cy="0"/>
+          <a:chOff x="0" y="0"/>
+          <a:chExt cx="0" cy="0"/>
+        </a:xfrm>
+      </p:grpSpPr>
+      <p:sp>
+        <p:nvSpPr>
+          <p:cNvPr id="144" name="PlaceHolder 1"/>
+          <p:cNvSpPr>
+            <a:spLocks noGrp="1"/>
+          </p:cNvSpPr>
+          <p:nvPr>
+            <p:ph type="body"/>
+          </p:nvPr>
+        </p:nvSpPr>
+        <p:spPr>
+          <a:xfrm>
+            <a:off x="777960" y="4840200"/>
+            <a:ext cx="6216120" cy="3960360"/>
+          </a:xfrm>
+          <a:prstGeom prst="rect">
+            <a:avLst/>
+          </a:prstGeom>
+        </p:spPr>
+        <p:txBody>
+          <a:bodyPr/>
+          <a:lstStyle/>
+          <a:p>
+            <a:r>
+              <a:rPr lang="en-US" sz="2000" b="0" strike="noStrike" spc="-1">
+                <a:solidFill>
+                  <a:srgbClr val="000000"/>
+                </a:solidFill>
+                <a:uFill>
+                  <a:solidFill>
+                    <a:srgbClr val="FFFFFF"/>
+                  </a:solidFill>
+                </a:uFill>
+                <a:latin typeface="Arial"/>
+              </a:rPr>
+              <a:t>Travis</a:t>
+            </a:r>
+          </a:p>
+        </p:txBody>
+      </p:sp>
+      <p:sp>
+        <p:nvSpPr>
+          <p:cNvPr id="145" name="TextShape 2"/>
+          <p:cNvSpPr txBox="1"/>
+          <p:nvPr/>
+        </p:nvSpPr>
+        <p:spPr>
+          <a:xfrm>
+            <a:off x="4402080" y="9553680"/>
+            <a:ext cx="3368160" cy="504360"/>
+          </a:xfrm>
+          <a:prstGeom prst="rect">
+            <a:avLst/>
+          </a:prstGeom>
+          <a:noFill/>
+          <a:ln>
+            <a:noFill/>
+          </a:ln>
+        </p:spPr>
+        <p:txBody>
+          <a:bodyPr anchor="b"/>
+          <a:lstStyle/>
+          <a:p>
+            <a:pPr algn="r">
+              <a:lnSpc>
+                <a:spcPct val="100000"/>
+              </a:lnSpc>
+            </a:pPr>
+            <a:fld id="{C2936A41-0F7F-481B-BBE2-6C075A014016}" type="slidenum">
+              <a:rPr lang="en-US" sz="1200" b="0" strike="noStrike" spc="-1">
+                <a:solidFill>
+                  <a:srgbClr val="000000"/>
+                </a:solidFill>
+                <a:uFill>
+                  <a:solidFill>
+                    <a:srgbClr val="FFFFFF"/>
+                  </a:solidFill>
+                </a:uFill>
+                <a:latin typeface="+mn-lt"/>
+                <a:ea typeface="+mn-ea"/>
+              </a:rPr>
+              <a:t>13</a:t>
+            </a:fld>
+            <a:endParaRPr lang="en-US" sz="1200" b="0" strike="noStrike" spc="-1">
+              <a:solidFill>
+                <a:srgbClr val="000000"/>
+              </a:solidFill>
+              <a:uFill>
+                <a:solidFill>
+                  <a:srgbClr val="FFFFFF"/>
+                </a:solidFill>
+              </a:uFill>
+              <a:latin typeface="Times New Roman"/>
+            </a:endParaRPr>
+          </a:p>
+        </p:txBody>
+      </p:sp>
+    </p:spTree>
+    <p:extLst>
+      <p:ext uri="{BB962C8B-B14F-4D97-AF65-F5344CB8AC3E}">
+        <p14:creationId xmlns:p14="http://schemas.microsoft.com/office/powerpoint/2010/main" val="3972439747"/>
+      </p:ext>
+    </p:extLst>
+  </p:cSld>
+  <p:clrMapOvr>
+    <a:masterClrMapping/>
+  </p:clrMapOvr>
+</p:notes>
+</file>
+
+<file path=ppt/notesSlides/notesSlide4.xml><?xml version="1.0" encoding="utf-8"?>
+<p:notes xmlns:a="http://schemas.openxmlformats.org/drawingml/2006/main" xmlns:r="http://schemas.openxmlformats.org/officeDocument/2006/relationships" xmlns:p="http://schemas.openxmlformats.org/presentationml/2006/main">
+  <p:cSld>
+    <p:spTree>
+      <p:nvGrpSpPr>
+        <p:cNvPr id="1" name=""/>
+        <p:cNvGrpSpPr/>
+        <p:nvPr/>
+      </p:nvGrpSpPr>
+      <p:grpSpPr>
+        <a:xfrm>
+          <a:off x="0" y="0"/>
+          <a:ext cx="0" cy="0"/>
+          <a:chOff x="0" y="0"/>
+          <a:chExt cx="0" cy="0"/>
+        </a:xfrm>
+      </p:grpSpPr>
+      <p:sp>
+        <p:nvSpPr>
+          <p:cNvPr id="144" name="PlaceHolder 1"/>
+          <p:cNvSpPr>
+            <a:spLocks noGrp="1"/>
+          </p:cNvSpPr>
+          <p:nvPr>
+            <p:ph type="body"/>
+          </p:nvPr>
+        </p:nvSpPr>
+        <p:spPr>
+          <a:xfrm>
+            <a:off x="777960" y="4840200"/>
+            <a:ext cx="6216120" cy="3960360"/>
+          </a:xfrm>
+          <a:prstGeom prst="rect">
+            <a:avLst/>
+          </a:prstGeom>
+        </p:spPr>
+        <p:txBody>
+          <a:bodyPr/>
+          <a:lstStyle/>
+          <a:p>
+            <a:r>
+              <a:rPr lang="en-US" sz="2000" b="0" strike="noStrike" spc="-1">
+                <a:solidFill>
+                  <a:srgbClr val="000000"/>
+                </a:solidFill>
+                <a:uFill>
+                  <a:solidFill>
+                    <a:srgbClr val="FFFFFF"/>
+                  </a:solidFill>
+                </a:uFill>
+                <a:latin typeface="Arial"/>
+              </a:rPr>
+              <a:t>Travis</a:t>
+            </a:r>
+          </a:p>
+        </p:txBody>
+      </p:sp>
+      <p:sp>
+        <p:nvSpPr>
+          <p:cNvPr id="145" name="TextShape 2"/>
+          <p:cNvSpPr txBox="1"/>
+          <p:nvPr/>
+        </p:nvSpPr>
+        <p:spPr>
+          <a:xfrm>
+            <a:off x="4402080" y="9553680"/>
+            <a:ext cx="3368160" cy="504360"/>
+          </a:xfrm>
+          <a:prstGeom prst="rect">
+            <a:avLst/>
+          </a:prstGeom>
+          <a:noFill/>
+          <a:ln>
+            <a:noFill/>
+          </a:ln>
+        </p:spPr>
+        <p:txBody>
+          <a:bodyPr anchor="b"/>
+          <a:lstStyle/>
+          <a:p>
+            <a:pPr algn="r">
+              <a:lnSpc>
+                <a:spcPct val="100000"/>
+              </a:lnSpc>
+            </a:pPr>
+            <a:fld id="{C2936A41-0F7F-481B-BBE2-6C075A014016}" type="slidenum">
+              <a:rPr lang="en-US" sz="1200" b="0" strike="noStrike" spc="-1">
+                <a:solidFill>
+                  <a:srgbClr val="000000"/>
+                </a:solidFill>
+                <a:uFill>
+                  <a:solidFill>
+                    <a:srgbClr val="FFFFFF"/>
+                  </a:solidFill>
+                </a:uFill>
+                <a:latin typeface="+mn-lt"/>
+                <a:ea typeface="+mn-ea"/>
+              </a:rPr>
+              <a:t>14</a:t>
+            </a:fld>
+            <a:endParaRPr lang="en-US" sz="1200" b="0" strike="noStrike" spc="-1">
+              <a:solidFill>
+                <a:srgbClr val="000000"/>
+              </a:solidFill>
+              <a:uFill>
+                <a:solidFill>
+                  <a:srgbClr val="FFFFFF"/>
+                </a:solidFill>
+              </a:uFill>
+              <a:latin typeface="Times New Roman"/>
+            </a:endParaRPr>
+          </a:p>
+        </p:txBody>
+      </p:sp>
+    </p:spTree>
+    <p:extLst>
+      <p:ext uri="{BB962C8B-B14F-4D97-AF65-F5344CB8AC3E}">
+        <p14:creationId xmlns:p14="http://schemas.microsoft.com/office/powerpoint/2010/main" val="709113167"/>
+      </p:ext>
+    </p:extLst>
   </p:cSld>
   <p:clrMapOvr>
     <a:masterClrMapping/>
@@ -14879,21 +15268,7 @@
                 <a:spcPct val="100000"/>
               </a:lnSpc>
             </a:pPr>
-            <a:r>
-              <a:rPr lang="en-US" sz="3600" b="0" strike="noStrike" spc="-1">
-                <a:solidFill>
-                  <a:srgbClr val="90C226"/>
-                </a:solidFill>
-                <a:uFill>
-                  <a:solidFill>
-                    <a:srgbClr val="FFFFFF"/>
-                  </a:solidFill>
-                </a:uFill>
-                <a:latin typeface="Trebuchet MS"/>
-              </a:rPr>
-              <a:t>Hardware</a:t>
-            </a:r>
-            <a:endParaRPr lang="en-US" sz="3600" b="0" strike="noStrike" spc="-1">
+            <a:endParaRPr lang="en-US" sz="3600" b="0" strike="noStrike" spc="-1" dirty="0">
               <a:solidFill>
                 <a:srgbClr val="000000"/>
               </a:solidFill>
@@ -14947,8 +15322,8 @@
         </p:nvSpPr>
         <p:spPr>
           <a:xfrm>
-            <a:off x="677160" y="1488960"/>
-            <a:ext cx="8596080" cy="3880080"/>
+            <a:off x="677160" y="1649215"/>
+            <a:ext cx="8596080" cy="2762529"/>
           </a:xfrm>
           <a:prstGeom prst="rect">
             <a:avLst/>
@@ -14989,7 +15364,7 @@
               <a:buChar char=""/>
             </a:pPr>
             <a:r>
-              <a:rPr lang="en-US" sz="1400" b="0" strike="noStrike" spc="-1">
+              <a:rPr lang="en-US" sz="1400" b="0" strike="noStrike" spc="-1" dirty="0">
                 <a:solidFill>
                   <a:srgbClr val="404040"/>
                 </a:solidFill>
@@ -15000,9 +15375,37 @@
                 </a:uFill>
                 <a:latin typeface="Trebuchet MS"/>
               </a:rPr>
-              <a:t>WS2812 NeoPixel LEDs</a:t>
-            </a:r>
-            <a:endParaRPr lang="en-US" sz="1400" b="0" strike="noStrike" spc="-1">
+              <a:t>WS2812 </a:t>
+            </a:r>
+            <a:r>
+              <a:rPr lang="en-US" sz="1400" b="0" strike="noStrike" spc="-1" dirty="0" err="1">
+                <a:solidFill>
+                  <a:srgbClr val="404040"/>
+                </a:solidFill>
+                <a:uFill>
+                  <a:solidFill>
+                    <a:srgbClr val="FFFFFF"/>
+                  </a:solidFill>
+                </a:uFill>
+                <a:latin typeface="Trebuchet MS"/>
+              </a:rPr>
+              <a:t>NeoPixel</a:t>
+            </a:r>
+            <a:r>
+              <a:rPr lang="en-US" sz="1400" b="0" strike="noStrike" spc="-1" dirty="0">
+                <a:solidFill>
+                  <a:srgbClr val="404040"/>
+                </a:solidFill>
+                <a:uFill>
+                  <a:solidFill>
+                    <a:srgbClr val="FFFFFF"/>
+                  </a:solidFill>
+                </a:uFill>
+                <a:latin typeface="Trebuchet MS"/>
+              </a:rPr>
+              <a:t> LEDs</a:t>
+            </a:r>
+            <a:endParaRPr lang="en-US" sz="1400" b="0" strike="noStrike" spc="-1" dirty="0">
               <a:solidFill>
                 <a:srgbClr val="000000"/>
               </a:solidFill>
@@ -15030,7 +15433,7 @@
               <a:buChar char=""/>
             </a:pPr>
             <a:r>
-              <a:rPr lang="en-US" sz="1400" b="0" strike="noStrike" spc="-1">
+              <a:rPr lang="en-US" sz="1400" b="0" strike="noStrike" spc="-1" dirty="0">
                 <a:solidFill>
                   <a:srgbClr val="404040"/>
                 </a:solidFill>
@@ -15043,7 +15446,7 @@
               </a:rPr>
               <a:t>Fully Addressable</a:t>
             </a:r>
-            <a:endParaRPr lang="en-US" sz="1400" b="0" strike="noStrike" spc="-1">
+            <a:endParaRPr lang="en-US" sz="1400" b="0" strike="noStrike" spc="-1" dirty="0">
               <a:solidFill>
                 <a:srgbClr val="000000"/>
               </a:solidFill>
@@ -15071,7 +15474,7 @@
               <a:buChar char=""/>
             </a:pPr>
             <a:r>
-              <a:rPr lang="en-US" sz="1400" b="0" strike="noStrike" spc="-1">
+              <a:rPr lang="en-US" sz="1400" b="0" strike="noStrike" spc="-1" dirty="0">
                 <a:solidFill>
                   <a:srgbClr val="404040"/>
                 </a:solidFill>
@@ -15084,7 +15487,7 @@
               </a:rPr>
               <a:t>Clock based</a:t>
             </a:r>
-            <a:endParaRPr lang="en-US" sz="1400" b="0" strike="noStrike" spc="-1">
+            <a:endParaRPr lang="en-US" sz="1400" b="0" strike="noStrike" spc="-1" dirty="0">
               <a:solidFill>
                 <a:srgbClr val="000000"/>
               </a:solidFill>
@@ -15112,7 +15515,7 @@
               <a:buChar char=""/>
             </a:pPr>
             <a:r>
-              <a:rPr lang="en-US" sz="1400" b="0" strike="noStrike" spc="-1">
+              <a:rPr lang="en-US" sz="1400" b="0" strike="noStrike" spc="-1" dirty="0">
                 <a:solidFill>
                   <a:srgbClr val="404040"/>
                 </a:solidFill>
@@ -15125,7 +15528,7 @@
               </a:rPr>
               <a:t>Supported chosen LED library</a:t>
             </a:r>
-            <a:endParaRPr lang="en-US" sz="1400" b="0" strike="noStrike" spc="-1">
+            <a:endParaRPr lang="en-US" sz="1400" b="0" strike="noStrike" spc="-1" dirty="0">
               <a:solidFill>
                 <a:srgbClr val="000000"/>
               </a:solidFill>
@@ -15137,25 +15540,58 @@
               <a:latin typeface="Arial"/>
             </a:endParaRPr>
           </a:p>
-          <a:p>
-            <a:pPr marL="343080" indent="-342360">
+        </p:txBody>
+      </p:sp>
+      <p:sp>
+        <p:nvSpPr>
+          <p:cNvPr id="6" name="CustomShape 1">
+            <a:extLst>
+              <a:ext uri="{FF2B5EF4-FFF2-40B4-BE49-F238E27FC236}">
+                <a16:creationId xmlns:a16="http://schemas.microsoft.com/office/drawing/2014/main" id="{B2D88566-25D3-45A7-A06C-C1DA3F45992E}"/>
+              </a:ext>
+            </a:extLst>
+          </p:cNvPr>
+          <p:cNvSpPr/>
+          <p:nvPr/>
+        </p:nvSpPr>
+        <p:spPr>
+          <a:xfrm>
+            <a:off x="829560" y="761880"/>
+            <a:ext cx="8596080" cy="1320120"/>
+          </a:xfrm>
+          <a:prstGeom prst="rect">
+            <a:avLst/>
+          </a:prstGeom>
+          <a:noFill/>
+          <a:ln>
+            <a:noFill/>
+          </a:ln>
+        </p:spPr>
+        <p:style>
+          <a:lnRef idx="0">
+            <a:scrgbClr r="0" g="0" b="0"/>
+          </a:lnRef>
+          <a:fillRef idx="0">
+            <a:scrgbClr r="0" g="0" b="0"/>
+          </a:fillRef>
+          <a:effectRef idx="0">
+            <a:scrgbClr r="0" g="0" b="0"/>
+          </a:effectRef>
+          <a:fontRef idx="minor"/>
+        </p:style>
+        <p:txBody>
+          <a:bodyPr lIns="90000" tIns="45000" rIns="90000" bIns="45000"/>
+          <a:lstStyle/>
+          <a:p>
+            <a:pPr>
               <a:lnSpc>
                 <a:spcPct val="100000"/>
               </a:lnSpc>
-              <a:spcBef>
-                <a:spcPts val="1001"/>
-              </a:spcBef>
-              <a:buClr>
-                <a:srgbClr val="90C226"/>
-              </a:buClr>
-              <a:buSzPct val="80000"/>
-              <a:buFont typeface="Wingdings 3" charset="2"/>
-              <a:buChar char=""/>
             </a:pPr>
             <a:r>
-              <a:rPr lang="en-US" sz="1400" b="0" strike="noStrike" spc="-1">
-                <a:solidFill>
-                  <a:srgbClr val="404040"/>
+              <a:rPr lang="en-US" sz="3600" b="0" strike="noStrike" spc="-1" dirty="0">
+                <a:solidFill>
+                  <a:srgbClr val="90C226"/>
                 </a:solidFill>
                 <a:uFill>
                   <a:solidFill>
@@ -15164,39 +15600,12 @@
                 </a:uFill>
                 <a:latin typeface="Trebuchet MS"/>
               </a:rPr>
-              <a:t>Master Controller: Raspberry Pi</a:t>
-            </a:r>
-            <a:endParaRPr lang="en-US" sz="1400" b="0" strike="noStrike" spc="-1">
-              <a:solidFill>
-                <a:srgbClr val="000000"/>
-              </a:solidFill>
-              <a:uFill>
-                <a:solidFill>
-                  <a:srgbClr val="FFFFFF"/>
-                </a:solidFill>
-              </a:uFill>
-              <a:latin typeface="Arial"/>
-            </a:endParaRPr>
-          </a:p>
-          <a:p>
-            <a:pPr marL="800280" lvl="1" indent="-342360">
-              <a:lnSpc>
-                <a:spcPct val="100000"/>
-              </a:lnSpc>
-              <a:spcBef>
-                <a:spcPts val="1001"/>
-              </a:spcBef>
-              <a:buClr>
-                <a:srgbClr val="90C226"/>
-              </a:buClr>
-              <a:buSzPct val="80000"/>
-              <a:buFont typeface="Wingdings 3" charset="2"/>
-              <a:buChar char=""/>
-            </a:pPr>
-            <a:r>
-              <a:rPr lang="en-US" sz="1400" b="0" strike="noStrike" spc="-1">
-                <a:solidFill>
-                  <a:srgbClr val="404040"/>
+              <a:t>LED</a:t>
+            </a:r>
+            <a:r>
+              <a:rPr lang="en-US" sz="3600" spc="-1" dirty="0">
+                <a:solidFill>
+                  <a:srgbClr val="90C226"/>
                 </a:solidFill>
                 <a:uFill>
                   <a:solidFill>
@@ -15205,9 +15614,9 @@
                 </a:uFill>
                 <a:latin typeface="Trebuchet MS"/>
               </a:rPr>
-              <a:t>Multi-tasking processor</a:t>
-            </a:r>
-            <a:endParaRPr lang="en-US" sz="1400" b="0" strike="noStrike" spc="-1">
+              <a:t>s</a:t>
+            </a:r>
+            <a:endParaRPr lang="en-US" sz="3600" b="0" strike="noStrike" spc="-1" dirty="0">
               <a:solidFill>
                 <a:srgbClr val="000000"/>
               </a:solidFill>
@@ -15219,340 +15628,50 @@
               <a:latin typeface="Arial"/>
             </a:endParaRPr>
           </a:p>
-          <a:p>
-            <a:pPr marL="800280" lvl="1" indent="-342360">
-              <a:lnSpc>
-                <a:spcPct val="100000"/>
-              </a:lnSpc>
-              <a:spcBef>
-                <a:spcPts val="1001"/>
-              </a:spcBef>
-              <a:buClr>
-                <a:srgbClr val="90C226"/>
-              </a:buClr>
-              <a:buSzPct val="80000"/>
-              <a:buFont typeface="Wingdings 3" charset="2"/>
-              <a:buChar char=""/>
-            </a:pPr>
-            <a:r>
-              <a:rPr lang="en-US" sz="1400" b="0" strike="noStrike" spc="-1">
-                <a:solidFill>
-                  <a:srgbClr val="404040"/>
-                </a:solidFill>
-                <a:uFill>
-                  <a:solidFill>
-                    <a:srgbClr val="FFFFFF"/>
-                  </a:solidFill>
-                </a:uFill>
-                <a:latin typeface="Trebuchet MS"/>
-              </a:rPr>
-              <a:t>Wireless and Bluetooth chip</a:t>
-            </a:r>
-            <a:endParaRPr lang="en-US" sz="1400" b="0" strike="noStrike" spc="-1">
-              <a:solidFill>
-                <a:srgbClr val="000000"/>
-              </a:solidFill>
-              <a:uFill>
-                <a:solidFill>
-                  <a:srgbClr val="FFFFFF"/>
-                </a:solidFill>
-              </a:uFill>
-              <a:latin typeface="Arial"/>
-            </a:endParaRPr>
-          </a:p>
-          <a:p>
-            <a:pPr marL="343080" indent="-342360">
-              <a:lnSpc>
-                <a:spcPct val="100000"/>
-              </a:lnSpc>
-              <a:spcBef>
-                <a:spcPts val="1001"/>
-              </a:spcBef>
-              <a:buClr>
-                <a:srgbClr val="90C226"/>
-              </a:buClr>
-              <a:buSzPct val="80000"/>
-              <a:buFont typeface="Wingdings 3" charset="2"/>
-              <a:buChar char=""/>
-            </a:pPr>
-            <a:r>
-              <a:rPr lang="en-US" sz="1400" b="0" strike="noStrike" spc="-1">
-                <a:solidFill>
-                  <a:srgbClr val="404040"/>
-                </a:solidFill>
-                <a:uFill>
-                  <a:solidFill>
-                    <a:srgbClr val="FFFFFF"/>
-                  </a:solidFill>
-                </a:uFill>
-                <a:latin typeface="Trebuchet MS"/>
-              </a:rPr>
-              <a:t>Teeny 3.2</a:t>
-            </a:r>
-            <a:endParaRPr lang="en-US" sz="1400" b="0" strike="noStrike" spc="-1">
-              <a:solidFill>
-                <a:srgbClr val="000000"/>
-              </a:solidFill>
-              <a:uFill>
-                <a:solidFill>
-                  <a:srgbClr val="FFFFFF"/>
-                </a:solidFill>
-              </a:uFill>
-              <a:latin typeface="Arial"/>
-            </a:endParaRPr>
-          </a:p>
-          <a:p>
-            <a:pPr marL="800280" lvl="1" indent="-342360">
-              <a:lnSpc>
-                <a:spcPct val="100000"/>
-              </a:lnSpc>
-              <a:spcBef>
-                <a:spcPts val="1001"/>
-              </a:spcBef>
-              <a:buClr>
-                <a:srgbClr val="90C226"/>
-              </a:buClr>
-              <a:buSzPct val="80000"/>
-              <a:buFont typeface="Wingdings 3" charset="2"/>
-              <a:buChar char=""/>
-            </a:pPr>
-            <a:r>
-              <a:rPr lang="en-US" sz="1400" b="0" strike="noStrike" spc="-1">
-                <a:solidFill>
-                  <a:srgbClr val="404040"/>
-                </a:solidFill>
-                <a:uFill>
-                  <a:solidFill>
-                    <a:srgbClr val="FFFFFF"/>
-                  </a:solidFill>
-                </a:uFill>
-                <a:latin typeface="Trebuchet MS"/>
-              </a:rPr>
-              <a:t>Small</a:t>
-            </a:r>
-            <a:endParaRPr lang="en-US" sz="1400" b="0" strike="noStrike" spc="-1">
-              <a:solidFill>
-                <a:srgbClr val="000000"/>
-              </a:solidFill>
-              <a:uFill>
-                <a:solidFill>
-                  <a:srgbClr val="FFFFFF"/>
-                </a:solidFill>
-              </a:uFill>
-              <a:latin typeface="Arial"/>
-            </a:endParaRPr>
-          </a:p>
-          <a:p>
-            <a:pPr marL="800280" lvl="1" indent="-342360">
-              <a:lnSpc>
-                <a:spcPct val="100000"/>
-              </a:lnSpc>
-              <a:spcBef>
-                <a:spcPts val="1001"/>
-              </a:spcBef>
-              <a:buClr>
-                <a:srgbClr val="90C226"/>
-              </a:buClr>
-              <a:buSzPct val="80000"/>
-              <a:buFont typeface="Wingdings 3" charset="2"/>
-              <a:buChar char=""/>
-            </a:pPr>
-            <a:r>
-              <a:rPr lang="en-US" sz="1400" b="0" strike="noStrike" spc="-1">
-                <a:solidFill>
-                  <a:srgbClr val="404040"/>
-                </a:solidFill>
-                <a:uFill>
-                  <a:solidFill>
-                    <a:srgbClr val="FFFFFF"/>
-                  </a:solidFill>
-                </a:uFill>
-                <a:latin typeface="Trebuchet MS"/>
-              </a:rPr>
-              <a:t>Runs Arduino</a:t>
-            </a:r>
-            <a:endParaRPr lang="en-US" sz="1400" b="0" strike="noStrike" spc="-1">
-              <a:solidFill>
-                <a:srgbClr val="000000"/>
-              </a:solidFill>
-              <a:uFill>
-                <a:solidFill>
-                  <a:srgbClr val="FFFFFF"/>
-                </a:solidFill>
-              </a:uFill>
-              <a:latin typeface="Arial"/>
-            </a:endParaRPr>
-          </a:p>
-          <a:p>
-            <a:pPr marL="343080" indent="-342360">
-              <a:lnSpc>
-                <a:spcPct val="100000"/>
-              </a:lnSpc>
-              <a:spcBef>
-                <a:spcPts val="1001"/>
-              </a:spcBef>
-              <a:buClr>
-                <a:srgbClr val="90C226"/>
-              </a:buClr>
-              <a:buSzPct val="80000"/>
-              <a:buFont typeface="Wingdings 3" charset="2"/>
-              <a:buChar char=""/>
-            </a:pPr>
-            <a:r>
-              <a:rPr lang="en-US" sz="1400" b="0" strike="noStrike" spc="-1">
-                <a:solidFill>
-                  <a:srgbClr val="404040"/>
-                </a:solidFill>
-                <a:uFill>
-                  <a:solidFill>
-                    <a:srgbClr val="FFFFFF"/>
-                  </a:solidFill>
-                </a:uFill>
-                <a:latin typeface="Trebuchet MS"/>
-              </a:rPr>
-              <a:t>FastLED</a:t>
-            </a:r>
-            <a:endParaRPr lang="en-US" sz="1400" b="0" strike="noStrike" spc="-1">
-              <a:solidFill>
-                <a:srgbClr val="000000"/>
-              </a:solidFill>
-              <a:uFill>
-                <a:solidFill>
-                  <a:srgbClr val="FFFFFF"/>
-                </a:solidFill>
-              </a:uFill>
-              <a:latin typeface="Arial"/>
-            </a:endParaRPr>
-          </a:p>
-          <a:p>
-            <a:pPr marL="800280" lvl="1" indent="-342360">
-              <a:lnSpc>
-                <a:spcPct val="100000"/>
-              </a:lnSpc>
-              <a:spcBef>
-                <a:spcPts val="1001"/>
-              </a:spcBef>
-              <a:buClr>
-                <a:srgbClr val="90C226"/>
-              </a:buClr>
-              <a:buSzPct val="80000"/>
-              <a:buFont typeface="Wingdings 3" charset="2"/>
-              <a:buChar char=""/>
-            </a:pPr>
-            <a:r>
-              <a:rPr lang="en-US" sz="1400" b="0" strike="noStrike" spc="-1">
-                <a:solidFill>
-                  <a:srgbClr val="404040"/>
-                </a:solidFill>
-                <a:uFill>
-                  <a:solidFill>
-                    <a:srgbClr val="FFFFFF"/>
-                  </a:solidFill>
-                </a:uFill>
-                <a:latin typeface="Trebuchet MS"/>
-              </a:rPr>
-              <a:t>Arduino Library</a:t>
-            </a:r>
-            <a:endParaRPr lang="en-US" sz="1400" b="0" strike="noStrike" spc="-1">
-              <a:solidFill>
-                <a:srgbClr val="000000"/>
-              </a:solidFill>
-              <a:uFill>
-                <a:solidFill>
-                  <a:srgbClr val="FFFFFF"/>
-                </a:solidFill>
-              </a:uFill>
-              <a:latin typeface="Arial"/>
-            </a:endParaRPr>
-          </a:p>
-          <a:p>
-            <a:pPr marL="800280" lvl="1" indent="-342360">
-              <a:lnSpc>
-                <a:spcPct val="100000"/>
-              </a:lnSpc>
-              <a:spcBef>
-                <a:spcPts val="1001"/>
-              </a:spcBef>
-              <a:buClr>
-                <a:srgbClr val="90C226"/>
-              </a:buClr>
-              <a:buSzPct val="80000"/>
-              <a:buFont typeface="Wingdings 3" charset="2"/>
-              <a:buChar char=""/>
-            </a:pPr>
-            <a:r>
-              <a:rPr lang="en-US" sz="1400" b="0" strike="noStrike" spc="-1">
-                <a:solidFill>
-                  <a:srgbClr val="404040"/>
-                </a:solidFill>
-                <a:uFill>
-                  <a:solidFill>
-                    <a:srgbClr val="FFFFFF"/>
-                  </a:solidFill>
-                </a:uFill>
-                <a:latin typeface="Trebuchet MS"/>
-              </a:rPr>
-              <a:t>Quick development.</a:t>
-            </a:r>
-            <a:endParaRPr lang="en-US" sz="1400" b="0" strike="noStrike" spc="-1">
-              <a:solidFill>
-                <a:srgbClr val="000000"/>
-              </a:solidFill>
-              <a:uFill>
-                <a:solidFill>
-                  <a:srgbClr val="FFFFFF"/>
-                </a:solidFill>
-              </a:uFill>
-              <a:latin typeface="Arial"/>
-            </a:endParaRPr>
-          </a:p>
-          <a:p>
-            <a:pPr>
-              <a:lnSpc>
-                <a:spcPct val="100000"/>
-              </a:lnSpc>
-              <a:spcBef>
-                <a:spcPts val="1001"/>
-              </a:spcBef>
-            </a:pPr>
-            <a:endParaRPr lang="en-US" sz="1400" b="0" strike="noStrike" spc="-1">
-              <a:solidFill>
-                <a:srgbClr val="000000"/>
-              </a:solidFill>
-              <a:uFill>
-                <a:solidFill>
-                  <a:srgbClr val="FFFFFF"/>
-                </a:solidFill>
-              </a:uFill>
-              <a:latin typeface="Arial"/>
-            </a:endParaRPr>
-          </a:p>
         </p:txBody>
       </p:sp>
       <p:pic>
         <p:nvPicPr>
-          <p:cNvPr id="143" name="Picture 2"/>
-          <p:cNvPicPr/>
+          <p:cNvPr id="3" name="Picture 2" descr="A picture containing electronics&#10;&#10;Description generated with high confidence">
+            <a:extLst>
+              <a:ext uri="{FF2B5EF4-FFF2-40B4-BE49-F238E27FC236}">
+                <a16:creationId xmlns:a16="http://schemas.microsoft.com/office/drawing/2014/main" id="{D17E3691-AF2E-4B35-88A5-70F26154FF60}"/>
+              </a:ext>
+            </a:extLst>
+          </p:cNvPr>
+          <p:cNvPicPr>
+            <a:picLocks noChangeAspect="1"/>
+          </p:cNvPicPr>
           <p:nvPr/>
         </p:nvPicPr>
         <p:blipFill>
-          <a:blip r:embed="rId3"/>
-          <a:stretch/>
+          <a:blip r:embed="rId3">
+            <a:extLst>
+              <a:ext uri="{28A0092B-C50C-407E-A947-70E740481C1C}">
+                <a14:useLocalDpi xmlns:a14="http://schemas.microsoft.com/office/drawing/2010/main" val="0"/>
+              </a:ext>
+            </a:extLst>
+          </a:blip>
+          <a:stretch>
+            <a:fillRect/>
+          </a:stretch>
         </p:blipFill>
         <p:spPr>
           <a:xfrm>
-            <a:off x="5175000" y="1488960"/>
-            <a:ext cx="6586200" cy="3068640"/>
+            <a:off x="5928461" y="1269540"/>
+            <a:ext cx="3497179" cy="2622884"/>
           </a:xfrm>
           <a:prstGeom prst="rect">
             <a:avLst/>
           </a:prstGeom>
-          <a:ln>
-            <a:noFill/>
-          </a:ln>
         </p:spPr>
       </p:pic>
     </p:spTree>
+    <p:extLst>
+      <p:ext uri="{BB962C8B-B14F-4D97-AF65-F5344CB8AC3E}">
+        <p14:creationId xmlns:p14="http://schemas.microsoft.com/office/powerpoint/2010/main" val="3378223346"/>
+      </p:ext>
+    </p:extLst>
   </p:cSld>
   <p:clrMapOvr>
     <a:masterClrMapping/>
@@ -15588,6 +15707,1288 @@
 </file>
 
 <file path=ppt/slides/slide12.xml><?xml version="1.0" encoding="utf-8"?>
+<p:sld xmlns:a="http://schemas.openxmlformats.org/drawingml/2006/main" xmlns:r="http://schemas.openxmlformats.org/officeDocument/2006/relationships" xmlns:p="http://schemas.openxmlformats.org/presentationml/2006/main">
+  <p:cSld>
+    <p:spTree>
+      <p:nvGrpSpPr>
+        <p:cNvPr id="1" name=""/>
+        <p:cNvGrpSpPr/>
+        <p:nvPr/>
+      </p:nvGrpSpPr>
+      <p:grpSpPr>
+        <a:xfrm>
+          <a:off x="0" y="0"/>
+          <a:ext cx="0" cy="0"/>
+          <a:chOff x="0" y="0"/>
+          <a:chExt cx="0" cy="0"/>
+        </a:xfrm>
+      </p:grpSpPr>
+      <p:sp>
+        <p:nvSpPr>
+          <p:cNvPr id="140" name="CustomShape 1"/>
+          <p:cNvSpPr/>
+          <p:nvPr/>
+        </p:nvSpPr>
+        <p:spPr>
+          <a:xfrm>
+            <a:off x="677160" y="609480"/>
+            <a:ext cx="8596080" cy="1320120"/>
+          </a:xfrm>
+          <a:prstGeom prst="rect">
+            <a:avLst/>
+          </a:prstGeom>
+          <a:noFill/>
+          <a:ln>
+            <a:noFill/>
+          </a:ln>
+        </p:spPr>
+        <p:style>
+          <a:lnRef idx="0">
+            <a:scrgbClr r="0" g="0" b="0"/>
+          </a:lnRef>
+          <a:fillRef idx="0">
+            <a:scrgbClr r="0" g="0" b="0"/>
+          </a:fillRef>
+          <a:effectRef idx="0">
+            <a:scrgbClr r="0" g="0" b="0"/>
+          </a:effectRef>
+          <a:fontRef idx="minor"/>
+        </p:style>
+        <p:txBody>
+          <a:bodyPr lIns="90000" tIns="45000" rIns="90000" bIns="45000"/>
+          <a:lstStyle/>
+          <a:p>
+            <a:pPr>
+              <a:lnSpc>
+                <a:spcPct val="100000"/>
+              </a:lnSpc>
+            </a:pPr>
+            <a:r>
+              <a:rPr lang="en-US" sz="3600" b="0" strike="noStrike" spc="-1" dirty="0">
+                <a:solidFill>
+                  <a:srgbClr val="90C226"/>
+                </a:solidFill>
+                <a:uFill>
+                  <a:solidFill>
+                    <a:srgbClr val="FFFFFF"/>
+                  </a:solidFill>
+                </a:uFill>
+                <a:latin typeface="Trebuchet MS"/>
+              </a:rPr>
+              <a:t>LED controller</a:t>
+            </a:r>
+            <a:endParaRPr lang="en-US" sz="3600" b="0" strike="noStrike" spc="-1" dirty="0">
+              <a:solidFill>
+                <a:srgbClr val="000000"/>
+              </a:solidFill>
+              <a:uFill>
+                <a:solidFill>
+                  <a:srgbClr val="FFFFFF"/>
+                </a:solidFill>
+              </a:uFill>
+              <a:latin typeface="Arial"/>
+            </a:endParaRPr>
+          </a:p>
+        </p:txBody>
+      </p:sp>
+      <p:sp>
+        <p:nvSpPr>
+          <p:cNvPr id="141" name="CustomShape 2"/>
+          <p:cNvSpPr/>
+          <p:nvPr/>
+        </p:nvSpPr>
+        <p:spPr>
+          <a:xfrm>
+            <a:off x="677160" y="2160720"/>
+            <a:ext cx="8596080" cy="3880080"/>
+          </a:xfrm>
+          <a:prstGeom prst="rect">
+            <a:avLst/>
+          </a:prstGeom>
+          <a:noFill/>
+          <a:ln>
+            <a:noFill/>
+          </a:ln>
+        </p:spPr>
+        <p:style>
+          <a:lnRef idx="0">
+            <a:scrgbClr r="0" g="0" b="0"/>
+          </a:lnRef>
+          <a:fillRef idx="0">
+            <a:scrgbClr r="0" g="0" b="0"/>
+          </a:fillRef>
+          <a:effectRef idx="0">
+            <a:scrgbClr r="0" g="0" b="0"/>
+          </a:effectRef>
+          <a:fontRef idx="minor"/>
+        </p:style>
+      </p:sp>
+      <p:sp>
+        <p:nvSpPr>
+          <p:cNvPr id="142" name="CustomShape 3"/>
+          <p:cNvSpPr/>
+          <p:nvPr/>
+        </p:nvSpPr>
+        <p:spPr>
+          <a:xfrm>
+            <a:off x="677160" y="1488960"/>
+            <a:ext cx="8596080" cy="3880080"/>
+          </a:xfrm>
+          <a:prstGeom prst="rect">
+            <a:avLst/>
+          </a:prstGeom>
+          <a:noFill/>
+          <a:ln>
+            <a:noFill/>
+          </a:ln>
+        </p:spPr>
+        <p:style>
+          <a:lnRef idx="0">
+            <a:scrgbClr r="0" g="0" b="0"/>
+          </a:lnRef>
+          <a:fillRef idx="0">
+            <a:scrgbClr r="0" g="0" b="0"/>
+          </a:fillRef>
+          <a:effectRef idx="0">
+            <a:scrgbClr r="0" g="0" b="0"/>
+          </a:effectRef>
+          <a:fontRef idx="minor"/>
+        </p:style>
+        <p:txBody>
+          <a:bodyPr lIns="90000" tIns="45000" rIns="90000" bIns="45000"/>
+          <a:lstStyle/>
+          <a:p>
+            <a:pPr marL="343080" indent="-342360">
+              <a:lnSpc>
+                <a:spcPct val="100000"/>
+              </a:lnSpc>
+              <a:spcBef>
+                <a:spcPts val="1001"/>
+              </a:spcBef>
+              <a:buClr>
+                <a:srgbClr val="90C226"/>
+              </a:buClr>
+              <a:buSzPct val="80000"/>
+              <a:buFont typeface="Wingdings 3" charset="2"/>
+              <a:buChar char=""/>
+            </a:pPr>
+            <a:r>
+              <a:rPr lang="en-US" sz="1400" b="0" strike="noStrike" spc="-1" dirty="0">
+                <a:solidFill>
+                  <a:srgbClr val="404040"/>
+                </a:solidFill>
+                <a:uFill>
+                  <a:solidFill>
+                    <a:srgbClr val="FFFFFF"/>
+                  </a:solidFill>
+                </a:uFill>
+                <a:latin typeface="Trebuchet MS"/>
+              </a:rPr>
+              <a:t>Teeny 3.2</a:t>
+            </a:r>
+            <a:endParaRPr lang="en-US" sz="1400" b="0" strike="noStrike" spc="-1" dirty="0">
+              <a:solidFill>
+                <a:srgbClr val="000000"/>
+              </a:solidFill>
+              <a:uFill>
+                <a:solidFill>
+                  <a:srgbClr val="FFFFFF"/>
+                </a:solidFill>
+              </a:uFill>
+              <a:latin typeface="Arial"/>
+            </a:endParaRPr>
+          </a:p>
+          <a:p>
+            <a:pPr marL="800280" lvl="1" indent="-342360">
+              <a:lnSpc>
+                <a:spcPct val="100000"/>
+              </a:lnSpc>
+              <a:spcBef>
+                <a:spcPts val="1001"/>
+              </a:spcBef>
+              <a:buClr>
+                <a:srgbClr val="90C226"/>
+              </a:buClr>
+              <a:buSzPct val="80000"/>
+              <a:buFont typeface="Wingdings 3" charset="2"/>
+              <a:buChar char=""/>
+            </a:pPr>
+            <a:r>
+              <a:rPr lang="en-US" sz="1400" b="0" strike="noStrike" spc="-1" dirty="0">
+                <a:solidFill>
+                  <a:srgbClr val="404040"/>
+                </a:solidFill>
+                <a:uFill>
+                  <a:solidFill>
+                    <a:srgbClr val="FFFFFF"/>
+                  </a:solidFill>
+                </a:uFill>
+                <a:latin typeface="Trebuchet MS"/>
+              </a:rPr>
+              <a:t>Small</a:t>
+            </a:r>
+            <a:endParaRPr lang="en-US" sz="1400" b="0" strike="noStrike" spc="-1" dirty="0">
+              <a:solidFill>
+                <a:srgbClr val="000000"/>
+              </a:solidFill>
+              <a:uFill>
+                <a:solidFill>
+                  <a:srgbClr val="FFFFFF"/>
+                </a:solidFill>
+              </a:uFill>
+              <a:latin typeface="Arial"/>
+            </a:endParaRPr>
+          </a:p>
+          <a:p>
+            <a:pPr marL="800280" lvl="1" indent="-342360">
+              <a:lnSpc>
+                <a:spcPct val="100000"/>
+              </a:lnSpc>
+              <a:spcBef>
+                <a:spcPts val="1001"/>
+              </a:spcBef>
+              <a:buClr>
+                <a:srgbClr val="90C226"/>
+              </a:buClr>
+              <a:buSzPct val="80000"/>
+              <a:buFont typeface="Wingdings 3" charset="2"/>
+              <a:buChar char=""/>
+            </a:pPr>
+            <a:r>
+              <a:rPr lang="en-US" sz="1400" b="0" strike="noStrike" spc="-1" dirty="0">
+                <a:solidFill>
+                  <a:srgbClr val="404040"/>
+                </a:solidFill>
+                <a:uFill>
+                  <a:solidFill>
+                    <a:srgbClr val="FFFFFF"/>
+                  </a:solidFill>
+                </a:uFill>
+                <a:latin typeface="Trebuchet MS"/>
+              </a:rPr>
+              <a:t>Runs Arduino</a:t>
+            </a:r>
+          </a:p>
+          <a:p>
+            <a:pPr marL="800280" lvl="1" indent="-342360">
+              <a:lnSpc>
+                <a:spcPct val="100000"/>
+              </a:lnSpc>
+              <a:spcBef>
+                <a:spcPts val="1001"/>
+              </a:spcBef>
+              <a:buClr>
+                <a:srgbClr val="90C226"/>
+              </a:buClr>
+              <a:buSzPct val="80000"/>
+              <a:buFont typeface="Wingdings 3" charset="2"/>
+              <a:buChar char=""/>
+            </a:pPr>
+            <a:r>
+              <a:rPr lang="en-US" sz="1400" spc="-1" dirty="0">
+                <a:solidFill>
+                  <a:srgbClr val="404040"/>
+                </a:solidFill>
+                <a:uFill>
+                  <a:solidFill>
+                    <a:srgbClr val="FFFFFF"/>
+                  </a:solidFill>
+                </a:uFill>
+                <a:latin typeface="Trebuchet MS"/>
+              </a:rPr>
+              <a:t>Single task processor</a:t>
+            </a:r>
+          </a:p>
+          <a:p>
+            <a:pPr marL="800280" lvl="1" indent="-342360">
+              <a:lnSpc>
+                <a:spcPct val="100000"/>
+              </a:lnSpc>
+              <a:spcBef>
+                <a:spcPts val="1001"/>
+              </a:spcBef>
+              <a:buClr>
+                <a:srgbClr val="90C226"/>
+              </a:buClr>
+              <a:buSzPct val="80000"/>
+              <a:buFont typeface="Wingdings 3" charset="2"/>
+              <a:buChar char=""/>
+            </a:pPr>
+            <a:r>
+              <a:rPr lang="en-US" sz="1400" b="0" strike="noStrike" spc="-1" dirty="0">
+                <a:solidFill>
+                  <a:srgbClr val="404040"/>
+                </a:solidFill>
+                <a:uFill>
+                  <a:solidFill>
+                    <a:srgbClr val="FFFFFF"/>
+                  </a:solidFill>
+                </a:uFill>
+                <a:latin typeface="Trebuchet MS"/>
+              </a:rPr>
+              <a:t>Running LED control</a:t>
+            </a:r>
+            <a:endParaRPr lang="en-US" sz="1400" b="0" strike="noStrike" spc="-1" dirty="0">
+              <a:solidFill>
+                <a:srgbClr val="000000"/>
+              </a:solidFill>
+              <a:uFill>
+                <a:solidFill>
+                  <a:srgbClr val="FFFFFF"/>
+                </a:solidFill>
+              </a:uFill>
+              <a:latin typeface="Arial"/>
+            </a:endParaRPr>
+          </a:p>
+          <a:p>
+            <a:pPr marL="720">
+              <a:lnSpc>
+                <a:spcPct val="100000"/>
+              </a:lnSpc>
+              <a:spcBef>
+                <a:spcPts val="1001"/>
+              </a:spcBef>
+              <a:buClr>
+                <a:srgbClr val="90C226"/>
+              </a:buClr>
+              <a:buSzPct val="80000"/>
+            </a:pPr>
+            <a:endParaRPr lang="en-US" sz="1400" b="0" strike="noStrike" spc="-1" dirty="0">
+              <a:solidFill>
+                <a:srgbClr val="000000"/>
+              </a:solidFill>
+              <a:uFill>
+                <a:solidFill>
+                  <a:srgbClr val="FFFFFF"/>
+                </a:solidFill>
+              </a:uFill>
+              <a:latin typeface="Arial"/>
+            </a:endParaRPr>
+          </a:p>
+          <a:p>
+            <a:pPr>
+              <a:lnSpc>
+                <a:spcPct val="100000"/>
+              </a:lnSpc>
+              <a:spcBef>
+                <a:spcPts val="1001"/>
+              </a:spcBef>
+            </a:pPr>
+            <a:endParaRPr lang="en-US" sz="1400" b="0" strike="noStrike" spc="-1" dirty="0">
+              <a:solidFill>
+                <a:srgbClr val="000000"/>
+              </a:solidFill>
+              <a:uFill>
+                <a:solidFill>
+                  <a:srgbClr val="FFFFFF"/>
+                </a:solidFill>
+              </a:uFill>
+              <a:latin typeface="Arial"/>
+            </a:endParaRPr>
+          </a:p>
+        </p:txBody>
+      </p:sp>
+      <p:pic>
+        <p:nvPicPr>
+          <p:cNvPr id="3" name="Picture 2" descr="A circuit board&#10;&#10;Description generated with high confidence">
+            <a:extLst>
+              <a:ext uri="{FF2B5EF4-FFF2-40B4-BE49-F238E27FC236}">
+                <a16:creationId xmlns:a16="http://schemas.microsoft.com/office/drawing/2014/main" id="{A7C37F02-FF1E-45D4-9889-B651E405183C}"/>
+              </a:ext>
+            </a:extLst>
+          </p:cNvPr>
+          <p:cNvPicPr>
+            <a:picLocks noChangeAspect="1"/>
+          </p:cNvPicPr>
+          <p:nvPr/>
+        </p:nvPicPr>
+        <p:blipFill>
+          <a:blip r:embed="rId3">
+            <a:extLst>
+              <a:ext uri="{28A0092B-C50C-407E-A947-70E740481C1C}">
+                <a14:useLocalDpi xmlns:a14="http://schemas.microsoft.com/office/drawing/2010/main" val="0"/>
+              </a:ext>
+            </a:extLst>
+          </a:blip>
+          <a:stretch>
+            <a:fillRect/>
+          </a:stretch>
+        </p:blipFill>
+        <p:spPr>
+          <a:xfrm>
+            <a:off x="5370575" y="1488960"/>
+            <a:ext cx="4775683" cy="2287512"/>
+          </a:xfrm>
+          <a:prstGeom prst="rect">
+            <a:avLst/>
+          </a:prstGeom>
+        </p:spPr>
+      </p:pic>
+    </p:spTree>
+    <p:extLst>
+      <p:ext uri="{BB962C8B-B14F-4D97-AF65-F5344CB8AC3E}">
+        <p14:creationId xmlns:p14="http://schemas.microsoft.com/office/powerpoint/2010/main" val="4060597164"/>
+      </p:ext>
+    </p:extLst>
+  </p:cSld>
+  <p:clrMapOvr>
+    <a:masterClrMapping/>
+  </p:clrMapOvr>
+  <p:timing>
+    <p:tnLst>
+      <p:par>
+        <p:cTn id="1" dur="indefinite" restart="never" nodeType="tmRoot">
+          <p:childTnLst>
+            <p:seq>
+              <p:cTn id="2" nodeType="mainSeq"/>
+              <p:prevCondLst>
+                <p:cond evt="onPrev" delay="0">
+                  <p:tgtEl>
+                    <p:sldTgt/>
+                  </p:tgtEl>
+                </p:cond>
+              </p:prevCondLst>
+              <p:nextCondLst>
+                <p:cond evt="onNext" delay="0">
+                  <p:tgtEl>
+                    <p:sldTgt/>
+                  </p:tgtEl>
+                </p:cond>
+              </p:nextCondLst>
+            </p:seq>
+          </p:childTnLst>
+        </p:cTn>
+      </p:par>
+    </p:tnLst>
+  </p:timing>
+</p:sld>
+</file>
+
+<file path=ppt/slides/slide13.xml><?xml version="1.0" encoding="utf-8"?>
+<p:sld xmlns:a="http://schemas.openxmlformats.org/drawingml/2006/main" xmlns:r="http://schemas.openxmlformats.org/officeDocument/2006/relationships" xmlns:p="http://schemas.openxmlformats.org/presentationml/2006/main">
+  <p:cSld>
+    <p:spTree>
+      <p:nvGrpSpPr>
+        <p:cNvPr id="1" name=""/>
+        <p:cNvGrpSpPr/>
+        <p:nvPr/>
+      </p:nvGrpSpPr>
+      <p:grpSpPr>
+        <a:xfrm>
+          <a:off x="0" y="0"/>
+          <a:ext cx="0" cy="0"/>
+          <a:chOff x="0" y="0"/>
+          <a:chExt cx="0" cy="0"/>
+        </a:xfrm>
+      </p:grpSpPr>
+      <p:sp>
+        <p:nvSpPr>
+          <p:cNvPr id="140" name="CustomShape 1"/>
+          <p:cNvSpPr/>
+          <p:nvPr/>
+        </p:nvSpPr>
+        <p:spPr>
+          <a:xfrm>
+            <a:off x="677160" y="609480"/>
+            <a:ext cx="8596080" cy="1320120"/>
+          </a:xfrm>
+          <a:prstGeom prst="rect">
+            <a:avLst/>
+          </a:prstGeom>
+          <a:noFill/>
+          <a:ln>
+            <a:noFill/>
+          </a:ln>
+        </p:spPr>
+        <p:style>
+          <a:lnRef idx="0">
+            <a:scrgbClr r="0" g="0" b="0"/>
+          </a:lnRef>
+          <a:fillRef idx="0">
+            <a:scrgbClr r="0" g="0" b="0"/>
+          </a:fillRef>
+          <a:effectRef idx="0">
+            <a:scrgbClr r="0" g="0" b="0"/>
+          </a:effectRef>
+          <a:fontRef idx="minor"/>
+        </p:style>
+        <p:txBody>
+          <a:bodyPr lIns="90000" tIns="45000" rIns="90000" bIns="45000"/>
+          <a:lstStyle/>
+          <a:p>
+            <a:pPr>
+              <a:lnSpc>
+                <a:spcPct val="100000"/>
+              </a:lnSpc>
+            </a:pPr>
+            <a:r>
+              <a:rPr lang="en-US" sz="3600" b="0" strike="noStrike" spc="-1" dirty="0">
+                <a:solidFill>
+                  <a:srgbClr val="90C226"/>
+                </a:solidFill>
+                <a:uFill>
+                  <a:solidFill>
+                    <a:srgbClr val="FFFFFF"/>
+                  </a:solidFill>
+                </a:uFill>
+                <a:latin typeface="Trebuchet MS"/>
+              </a:rPr>
+              <a:t>Master Controller</a:t>
+            </a:r>
+            <a:endParaRPr lang="en-US" sz="3600" b="0" strike="noStrike" spc="-1" dirty="0">
+              <a:solidFill>
+                <a:srgbClr val="000000"/>
+              </a:solidFill>
+              <a:uFill>
+                <a:solidFill>
+                  <a:srgbClr val="FFFFFF"/>
+                </a:solidFill>
+              </a:uFill>
+              <a:latin typeface="Arial"/>
+            </a:endParaRPr>
+          </a:p>
+        </p:txBody>
+      </p:sp>
+      <p:sp>
+        <p:nvSpPr>
+          <p:cNvPr id="141" name="CustomShape 2"/>
+          <p:cNvSpPr/>
+          <p:nvPr/>
+        </p:nvSpPr>
+        <p:spPr>
+          <a:xfrm>
+            <a:off x="677160" y="2160720"/>
+            <a:ext cx="8596080" cy="3880080"/>
+          </a:xfrm>
+          <a:prstGeom prst="rect">
+            <a:avLst/>
+          </a:prstGeom>
+          <a:noFill/>
+          <a:ln>
+            <a:noFill/>
+          </a:ln>
+        </p:spPr>
+        <p:style>
+          <a:lnRef idx="0">
+            <a:scrgbClr r="0" g="0" b="0"/>
+          </a:lnRef>
+          <a:fillRef idx="0">
+            <a:scrgbClr r="0" g="0" b="0"/>
+          </a:fillRef>
+          <a:effectRef idx="0">
+            <a:scrgbClr r="0" g="0" b="0"/>
+          </a:effectRef>
+          <a:fontRef idx="minor"/>
+        </p:style>
+      </p:sp>
+      <p:sp>
+        <p:nvSpPr>
+          <p:cNvPr id="142" name="CustomShape 3"/>
+          <p:cNvSpPr/>
+          <p:nvPr/>
+        </p:nvSpPr>
+        <p:spPr>
+          <a:xfrm>
+            <a:off x="677160" y="1488960"/>
+            <a:ext cx="8596080" cy="3880080"/>
+          </a:xfrm>
+          <a:prstGeom prst="rect">
+            <a:avLst/>
+          </a:prstGeom>
+          <a:noFill/>
+          <a:ln>
+            <a:noFill/>
+          </a:ln>
+        </p:spPr>
+        <p:style>
+          <a:lnRef idx="0">
+            <a:scrgbClr r="0" g="0" b="0"/>
+          </a:lnRef>
+          <a:fillRef idx="0">
+            <a:scrgbClr r="0" g="0" b="0"/>
+          </a:fillRef>
+          <a:effectRef idx="0">
+            <a:scrgbClr r="0" g="0" b="0"/>
+          </a:effectRef>
+          <a:fontRef idx="minor"/>
+        </p:style>
+        <p:txBody>
+          <a:bodyPr lIns="90000" tIns="45000" rIns="90000" bIns="45000"/>
+          <a:lstStyle/>
+          <a:p>
+            <a:pPr marL="343080" indent="-342360">
+              <a:lnSpc>
+                <a:spcPct val="100000"/>
+              </a:lnSpc>
+              <a:spcBef>
+                <a:spcPts val="1001"/>
+              </a:spcBef>
+              <a:buClr>
+                <a:srgbClr val="90C226"/>
+              </a:buClr>
+              <a:buSzPct val="80000"/>
+              <a:buFont typeface="Wingdings 3" charset="2"/>
+              <a:buChar char=""/>
+            </a:pPr>
+            <a:r>
+              <a:rPr lang="en-US" sz="1400" b="0" strike="noStrike" spc="-1" dirty="0">
+                <a:solidFill>
+                  <a:srgbClr val="404040"/>
+                </a:solidFill>
+                <a:uFill>
+                  <a:solidFill>
+                    <a:srgbClr val="FFFFFF"/>
+                  </a:solidFill>
+                </a:uFill>
+                <a:latin typeface="Trebuchet MS"/>
+              </a:rPr>
+              <a:t>Master Controller: Raspberry Pi</a:t>
+            </a:r>
+            <a:endParaRPr lang="en-US" sz="1400" b="0" strike="noStrike" spc="-1" dirty="0">
+              <a:solidFill>
+                <a:srgbClr val="000000"/>
+              </a:solidFill>
+              <a:uFill>
+                <a:solidFill>
+                  <a:srgbClr val="FFFFFF"/>
+                </a:solidFill>
+              </a:uFill>
+              <a:latin typeface="Arial"/>
+            </a:endParaRPr>
+          </a:p>
+          <a:p>
+            <a:pPr marL="800280" lvl="1" indent="-342360">
+              <a:lnSpc>
+                <a:spcPct val="100000"/>
+              </a:lnSpc>
+              <a:spcBef>
+                <a:spcPts val="1001"/>
+              </a:spcBef>
+              <a:buClr>
+                <a:srgbClr val="90C226"/>
+              </a:buClr>
+              <a:buSzPct val="80000"/>
+              <a:buFont typeface="Wingdings 3" charset="2"/>
+              <a:buChar char=""/>
+            </a:pPr>
+            <a:r>
+              <a:rPr lang="en-US" sz="1400" b="0" strike="noStrike" spc="-1" dirty="0">
+                <a:solidFill>
+                  <a:srgbClr val="404040"/>
+                </a:solidFill>
+                <a:uFill>
+                  <a:solidFill>
+                    <a:srgbClr val="FFFFFF"/>
+                  </a:solidFill>
+                </a:uFill>
+                <a:latin typeface="Trebuchet MS"/>
+              </a:rPr>
+              <a:t>Multi-tasking processor</a:t>
+            </a:r>
+            <a:endParaRPr lang="en-US" sz="1400" b="0" strike="noStrike" spc="-1" dirty="0">
+              <a:solidFill>
+                <a:srgbClr val="000000"/>
+              </a:solidFill>
+              <a:uFill>
+                <a:solidFill>
+                  <a:srgbClr val="FFFFFF"/>
+                </a:solidFill>
+              </a:uFill>
+              <a:latin typeface="Arial"/>
+            </a:endParaRPr>
+          </a:p>
+          <a:p>
+            <a:pPr marL="800280" lvl="1" indent="-342360">
+              <a:lnSpc>
+                <a:spcPct val="100000"/>
+              </a:lnSpc>
+              <a:spcBef>
+                <a:spcPts val="1001"/>
+              </a:spcBef>
+              <a:buClr>
+                <a:srgbClr val="90C226"/>
+              </a:buClr>
+              <a:buSzPct val="80000"/>
+              <a:buFont typeface="Wingdings 3" charset="2"/>
+              <a:buChar char=""/>
+            </a:pPr>
+            <a:r>
+              <a:rPr lang="en-US" sz="1400" b="0" strike="noStrike" spc="-1" dirty="0">
+                <a:solidFill>
+                  <a:srgbClr val="404040"/>
+                </a:solidFill>
+                <a:uFill>
+                  <a:solidFill>
+                    <a:srgbClr val="FFFFFF"/>
+                  </a:solidFill>
+                </a:uFill>
+                <a:latin typeface="Trebuchet MS"/>
+              </a:rPr>
+              <a:t>Wireless and Bluetooth chip</a:t>
+            </a:r>
+          </a:p>
+          <a:p>
+            <a:pPr marL="800280" lvl="1" indent="-342360">
+              <a:lnSpc>
+                <a:spcPct val="100000"/>
+              </a:lnSpc>
+              <a:spcBef>
+                <a:spcPts val="1001"/>
+              </a:spcBef>
+              <a:buClr>
+                <a:srgbClr val="90C226"/>
+              </a:buClr>
+              <a:buSzPct val="80000"/>
+              <a:buFont typeface="Wingdings 3" charset="2"/>
+              <a:buChar char=""/>
+            </a:pPr>
+            <a:r>
+              <a:rPr lang="en-US" sz="1400" spc="-1" dirty="0">
+                <a:solidFill>
+                  <a:srgbClr val="404040"/>
+                </a:solidFill>
+                <a:uFill>
+                  <a:solidFill>
+                    <a:srgbClr val="FFFFFF"/>
+                  </a:solidFill>
+                </a:uFill>
+                <a:latin typeface="Trebuchet MS"/>
+              </a:rPr>
+              <a:t>Full Linux OS</a:t>
+            </a:r>
+          </a:p>
+          <a:p>
+            <a:pPr marL="800280" lvl="1" indent="-342360">
+              <a:lnSpc>
+                <a:spcPct val="100000"/>
+              </a:lnSpc>
+              <a:spcBef>
+                <a:spcPts val="1001"/>
+              </a:spcBef>
+              <a:buClr>
+                <a:srgbClr val="90C226"/>
+              </a:buClr>
+              <a:buSzPct val="80000"/>
+              <a:buFont typeface="Wingdings 3" charset="2"/>
+              <a:buChar char=""/>
+            </a:pPr>
+            <a:r>
+              <a:rPr lang="en-US" sz="1400" b="0" strike="noStrike" spc="-1" dirty="0">
+                <a:solidFill>
+                  <a:srgbClr val="404040"/>
+                </a:solidFill>
+                <a:uFill>
+                  <a:solidFill>
+                    <a:srgbClr val="FFFFFF"/>
+                  </a:solidFill>
+                </a:uFill>
+                <a:latin typeface="Trebuchet MS"/>
+              </a:rPr>
+              <a:t>Running </a:t>
+            </a:r>
+            <a:r>
+              <a:rPr lang="en-US" sz="1400" spc="-1" dirty="0">
+                <a:solidFill>
+                  <a:srgbClr val="404040"/>
+                </a:solidFill>
+                <a:uFill>
+                  <a:solidFill>
+                    <a:srgbClr val="FFFFFF"/>
+                  </a:solidFill>
+                </a:uFill>
+                <a:latin typeface="Trebuchet MS"/>
+              </a:rPr>
+              <a:t>control and web services</a:t>
+            </a:r>
+            <a:endParaRPr lang="en-US" sz="1400" b="0" strike="noStrike" spc="-1" dirty="0">
+              <a:solidFill>
+                <a:srgbClr val="000000"/>
+              </a:solidFill>
+              <a:uFill>
+                <a:solidFill>
+                  <a:srgbClr val="FFFFFF"/>
+                </a:solidFill>
+              </a:uFill>
+              <a:latin typeface="Arial"/>
+            </a:endParaRPr>
+          </a:p>
+        </p:txBody>
+      </p:sp>
+      <p:pic>
+        <p:nvPicPr>
+          <p:cNvPr id="143" name="Picture 2"/>
+          <p:cNvPicPr/>
+          <p:nvPr/>
+        </p:nvPicPr>
+        <p:blipFill>
+          <a:blip r:embed="rId3"/>
+          <a:stretch/>
+        </p:blipFill>
+        <p:spPr>
+          <a:xfrm>
+            <a:off x="5175000" y="1488960"/>
+            <a:ext cx="6586200" cy="3068640"/>
+          </a:xfrm>
+          <a:prstGeom prst="rect">
+            <a:avLst/>
+          </a:prstGeom>
+          <a:ln>
+            <a:noFill/>
+          </a:ln>
+        </p:spPr>
+      </p:pic>
+    </p:spTree>
+    <p:extLst>
+      <p:ext uri="{BB962C8B-B14F-4D97-AF65-F5344CB8AC3E}">
+        <p14:creationId xmlns:p14="http://schemas.microsoft.com/office/powerpoint/2010/main" val="3387748890"/>
+      </p:ext>
+    </p:extLst>
+  </p:cSld>
+  <p:clrMapOvr>
+    <a:masterClrMapping/>
+  </p:clrMapOvr>
+  <p:timing>
+    <p:tnLst>
+      <p:par>
+        <p:cTn id="1" dur="indefinite" restart="never" nodeType="tmRoot">
+          <p:childTnLst>
+            <p:seq>
+              <p:cTn id="2" nodeType="mainSeq"/>
+              <p:prevCondLst>
+                <p:cond evt="onPrev" delay="0">
+                  <p:tgtEl>
+                    <p:sldTgt/>
+                  </p:tgtEl>
+                </p:cond>
+              </p:prevCondLst>
+              <p:nextCondLst>
+                <p:cond evt="onNext" delay="0">
+                  <p:tgtEl>
+                    <p:sldTgt/>
+                  </p:tgtEl>
+                </p:cond>
+              </p:nextCondLst>
+            </p:seq>
+          </p:childTnLst>
+        </p:cTn>
+      </p:par>
+    </p:tnLst>
+  </p:timing>
+</p:sld>
+</file>
+
+<file path=ppt/slides/slide14.xml><?xml version="1.0" encoding="utf-8"?>
+<p:sld xmlns:a="http://schemas.openxmlformats.org/drawingml/2006/main" xmlns:r="http://schemas.openxmlformats.org/officeDocument/2006/relationships" xmlns:p="http://schemas.openxmlformats.org/presentationml/2006/main">
+  <p:cSld>
+    <p:spTree>
+      <p:nvGrpSpPr>
+        <p:cNvPr id="1" name=""/>
+        <p:cNvGrpSpPr/>
+        <p:nvPr/>
+      </p:nvGrpSpPr>
+      <p:grpSpPr>
+        <a:xfrm>
+          <a:off x="0" y="0"/>
+          <a:ext cx="0" cy="0"/>
+          <a:chOff x="0" y="0"/>
+          <a:chExt cx="0" cy="0"/>
+        </a:xfrm>
+      </p:grpSpPr>
+      <p:sp>
+        <p:nvSpPr>
+          <p:cNvPr id="140" name="CustomShape 1"/>
+          <p:cNvSpPr/>
+          <p:nvPr/>
+        </p:nvSpPr>
+        <p:spPr>
+          <a:xfrm>
+            <a:off x="677160" y="609480"/>
+            <a:ext cx="8596080" cy="1320120"/>
+          </a:xfrm>
+          <a:prstGeom prst="rect">
+            <a:avLst/>
+          </a:prstGeom>
+          <a:noFill/>
+          <a:ln>
+            <a:noFill/>
+          </a:ln>
+        </p:spPr>
+        <p:style>
+          <a:lnRef idx="0">
+            <a:scrgbClr r="0" g="0" b="0"/>
+          </a:lnRef>
+          <a:fillRef idx="0">
+            <a:scrgbClr r="0" g="0" b="0"/>
+          </a:fillRef>
+          <a:effectRef idx="0">
+            <a:scrgbClr r="0" g="0" b="0"/>
+          </a:effectRef>
+          <a:fontRef idx="minor"/>
+        </p:style>
+        <p:txBody>
+          <a:bodyPr lIns="90000" tIns="45000" rIns="90000" bIns="45000"/>
+          <a:lstStyle/>
+          <a:p>
+            <a:pPr>
+              <a:lnSpc>
+                <a:spcPct val="100000"/>
+              </a:lnSpc>
+            </a:pPr>
+            <a:r>
+              <a:rPr lang="en-US" sz="3600" spc="-1" dirty="0">
+                <a:solidFill>
+                  <a:srgbClr val="90C226"/>
+                </a:solidFill>
+                <a:uFill>
+                  <a:solidFill>
+                    <a:srgbClr val="FFFFFF"/>
+                  </a:solidFill>
+                </a:uFill>
+                <a:latin typeface="Trebuchet MS"/>
+              </a:rPr>
+              <a:t>LED Library</a:t>
+            </a:r>
+            <a:endParaRPr lang="en-US" sz="3600" b="0" strike="noStrike" spc="-1" dirty="0">
+              <a:solidFill>
+                <a:srgbClr val="000000"/>
+              </a:solidFill>
+              <a:uFill>
+                <a:solidFill>
+                  <a:srgbClr val="FFFFFF"/>
+                </a:solidFill>
+              </a:uFill>
+              <a:latin typeface="Arial"/>
+            </a:endParaRPr>
+          </a:p>
+        </p:txBody>
+      </p:sp>
+      <p:sp>
+        <p:nvSpPr>
+          <p:cNvPr id="141" name="CustomShape 2"/>
+          <p:cNvSpPr/>
+          <p:nvPr/>
+        </p:nvSpPr>
+        <p:spPr>
+          <a:xfrm>
+            <a:off x="677160" y="2160720"/>
+            <a:ext cx="8596080" cy="3880080"/>
+          </a:xfrm>
+          <a:prstGeom prst="rect">
+            <a:avLst/>
+          </a:prstGeom>
+          <a:noFill/>
+          <a:ln>
+            <a:noFill/>
+          </a:ln>
+        </p:spPr>
+        <p:style>
+          <a:lnRef idx="0">
+            <a:scrgbClr r="0" g="0" b="0"/>
+          </a:lnRef>
+          <a:fillRef idx="0">
+            <a:scrgbClr r="0" g="0" b="0"/>
+          </a:fillRef>
+          <a:effectRef idx="0">
+            <a:scrgbClr r="0" g="0" b="0"/>
+          </a:effectRef>
+          <a:fontRef idx="minor"/>
+        </p:style>
+      </p:sp>
+      <p:sp>
+        <p:nvSpPr>
+          <p:cNvPr id="142" name="CustomShape 3"/>
+          <p:cNvSpPr/>
+          <p:nvPr/>
+        </p:nvSpPr>
+        <p:spPr>
+          <a:xfrm>
+            <a:off x="677160" y="1488960"/>
+            <a:ext cx="8596080" cy="3880080"/>
+          </a:xfrm>
+          <a:prstGeom prst="rect">
+            <a:avLst/>
+          </a:prstGeom>
+          <a:noFill/>
+          <a:ln>
+            <a:noFill/>
+          </a:ln>
+        </p:spPr>
+        <p:style>
+          <a:lnRef idx="0">
+            <a:scrgbClr r="0" g="0" b="0"/>
+          </a:lnRef>
+          <a:fillRef idx="0">
+            <a:scrgbClr r="0" g="0" b="0"/>
+          </a:fillRef>
+          <a:effectRef idx="0">
+            <a:scrgbClr r="0" g="0" b="0"/>
+          </a:effectRef>
+          <a:fontRef idx="minor"/>
+        </p:style>
+        <p:txBody>
+          <a:bodyPr lIns="90000" tIns="45000" rIns="90000" bIns="45000"/>
+          <a:lstStyle/>
+          <a:p>
+            <a:pPr marL="343080" indent="-342360">
+              <a:lnSpc>
+                <a:spcPct val="100000"/>
+              </a:lnSpc>
+              <a:spcBef>
+                <a:spcPts val="1001"/>
+              </a:spcBef>
+              <a:buClr>
+                <a:srgbClr val="90C226"/>
+              </a:buClr>
+              <a:buSzPct val="80000"/>
+              <a:buFont typeface="Wingdings 3" charset="2"/>
+              <a:buChar char=""/>
+            </a:pPr>
+            <a:r>
+              <a:rPr lang="en-US" sz="1400" b="0" strike="noStrike" spc="-1" dirty="0" err="1">
+                <a:solidFill>
+                  <a:srgbClr val="404040"/>
+                </a:solidFill>
+                <a:uFill>
+                  <a:solidFill>
+                    <a:srgbClr val="FFFFFF"/>
+                  </a:solidFill>
+                </a:uFill>
+                <a:latin typeface="Trebuchet MS"/>
+              </a:rPr>
+              <a:t>FastLED</a:t>
+            </a:r>
+            <a:endParaRPr lang="en-US" sz="1400" b="0" strike="noStrike" spc="-1" dirty="0">
+              <a:solidFill>
+                <a:srgbClr val="000000"/>
+              </a:solidFill>
+              <a:uFill>
+                <a:solidFill>
+                  <a:srgbClr val="FFFFFF"/>
+                </a:solidFill>
+              </a:uFill>
+              <a:latin typeface="Arial"/>
+            </a:endParaRPr>
+          </a:p>
+          <a:p>
+            <a:pPr marL="800280" lvl="1" indent="-342360">
+              <a:lnSpc>
+                <a:spcPct val="100000"/>
+              </a:lnSpc>
+              <a:spcBef>
+                <a:spcPts val="1001"/>
+              </a:spcBef>
+              <a:buClr>
+                <a:srgbClr val="90C226"/>
+              </a:buClr>
+              <a:buSzPct val="80000"/>
+              <a:buFont typeface="Wingdings 3" charset="2"/>
+              <a:buChar char=""/>
+            </a:pPr>
+            <a:r>
+              <a:rPr lang="en-US" sz="1400" b="0" strike="noStrike" spc="-1" dirty="0">
+                <a:solidFill>
+                  <a:srgbClr val="404040"/>
+                </a:solidFill>
+                <a:uFill>
+                  <a:solidFill>
+                    <a:srgbClr val="FFFFFF"/>
+                  </a:solidFill>
+                </a:uFill>
+                <a:latin typeface="Trebuchet MS"/>
+              </a:rPr>
+              <a:t>Arduino Library</a:t>
+            </a:r>
+          </a:p>
+          <a:p>
+            <a:pPr marL="800280" lvl="1" indent="-342360">
+              <a:lnSpc>
+                <a:spcPct val="100000"/>
+              </a:lnSpc>
+              <a:spcBef>
+                <a:spcPts val="1001"/>
+              </a:spcBef>
+              <a:buClr>
+                <a:srgbClr val="90C226"/>
+              </a:buClr>
+              <a:buSzPct val="80000"/>
+              <a:buFont typeface="Wingdings 3" charset="2"/>
+              <a:buChar char=""/>
+            </a:pPr>
+            <a:r>
+              <a:rPr lang="en-US" sz="1400" spc="-1" dirty="0">
+                <a:solidFill>
+                  <a:srgbClr val="404040"/>
+                </a:solidFill>
+                <a:uFill>
+                  <a:solidFill>
+                    <a:srgbClr val="FFFFFF"/>
+                  </a:solidFill>
+                </a:uFill>
+                <a:latin typeface="Trebuchet MS"/>
+              </a:rPr>
+              <a:t>Supports many different LEDs</a:t>
+            </a:r>
+            <a:endParaRPr lang="en-US" sz="1400" b="0" strike="noStrike" spc="-1" dirty="0">
+              <a:solidFill>
+                <a:srgbClr val="000000"/>
+              </a:solidFill>
+              <a:uFill>
+                <a:solidFill>
+                  <a:srgbClr val="FFFFFF"/>
+                </a:solidFill>
+              </a:uFill>
+              <a:latin typeface="Arial"/>
+            </a:endParaRPr>
+          </a:p>
+          <a:p>
+            <a:pPr marL="800280" lvl="1" indent="-342360">
+              <a:lnSpc>
+                <a:spcPct val="100000"/>
+              </a:lnSpc>
+              <a:spcBef>
+                <a:spcPts val="1001"/>
+              </a:spcBef>
+              <a:buClr>
+                <a:srgbClr val="90C226"/>
+              </a:buClr>
+              <a:buSzPct val="80000"/>
+              <a:buFont typeface="Wingdings 3" charset="2"/>
+              <a:buChar char=""/>
+            </a:pPr>
+            <a:r>
+              <a:rPr lang="en-US" sz="1400" b="0" strike="noStrike" spc="-1" dirty="0">
+                <a:solidFill>
+                  <a:srgbClr val="404040"/>
+                </a:solidFill>
+                <a:uFill>
+                  <a:solidFill>
+                    <a:srgbClr val="FFFFFF"/>
+                  </a:solidFill>
+                </a:uFill>
+                <a:latin typeface="Trebuchet MS"/>
+              </a:rPr>
+              <a:t>Quick development.</a:t>
+            </a:r>
+          </a:p>
+          <a:p>
+            <a:pPr marL="800280" lvl="1" indent="-342360">
+              <a:lnSpc>
+                <a:spcPct val="100000"/>
+              </a:lnSpc>
+              <a:spcBef>
+                <a:spcPts val="1001"/>
+              </a:spcBef>
+              <a:buClr>
+                <a:srgbClr val="90C226"/>
+              </a:buClr>
+              <a:buSzPct val="80000"/>
+              <a:buFont typeface="Wingdings 3" charset="2"/>
+              <a:buChar char=""/>
+            </a:pPr>
+            <a:r>
+              <a:rPr lang="en-US" sz="1400" spc="-1" dirty="0">
+                <a:solidFill>
+                  <a:srgbClr val="404040"/>
+                </a:solidFill>
+                <a:uFill>
+                  <a:solidFill>
+                    <a:srgbClr val="FFFFFF"/>
+                  </a:solidFill>
+                </a:uFill>
+                <a:latin typeface="Trebuchet MS"/>
+              </a:rPr>
+              <a:t>Running on the </a:t>
+            </a:r>
+            <a:r>
+              <a:rPr lang="en-US" sz="1400" spc="-1">
+                <a:solidFill>
+                  <a:srgbClr val="404040"/>
+                </a:solidFill>
+                <a:uFill>
+                  <a:solidFill>
+                    <a:srgbClr val="FFFFFF"/>
+                  </a:solidFill>
+                </a:uFill>
+                <a:latin typeface="Trebuchet MS"/>
+              </a:rPr>
+              <a:t>LED controller</a:t>
+            </a:r>
+            <a:endParaRPr lang="en-US" sz="1400" b="0" strike="noStrike" spc="-1" dirty="0">
+              <a:solidFill>
+                <a:srgbClr val="000000"/>
+              </a:solidFill>
+              <a:uFill>
+                <a:solidFill>
+                  <a:srgbClr val="FFFFFF"/>
+                </a:solidFill>
+              </a:uFill>
+              <a:latin typeface="Arial"/>
+            </a:endParaRPr>
+          </a:p>
+          <a:p>
+            <a:pPr>
+              <a:lnSpc>
+                <a:spcPct val="100000"/>
+              </a:lnSpc>
+              <a:spcBef>
+                <a:spcPts val="1001"/>
+              </a:spcBef>
+            </a:pPr>
+            <a:endParaRPr lang="en-US" sz="1400" b="0" strike="noStrike" spc="-1" dirty="0">
+              <a:solidFill>
+                <a:srgbClr val="000000"/>
+              </a:solidFill>
+              <a:uFill>
+                <a:solidFill>
+                  <a:srgbClr val="FFFFFF"/>
+                </a:solidFill>
+              </a:uFill>
+              <a:latin typeface="Arial"/>
+            </a:endParaRPr>
+          </a:p>
+        </p:txBody>
+      </p:sp>
+    </p:spTree>
+    <p:extLst>
+      <p:ext uri="{BB962C8B-B14F-4D97-AF65-F5344CB8AC3E}">
+        <p14:creationId xmlns:p14="http://schemas.microsoft.com/office/powerpoint/2010/main" val="410648730"/>
+      </p:ext>
+    </p:extLst>
+  </p:cSld>
+  <p:clrMapOvr>
+    <a:masterClrMapping/>
+  </p:clrMapOvr>
+  <p:timing>
+    <p:tnLst>
+      <p:par>
+        <p:cTn id="1" dur="indefinite" restart="never" nodeType="tmRoot">
+          <p:childTnLst>
+            <p:seq>
+              <p:cTn id="2" nodeType="mainSeq"/>
+              <p:prevCondLst>
+                <p:cond evt="onPrev" delay="0">
+                  <p:tgtEl>
+                    <p:sldTgt/>
+                  </p:tgtEl>
+                </p:cond>
+              </p:prevCondLst>
+              <p:nextCondLst>
+                <p:cond evt="onNext" delay="0">
+                  <p:tgtEl>
+                    <p:sldTgt/>
+                  </p:tgtEl>
+                </p:cond>
+              </p:nextCondLst>
+            </p:seq>
+          </p:childTnLst>
+        </p:cTn>
+      </p:par>
+    </p:tnLst>
+  </p:timing>
+</p:sld>
+</file>
+
+<file path=ppt/slides/slide15.xml><?xml version="1.0" encoding="utf-8"?>
 <p:sld xmlns:a="http://schemas.openxmlformats.org/drawingml/2006/main" xmlns:r="http://schemas.openxmlformats.org/officeDocument/2006/relationships" xmlns:p="http://schemas.openxmlformats.org/presentationml/2006/main">
   <p:cSld>
     <p:spTree>

</xml_diff>

<commit_message>
Broke up slides, added stretch goals
</commit_message>
<xml_diff>
--- a/Documents/PresentationFall/Fall Presentation.pptx
+++ b/Documents/PresentationFall/Fall Presentation.pptx
@@ -6,24 +6,26 @@
     <p:sldMasterId id="2147483708" r:id="rId2"/>
   </p:sldMasterIdLst>
   <p:notesMasterIdLst>
-    <p:notesMasterId r:id="rId18"/>
+    <p:notesMasterId r:id="rId20"/>
   </p:notesMasterIdLst>
   <p:sldIdLst>
     <p:sldId id="256" r:id="rId3"/>
     <p:sldId id="267" r:id="rId4"/>
-    <p:sldId id="257" r:id="rId5"/>
-    <p:sldId id="258" r:id="rId6"/>
-    <p:sldId id="259" r:id="rId7"/>
-    <p:sldId id="260" r:id="rId8"/>
-    <p:sldId id="261" r:id="rId9"/>
-    <p:sldId id="262" r:id="rId10"/>
-    <p:sldId id="266" r:id="rId11"/>
-    <p:sldId id="265" r:id="rId12"/>
-    <p:sldId id="268" r:id="rId13"/>
-    <p:sldId id="269" r:id="rId14"/>
-    <p:sldId id="271" r:id="rId15"/>
-    <p:sldId id="270" r:id="rId16"/>
-    <p:sldId id="263" r:id="rId17"/>
+    <p:sldId id="272" r:id="rId5"/>
+    <p:sldId id="273" r:id="rId6"/>
+    <p:sldId id="258" r:id="rId7"/>
+    <p:sldId id="259" r:id="rId8"/>
+    <p:sldId id="260" r:id="rId9"/>
+    <p:sldId id="261" r:id="rId10"/>
+    <p:sldId id="262" r:id="rId11"/>
+    <p:sldId id="266" r:id="rId12"/>
+    <p:sldId id="265" r:id="rId13"/>
+    <p:sldId id="268" r:id="rId14"/>
+    <p:sldId id="269" r:id="rId15"/>
+    <p:sldId id="271" r:id="rId16"/>
+    <p:sldId id="270" r:id="rId17"/>
+    <p:sldId id="263" r:id="rId18"/>
+    <p:sldId id="275" r:id="rId19"/>
   </p:sldIdLst>
   <p:sldSz cx="12192000" cy="6858000"/>
   <p:notesSz cx="7772400" cy="10058400"/>
@@ -1023,7 +1025,7 @@
                 <a:latin typeface="+mn-lt"/>
                 <a:ea typeface="+mn-ea"/>
               </a:rPr>
-              <a:t>11</a:t>
+              <a:t>12</a:t>
             </a:fld>
             <a:endParaRPr lang="en-US" sz="1200" b="0" strike="noStrike" spc="-1">
               <a:solidFill>
@@ -1150,7 +1152,7 @@
                 <a:latin typeface="+mn-lt"/>
                 <a:ea typeface="+mn-ea"/>
               </a:rPr>
-              <a:t>12</a:t>
+              <a:t>13</a:t>
             </a:fld>
             <a:endParaRPr lang="en-US" sz="1200" b="0" strike="noStrike" spc="-1">
               <a:solidFill>
@@ -1277,7 +1279,7 @@
                 <a:latin typeface="+mn-lt"/>
                 <a:ea typeface="+mn-ea"/>
               </a:rPr>
-              <a:t>13</a:t>
+              <a:t>14</a:t>
             </a:fld>
             <a:endParaRPr lang="en-US" sz="1200" b="0" strike="noStrike" spc="-1">
               <a:solidFill>
@@ -1404,7 +1406,7 @@
                 <a:latin typeface="+mn-lt"/>
                 <a:ea typeface="+mn-ea"/>
               </a:rPr>
-              <a:t>14</a:t>
+              <a:t>15</a:t>
             </a:fld>
             <a:endParaRPr lang="en-US" sz="1200" b="0" strike="noStrike" spc="-1">
               <a:solidFill>
@@ -15163,6 +15165,199 @@
         </p:blipFill>
         <p:spPr>
           <a:xfrm>
+            <a:off x="1074137" y="1337090"/>
+            <a:ext cx="7400997" cy="5130103"/>
+          </a:xfrm>
+          <a:prstGeom prst="rect">
+            <a:avLst/>
+          </a:prstGeom>
+        </p:spPr>
+      </p:pic>
+    </p:spTree>
+    <p:extLst>
+      <p:ext uri="{BB962C8B-B14F-4D97-AF65-F5344CB8AC3E}">
+        <p14:creationId xmlns:p14="http://schemas.microsoft.com/office/powerpoint/2010/main" val="2420000067"/>
+      </p:ext>
+    </p:extLst>
+  </p:cSld>
+  <p:clrMapOvr>
+    <a:masterClrMapping/>
+  </p:clrMapOvr>
+  <p:timing>
+    <p:tnLst>
+      <p:par>
+        <p:cTn id="1" dur="indefinite" restart="never" nodeType="tmRoot">
+          <p:childTnLst>
+            <p:seq>
+              <p:cTn id="2" nodeType="mainSeq"/>
+              <p:prevCondLst>
+                <p:cond evt="onPrev" delay="0">
+                  <p:tgtEl>
+                    <p:sldTgt/>
+                  </p:tgtEl>
+                </p:cond>
+              </p:prevCondLst>
+              <p:nextCondLst>
+                <p:cond evt="onNext" delay="0">
+                  <p:tgtEl>
+                    <p:sldTgt/>
+                  </p:tgtEl>
+                </p:cond>
+              </p:nextCondLst>
+            </p:seq>
+          </p:childTnLst>
+        </p:cTn>
+      </p:par>
+    </p:tnLst>
+  </p:timing>
+</p:sld>
+</file>
+
+<file path=ppt/slides/slide11.xml><?xml version="1.0" encoding="utf-8"?>
+<p:sld xmlns:a="http://schemas.openxmlformats.org/drawingml/2006/main" xmlns:r="http://schemas.openxmlformats.org/officeDocument/2006/relationships" xmlns:p="http://schemas.openxmlformats.org/presentationml/2006/main">
+  <p:cSld>
+    <p:spTree>
+      <p:nvGrpSpPr>
+        <p:cNvPr id="1" name=""/>
+        <p:cNvGrpSpPr/>
+        <p:nvPr/>
+      </p:nvGrpSpPr>
+      <p:grpSpPr>
+        <a:xfrm>
+          <a:off x="0" y="0"/>
+          <a:ext cx="0" cy="0"/>
+          <a:chOff x="0" y="0"/>
+          <a:chExt cx="0" cy="0"/>
+        </a:xfrm>
+      </p:grpSpPr>
+      <p:sp>
+        <p:nvSpPr>
+          <p:cNvPr id="135" name="CustomShape 1"/>
+          <p:cNvSpPr/>
+          <p:nvPr/>
+        </p:nvSpPr>
+        <p:spPr>
+          <a:xfrm>
+            <a:off x="677160" y="609480"/>
+            <a:ext cx="8596080" cy="1320120"/>
+          </a:xfrm>
+          <a:prstGeom prst="rect">
+            <a:avLst/>
+          </a:prstGeom>
+          <a:noFill/>
+          <a:ln>
+            <a:noFill/>
+          </a:ln>
+        </p:spPr>
+        <p:style>
+          <a:lnRef idx="0">
+            <a:scrgbClr r="0" g="0" b="0"/>
+          </a:lnRef>
+          <a:fillRef idx="0">
+            <a:scrgbClr r="0" g="0" b="0"/>
+          </a:fillRef>
+          <a:effectRef idx="0">
+            <a:scrgbClr r="0" g="0" b="0"/>
+          </a:effectRef>
+          <a:fontRef idx="minor"/>
+        </p:style>
+        <p:txBody>
+          <a:bodyPr lIns="90000" tIns="45000" rIns="90000" bIns="45000"/>
+          <a:lstStyle/>
+          <a:p>
+            <a:pPr>
+              <a:lnSpc>
+                <a:spcPct val="100000"/>
+              </a:lnSpc>
+            </a:pPr>
+            <a:r>
+              <a:rPr lang="en-US" sz="3600" b="0" strike="noStrike" spc="-1">
+                <a:solidFill>
+                  <a:srgbClr val="90C226"/>
+                </a:solidFill>
+                <a:uFill>
+                  <a:solidFill>
+                    <a:srgbClr val="FFFFFF"/>
+                  </a:solidFill>
+                </a:uFill>
+                <a:latin typeface="Trebuchet MS"/>
+              </a:rPr>
+              <a:t>System Architecture</a:t>
+            </a:r>
+            <a:endParaRPr lang="en-US" sz="3600" b="0" strike="noStrike" spc="-1">
+              <a:solidFill>
+                <a:srgbClr val="000000"/>
+              </a:solidFill>
+              <a:uFill>
+                <a:solidFill>
+                  <a:srgbClr val="FFFFFF"/>
+                </a:solidFill>
+              </a:uFill>
+              <a:latin typeface="Arial"/>
+            </a:endParaRPr>
+          </a:p>
+        </p:txBody>
+      </p:sp>
+      <p:sp>
+        <p:nvSpPr>
+          <p:cNvPr id="136" name="CustomShape 2"/>
+          <p:cNvSpPr/>
+          <p:nvPr/>
+        </p:nvSpPr>
+        <p:spPr>
+          <a:xfrm>
+            <a:off x="677160" y="2160720"/>
+            <a:ext cx="8596080" cy="3880080"/>
+          </a:xfrm>
+          <a:prstGeom prst="rect">
+            <a:avLst/>
+          </a:prstGeom>
+          <a:noFill/>
+          <a:ln>
+            <a:noFill/>
+          </a:ln>
+        </p:spPr>
+        <p:style>
+          <a:lnRef idx="0">
+            <a:scrgbClr r="0" g="0" b="0"/>
+          </a:lnRef>
+          <a:fillRef idx="0">
+            <a:scrgbClr r="0" g="0" b="0"/>
+          </a:fillRef>
+          <a:effectRef idx="0">
+            <a:scrgbClr r="0" g="0" b="0"/>
+          </a:effectRef>
+          <a:fontRef idx="minor"/>
+        </p:style>
+      </p:sp>
+      <p:pic>
+        <p:nvPicPr>
+          <p:cNvPr id="3" name="Picture 2">
+            <a:extLst>
+              <a:ext uri="{FF2B5EF4-FFF2-40B4-BE49-F238E27FC236}">
+                <a16:creationId xmlns:a16="http://schemas.microsoft.com/office/drawing/2014/main" id="{E723A669-9447-498A-933D-1CC50385868E}"/>
+              </a:ext>
+            </a:extLst>
+          </p:cNvPr>
+          <p:cNvPicPr>
+            <a:picLocks noChangeAspect="1"/>
+          </p:cNvPicPr>
+          <p:nvPr/>
+        </p:nvPicPr>
+        <p:blipFill>
+          <a:blip r:embed="rId2">
+            <a:extLst>
+              <a:ext uri="{28A0092B-C50C-407E-A947-70E740481C1C}">
+                <a14:useLocalDpi xmlns:a14="http://schemas.microsoft.com/office/drawing/2010/main" val="0"/>
+              </a:ext>
+            </a:extLst>
+          </a:blip>
+          <a:stretch>
+            <a:fillRect/>
+          </a:stretch>
+        </p:blipFill>
+        <p:spPr>
+          <a:xfrm>
             <a:off x="1074137" y="1663267"/>
             <a:ext cx="7400997" cy="4477750"/>
           </a:xfrm>
@@ -15211,7 +15406,7 @@
 </p:sld>
 </file>
 
-<file path=ppt/slides/slide11.xml><?xml version="1.0" encoding="utf-8"?>
+<file path=ppt/slides/slide12.xml><?xml version="1.0" encoding="utf-8"?>
 <p:sld xmlns:a="http://schemas.openxmlformats.org/drawingml/2006/main" xmlns:r="http://schemas.openxmlformats.org/officeDocument/2006/relationships" xmlns:p="http://schemas.openxmlformats.org/presentationml/2006/main">
   <p:cSld>
     <p:spTree>
@@ -15706,7 +15901,7 @@
 </p:sld>
 </file>
 
-<file path=ppt/slides/slide12.xml><?xml version="1.0" encoding="utf-8"?>
+<file path=ppt/slides/slide13.xml><?xml version="1.0" encoding="utf-8"?>
 <p:sld xmlns:a="http://schemas.openxmlformats.org/drawingml/2006/main" xmlns:r="http://schemas.openxmlformats.org/officeDocument/2006/relationships" xmlns:p="http://schemas.openxmlformats.org/presentationml/2006/main">
   <p:cSld>
     <p:spTree>
@@ -16164,7 +16359,7 @@
 </p:sld>
 </file>
 
-<file path=ppt/slides/slide13.xml><?xml version="1.0" encoding="utf-8"?>
+<file path=ppt/slides/slide14.xml><?xml version="1.0" encoding="utf-8"?>
 <p:sld xmlns:a="http://schemas.openxmlformats.org/drawingml/2006/main" xmlns:r="http://schemas.openxmlformats.org/officeDocument/2006/relationships" xmlns:p="http://schemas.openxmlformats.org/presentationml/2006/main">
   <p:cSld>
     <p:spTree>
@@ -16577,7 +16772,7 @@
 </p:sld>
 </file>
 
-<file path=ppt/slides/slide14.xml><?xml version="1.0" encoding="utf-8"?>
+<file path=ppt/slides/slide15.xml><?xml version="1.0" encoding="utf-8"?>
 <p:sld xmlns:a="http://schemas.openxmlformats.org/drawingml/2006/main" xmlns:r="http://schemas.openxmlformats.org/officeDocument/2006/relationships" xmlns:p="http://schemas.openxmlformats.org/presentationml/2006/main">
   <p:cSld>
     <p:spTree>
@@ -16988,7 +17183,7 @@
 </p:sld>
 </file>
 
-<file path=ppt/slides/slide15.xml><?xml version="1.0" encoding="utf-8"?>
+<file path=ppt/slides/slide16.xml><?xml version="1.0" encoding="utf-8"?>
 <p:sld xmlns:a="http://schemas.openxmlformats.org/drawingml/2006/main" xmlns:r="http://schemas.openxmlformats.org/officeDocument/2006/relationships" xmlns:p="http://schemas.openxmlformats.org/presentationml/2006/main">
   <p:cSld>
     <p:spTree>
@@ -17046,7 +17241,7 @@
               </a:lnSpc>
             </a:pPr>
             <a:r>
-              <a:rPr lang="en-US" sz="3600" b="0" strike="noStrike" spc="-1">
+              <a:rPr lang="en-US" sz="3600" b="0" strike="noStrike" spc="-1" dirty="0">
                 <a:solidFill>
                   <a:srgbClr val="90C226"/>
                 </a:solidFill>
@@ -17059,7 +17254,7 @@
               </a:rPr>
               <a:t>Conclusion</a:t>
             </a:r>
-            <a:endParaRPr lang="en-US" sz="3600" b="0" strike="noStrike" spc="-1">
+            <a:endParaRPr lang="en-US" sz="3600" b="0" strike="noStrike" spc="-1" dirty="0">
               <a:solidFill>
                 <a:srgbClr val="000000"/>
               </a:solidFill>
@@ -17155,7 +17350,7 @@
               <a:buChar char=""/>
             </a:pPr>
             <a:r>
-              <a:rPr lang="en-US" sz="1400" b="0" strike="noStrike" spc="-1">
+              <a:rPr lang="en-US" sz="1400" b="0" strike="noStrike" spc="-1" dirty="0">
                 <a:solidFill>
                   <a:srgbClr val="404040"/>
                 </a:solidFill>
@@ -17168,7 +17363,7 @@
               </a:rPr>
               <a:t>Goals</a:t>
             </a:r>
-            <a:endParaRPr lang="en-US" sz="1400" b="0" strike="noStrike" spc="-1">
+            <a:endParaRPr lang="en-US" sz="1400" b="0" strike="noStrike" spc="-1" dirty="0">
               <a:solidFill>
                 <a:srgbClr val="000000"/>
               </a:solidFill>
@@ -17196,7 +17391,7 @@
               <a:buChar char=""/>
             </a:pPr>
             <a:r>
-              <a:rPr lang="en-US" sz="1400" b="0" strike="noStrike" spc="-1">
+              <a:rPr lang="en-US" sz="1400" b="0" strike="noStrike" spc="-1" dirty="0">
                 <a:solidFill>
                   <a:srgbClr val="404040"/>
                 </a:solidFill>
@@ -17209,7 +17404,7 @@
               </a:rPr>
               <a:t>Timeline</a:t>
             </a:r>
-            <a:endParaRPr lang="en-US" sz="1400" b="0" strike="noStrike" spc="-1">
+            <a:endParaRPr lang="en-US" sz="1400" b="0" strike="noStrike" spc="-1" dirty="0">
               <a:solidFill>
                 <a:srgbClr val="000000"/>
               </a:solidFill>
@@ -17237,7 +17432,7 @@
               <a:buChar char=""/>
             </a:pPr>
             <a:r>
-              <a:rPr lang="en-US" sz="1400" b="0" strike="noStrike" spc="-1">
+              <a:rPr lang="en-US" sz="1400" b="0" strike="noStrike" spc="-1" dirty="0">
                 <a:solidFill>
                   <a:srgbClr val="404040"/>
                 </a:solidFill>
@@ -17250,7 +17445,7 @@
               </a:rPr>
               <a:t>Web service</a:t>
             </a:r>
-            <a:endParaRPr lang="en-US" sz="1400" b="0" strike="noStrike" spc="-1">
+            <a:endParaRPr lang="en-US" sz="1400" b="0" strike="noStrike" spc="-1" dirty="0">
               <a:solidFill>
                 <a:srgbClr val="000000"/>
               </a:solidFill>
@@ -17278,7 +17473,7 @@
               <a:buChar char=""/>
             </a:pPr>
             <a:r>
-              <a:rPr lang="en-US" sz="1400" b="0" strike="noStrike" spc="-1">
+              <a:rPr lang="en-US" sz="1400" b="0" strike="noStrike" spc="-1" dirty="0">
                 <a:solidFill>
                   <a:srgbClr val="404040"/>
                 </a:solidFill>
@@ -17291,7 +17486,7 @@
               </a:rPr>
               <a:t>Command line</a:t>
             </a:r>
-            <a:endParaRPr lang="en-US" sz="1400" b="0" strike="noStrike" spc="-1">
+            <a:endParaRPr lang="en-US" sz="1400" b="0" strike="noStrike" spc="-1" dirty="0">
               <a:solidFill>
                 <a:srgbClr val="000000"/>
               </a:solidFill>
@@ -17319,7 +17514,7 @@
               <a:buChar char=""/>
             </a:pPr>
             <a:r>
-              <a:rPr lang="en-US" sz="1400" b="0" strike="noStrike" spc="-1">
+              <a:rPr lang="en-US" sz="1400" b="0" strike="noStrike" spc="-1" dirty="0">
                 <a:solidFill>
                   <a:srgbClr val="404040"/>
                 </a:solidFill>
@@ -17332,7 +17527,7 @@
               </a:rPr>
               <a:t>Web Interface</a:t>
             </a:r>
-            <a:endParaRPr lang="en-US" sz="1400" b="0" strike="noStrike" spc="-1">
+            <a:endParaRPr lang="en-US" sz="1400" b="0" strike="noStrike" spc="-1" dirty="0">
               <a:solidFill>
                 <a:srgbClr val="000000"/>
               </a:solidFill>
@@ -17360,7 +17555,7 @@
               <a:buChar char=""/>
             </a:pPr>
             <a:r>
-              <a:rPr lang="en-US" sz="1400" b="0" strike="noStrike" spc="-1">
+              <a:rPr lang="en-US" sz="1400" b="0" strike="noStrike" spc="-1" dirty="0">
                 <a:solidFill>
                   <a:srgbClr val="404040"/>
                 </a:solidFill>
@@ -17373,7 +17568,7 @@
               </a:rPr>
               <a:t>System architecture</a:t>
             </a:r>
-            <a:endParaRPr lang="en-US" sz="1400" b="0" strike="noStrike" spc="-1">
+            <a:endParaRPr lang="en-US" sz="1400" b="0" strike="noStrike" spc="-1" dirty="0">
               <a:solidFill>
                 <a:srgbClr val="000000"/>
               </a:solidFill>
@@ -17401,7 +17596,7 @@
               <a:buChar char=""/>
             </a:pPr>
             <a:r>
-              <a:rPr lang="en-US" sz="1400" b="0" strike="noStrike" spc="-1">
+              <a:rPr lang="en-US" sz="1400" b="0" strike="noStrike" spc="-1" dirty="0">
                 <a:solidFill>
                   <a:srgbClr val="404040"/>
                 </a:solidFill>
@@ -17414,7 +17609,7 @@
               </a:rPr>
               <a:t>Hardware</a:t>
             </a:r>
-            <a:endParaRPr lang="en-US" sz="1400" b="0" strike="noStrike" spc="-1">
+            <a:endParaRPr lang="en-US" sz="1400" b="0" strike="noStrike" spc="-1" dirty="0">
               <a:solidFill>
                 <a:srgbClr val="000000"/>
               </a:solidFill>
@@ -17435,7 +17630,7 @@
                 <a:spcPts val="1001"/>
               </a:spcBef>
             </a:pPr>
-            <a:endParaRPr lang="en-US" sz="1400" b="0" strike="noStrike" spc="-1">
+            <a:endParaRPr lang="en-US" sz="1400" b="0" strike="noStrike" spc="-1" dirty="0">
               <a:solidFill>
                 <a:srgbClr val="000000"/>
               </a:solidFill>
@@ -17456,7 +17651,7 @@
                 <a:spcPts val="1001"/>
               </a:spcBef>
             </a:pPr>
-            <a:endParaRPr lang="en-US" sz="1400" b="0" strike="noStrike" spc="-1">
+            <a:endParaRPr lang="en-US" sz="1400" b="0" strike="noStrike" spc="-1" dirty="0">
               <a:solidFill>
                 <a:srgbClr val="000000"/>
               </a:solidFill>
@@ -17471,6 +17666,735 @@
         </p:txBody>
       </p:sp>
     </p:spTree>
+  </p:cSld>
+  <p:clrMapOvr>
+    <a:masterClrMapping/>
+  </p:clrMapOvr>
+  <p:timing>
+    <p:tnLst>
+      <p:par>
+        <p:cTn id="1" dur="indefinite" restart="never" nodeType="tmRoot">
+          <p:childTnLst>
+            <p:seq>
+              <p:cTn id="2" nodeType="mainSeq"/>
+              <p:prevCondLst>
+                <p:cond evt="onPrev" delay="0">
+                  <p:tgtEl>
+                    <p:sldTgt/>
+                  </p:tgtEl>
+                </p:cond>
+              </p:prevCondLst>
+              <p:nextCondLst>
+                <p:cond evt="onNext" delay="0">
+                  <p:tgtEl>
+                    <p:sldTgt/>
+                  </p:tgtEl>
+                </p:cond>
+              </p:nextCondLst>
+            </p:seq>
+          </p:childTnLst>
+        </p:cTn>
+      </p:par>
+    </p:tnLst>
+  </p:timing>
+</p:sld>
+</file>
+
+<file path=ppt/slides/slide17.xml><?xml version="1.0" encoding="utf-8"?>
+<p:sld xmlns:a="http://schemas.openxmlformats.org/drawingml/2006/main" xmlns:r="http://schemas.openxmlformats.org/officeDocument/2006/relationships" xmlns:p="http://schemas.openxmlformats.org/presentationml/2006/main">
+  <p:cSld>
+    <p:spTree>
+      <p:nvGrpSpPr>
+        <p:cNvPr id="1" name=""/>
+        <p:cNvGrpSpPr/>
+        <p:nvPr/>
+      </p:nvGrpSpPr>
+      <p:grpSpPr>
+        <a:xfrm>
+          <a:off x="0" y="0"/>
+          <a:ext cx="0" cy="0"/>
+          <a:chOff x="0" y="0"/>
+          <a:chExt cx="0" cy="0"/>
+        </a:xfrm>
+      </p:grpSpPr>
+      <p:sp>
+        <p:nvSpPr>
+          <p:cNvPr id="137" name="CustomShape 1"/>
+          <p:cNvSpPr/>
+          <p:nvPr/>
+        </p:nvSpPr>
+        <p:spPr>
+          <a:xfrm>
+            <a:off x="677160" y="609480"/>
+            <a:ext cx="8596080" cy="1320120"/>
+          </a:xfrm>
+          <a:prstGeom prst="rect">
+            <a:avLst/>
+          </a:prstGeom>
+          <a:noFill/>
+          <a:ln>
+            <a:noFill/>
+          </a:ln>
+        </p:spPr>
+        <p:style>
+          <a:lnRef idx="0">
+            <a:scrgbClr r="0" g="0" b="0"/>
+          </a:lnRef>
+          <a:fillRef idx="0">
+            <a:scrgbClr r="0" g="0" b="0"/>
+          </a:fillRef>
+          <a:effectRef idx="0">
+            <a:scrgbClr r="0" g="0" b="0"/>
+          </a:effectRef>
+          <a:fontRef idx="minor"/>
+        </p:style>
+        <p:txBody>
+          <a:bodyPr lIns="90000" tIns="45000" rIns="90000" bIns="45000"/>
+          <a:lstStyle/>
+          <a:p>
+            <a:pPr marL="0" marR="0" lvl="0" indent="0" algn="l" defTabSz="914400" rtl="0" eaLnBrk="1" fontAlgn="auto" latinLnBrk="0" hangingPunct="1">
+              <a:lnSpc>
+                <a:spcPct val="100000"/>
+              </a:lnSpc>
+              <a:spcBef>
+                <a:spcPts val="0"/>
+              </a:spcBef>
+              <a:spcAft>
+                <a:spcPts val="0"/>
+              </a:spcAft>
+              <a:buClrTx/>
+              <a:buSzTx/>
+              <a:buFontTx/>
+              <a:buNone/>
+              <a:tabLst/>
+              <a:defRPr/>
+            </a:pPr>
+            <a:r>
+              <a:rPr lang="en-US" sz="3600" spc="-1" dirty="0">
+                <a:solidFill>
+                  <a:srgbClr val="90C226"/>
+                </a:solidFill>
+                <a:uFill>
+                  <a:solidFill>
+                    <a:srgbClr val="FFFFFF"/>
+                  </a:solidFill>
+                </a:uFill>
+                <a:latin typeface="Trebuchet MS"/>
+              </a:rPr>
+              <a:t>Stretch Goals</a:t>
+            </a:r>
+            <a:endParaRPr kumimoji="0" lang="en-US" sz="3600" b="0" i="0" u="none" strike="noStrike" kern="1200" cap="none" spc="-1" normalizeH="0" baseline="0" noProof="0" dirty="0">
+              <a:ln>
+                <a:noFill/>
+              </a:ln>
+              <a:solidFill>
+                <a:srgbClr val="000000"/>
+              </a:solidFill>
+              <a:effectLst/>
+              <a:uLnTx/>
+              <a:uFill>
+                <a:solidFill>
+                  <a:srgbClr val="FFFFFF"/>
+                </a:solidFill>
+              </a:uFill>
+              <a:latin typeface="Arial"/>
+              <a:ea typeface="+mn-ea"/>
+              <a:cs typeface="+mn-cs"/>
+            </a:endParaRPr>
+          </a:p>
+        </p:txBody>
+      </p:sp>
+      <p:sp>
+        <p:nvSpPr>
+          <p:cNvPr id="138" name="CustomShape 2"/>
+          <p:cNvSpPr/>
+          <p:nvPr/>
+        </p:nvSpPr>
+        <p:spPr>
+          <a:xfrm>
+            <a:off x="677160" y="1488960"/>
+            <a:ext cx="8596080" cy="3880080"/>
+          </a:xfrm>
+          <a:prstGeom prst="rect">
+            <a:avLst/>
+          </a:prstGeom>
+          <a:noFill/>
+          <a:ln>
+            <a:noFill/>
+          </a:ln>
+        </p:spPr>
+        <p:style>
+          <a:lnRef idx="0">
+            <a:scrgbClr r="0" g="0" b="0"/>
+          </a:lnRef>
+          <a:fillRef idx="0">
+            <a:scrgbClr r="0" g="0" b="0"/>
+          </a:fillRef>
+          <a:effectRef idx="0">
+            <a:scrgbClr r="0" g="0" b="0"/>
+          </a:effectRef>
+          <a:fontRef idx="minor"/>
+        </p:style>
+      </p:sp>
+      <p:sp>
+        <p:nvSpPr>
+          <p:cNvPr id="139" name="CustomShape 3"/>
+          <p:cNvSpPr/>
+          <p:nvPr/>
+        </p:nvSpPr>
+        <p:spPr>
+          <a:xfrm>
+            <a:off x="677160" y="1475280"/>
+            <a:ext cx="8596080" cy="3880080"/>
+          </a:xfrm>
+          <a:prstGeom prst="rect">
+            <a:avLst/>
+          </a:prstGeom>
+          <a:noFill/>
+          <a:ln>
+            <a:noFill/>
+          </a:ln>
+        </p:spPr>
+        <p:style>
+          <a:lnRef idx="0">
+            <a:scrgbClr r="0" g="0" b="0"/>
+          </a:lnRef>
+          <a:fillRef idx="0">
+            <a:scrgbClr r="0" g="0" b="0"/>
+          </a:fillRef>
+          <a:effectRef idx="0">
+            <a:scrgbClr r="0" g="0" b="0"/>
+          </a:effectRef>
+          <a:fontRef idx="minor"/>
+        </p:style>
+        <p:txBody>
+          <a:bodyPr lIns="90000" tIns="45000" rIns="90000" bIns="45000"/>
+          <a:lstStyle/>
+          <a:p>
+            <a:pPr marL="343080" marR="0" lvl="0" indent="-342360" algn="l" defTabSz="914400" rtl="0" eaLnBrk="1" fontAlgn="auto" latinLnBrk="0" hangingPunct="1">
+              <a:lnSpc>
+                <a:spcPct val="100000"/>
+              </a:lnSpc>
+              <a:spcBef>
+                <a:spcPts val="1001"/>
+              </a:spcBef>
+              <a:spcAft>
+                <a:spcPts val="0"/>
+              </a:spcAft>
+              <a:buClr>
+                <a:srgbClr val="90C226"/>
+              </a:buClr>
+              <a:buSzPct val="80000"/>
+              <a:buFont typeface="Wingdings 3" charset="2"/>
+              <a:buChar char=""/>
+              <a:tabLst/>
+              <a:defRPr/>
+            </a:pPr>
+            <a:r>
+              <a:rPr kumimoji="0" lang="en-US" sz="1400" b="0" i="0" u="none" strike="noStrike" kern="1200" cap="none" spc="-1" normalizeH="0" baseline="0" noProof="0" dirty="0">
+                <a:ln>
+                  <a:noFill/>
+                </a:ln>
+                <a:solidFill>
+                  <a:srgbClr val="404040"/>
+                </a:solidFill>
+                <a:effectLst/>
+                <a:uLnTx/>
+                <a:uFill>
+                  <a:solidFill>
+                    <a:srgbClr val="FFFFFF"/>
+                  </a:solidFill>
+                </a:uFill>
+                <a:latin typeface="Trebuchet MS" panose="020B0603020202020204" pitchFamily="34" charset="0"/>
+              </a:rPr>
+              <a:t>Mobile Wrapper</a:t>
+            </a:r>
+          </a:p>
+          <a:p>
+            <a:pPr marL="343080" marR="0" lvl="0" indent="-342360" algn="l" defTabSz="914400" rtl="0" eaLnBrk="1" fontAlgn="auto" latinLnBrk="0" hangingPunct="1">
+              <a:lnSpc>
+                <a:spcPct val="100000"/>
+              </a:lnSpc>
+              <a:spcBef>
+                <a:spcPts val="1001"/>
+              </a:spcBef>
+              <a:spcAft>
+                <a:spcPts val="0"/>
+              </a:spcAft>
+              <a:buClr>
+                <a:srgbClr val="90C226"/>
+              </a:buClr>
+              <a:buSzPct val="80000"/>
+              <a:buFont typeface="Wingdings 3" charset="2"/>
+              <a:buChar char=""/>
+              <a:tabLst/>
+              <a:defRPr/>
+            </a:pPr>
+            <a:r>
+              <a:rPr lang="en-US" sz="1400" spc="-1" dirty="0">
+                <a:solidFill>
+                  <a:srgbClr val="404040"/>
+                </a:solidFill>
+                <a:uFill>
+                  <a:solidFill>
+                    <a:srgbClr val="FFFFFF"/>
+                  </a:solidFill>
+                </a:uFill>
+                <a:latin typeface="Trebuchet MS"/>
+              </a:rPr>
+              <a:t>Custom Enclosure</a:t>
+            </a:r>
+          </a:p>
+          <a:p>
+            <a:pPr marL="800280" lvl="1" indent="-342360">
+              <a:spcBef>
+                <a:spcPts val="1001"/>
+              </a:spcBef>
+              <a:buClr>
+                <a:srgbClr val="90C226"/>
+              </a:buClr>
+              <a:buSzPct val="80000"/>
+              <a:buFont typeface="Wingdings 3" charset="2"/>
+              <a:buChar char=""/>
+            </a:pPr>
+            <a:r>
+              <a:rPr lang="en-US" sz="1400" spc="-1" dirty="0">
+                <a:solidFill>
+                  <a:srgbClr val="404040"/>
+                </a:solidFill>
+                <a:uFill>
+                  <a:solidFill>
+                    <a:srgbClr val="FFFFFF"/>
+                  </a:solidFill>
+                </a:uFill>
+                <a:latin typeface="Trebuchet MS"/>
+              </a:rPr>
+              <a:t>3D Printed</a:t>
+            </a:r>
+          </a:p>
+          <a:p>
+            <a:pPr marL="800280" lvl="1" indent="-342360">
+              <a:spcBef>
+                <a:spcPts val="1001"/>
+              </a:spcBef>
+              <a:buClr>
+                <a:srgbClr val="90C226"/>
+              </a:buClr>
+              <a:buSzPct val="80000"/>
+              <a:buFont typeface="Wingdings 3" charset="2"/>
+              <a:buChar char=""/>
+            </a:pPr>
+            <a:r>
+              <a:rPr kumimoji="0" lang="en-US" sz="1400" b="0" i="0" u="none" strike="noStrike" kern="1200" cap="none" spc="-1" normalizeH="0" baseline="0" noProof="0" dirty="0">
+                <a:ln>
+                  <a:noFill/>
+                </a:ln>
+                <a:solidFill>
+                  <a:srgbClr val="404040"/>
+                </a:solidFill>
+                <a:effectLst/>
+                <a:uLnTx/>
+                <a:uFill>
+                  <a:solidFill>
+                    <a:srgbClr val="FFFFFF"/>
+                  </a:solidFill>
+                </a:uFill>
+                <a:latin typeface="Trebuchet MS"/>
+                <a:ea typeface="+mn-ea"/>
+                <a:cs typeface="+mn-cs"/>
+              </a:rPr>
+              <a:t>Vertical </a:t>
+            </a:r>
+            <a:r>
+              <a:rPr kumimoji="0" lang="en-US" sz="1400" b="0" i="0" u="none" strike="noStrike" kern="1200" cap="none" spc="-1" normalizeH="0" baseline="0" noProof="0" dirty="0" err="1">
+                <a:ln>
+                  <a:noFill/>
+                </a:ln>
+                <a:solidFill>
+                  <a:srgbClr val="404040"/>
+                </a:solidFill>
+                <a:effectLst/>
+                <a:uLnTx/>
+                <a:uFill>
+                  <a:solidFill>
+                    <a:srgbClr val="FFFFFF"/>
+                  </a:solidFill>
+                </a:uFill>
+                <a:latin typeface="Trebuchet MS"/>
+                <a:ea typeface="+mn-ea"/>
+                <a:cs typeface="+mn-cs"/>
+              </a:rPr>
+              <a:t>Ligh</a:t>
+            </a:r>
+            <a:r>
+              <a:rPr lang="en-US" sz="1400" spc="-1" dirty="0">
+                <a:solidFill>
+                  <a:srgbClr val="404040"/>
+                </a:solidFill>
+                <a:uFill>
+                  <a:solidFill>
+                    <a:srgbClr val="FFFFFF"/>
+                  </a:solidFill>
+                </a:uFill>
+                <a:latin typeface="Trebuchet MS"/>
+              </a:rPr>
+              <a:t>ting</a:t>
+            </a:r>
+            <a:endParaRPr kumimoji="0" lang="en-US" sz="1400" b="0" i="0" u="none" strike="noStrike" kern="1200" cap="none" spc="-1" normalizeH="0" baseline="0" noProof="0" dirty="0">
+              <a:ln>
+                <a:noFill/>
+              </a:ln>
+              <a:solidFill>
+                <a:srgbClr val="000000"/>
+              </a:solidFill>
+              <a:effectLst/>
+              <a:uLnTx/>
+              <a:uFill>
+                <a:solidFill>
+                  <a:srgbClr val="FFFFFF"/>
+                </a:solidFill>
+              </a:uFill>
+              <a:latin typeface="Arial"/>
+              <a:ea typeface="+mn-ea"/>
+              <a:cs typeface="+mn-cs"/>
+            </a:endParaRPr>
+          </a:p>
+          <a:p>
+            <a:pPr marL="343080" marR="0" lvl="0" indent="-342360" algn="l" defTabSz="914400" rtl="0" eaLnBrk="1" fontAlgn="auto" latinLnBrk="0" hangingPunct="1">
+              <a:lnSpc>
+                <a:spcPct val="100000"/>
+              </a:lnSpc>
+              <a:spcBef>
+                <a:spcPts val="1001"/>
+              </a:spcBef>
+              <a:spcAft>
+                <a:spcPts val="0"/>
+              </a:spcAft>
+              <a:buClr>
+                <a:srgbClr val="90C226"/>
+              </a:buClr>
+              <a:buSzPct val="80000"/>
+              <a:buFont typeface="Wingdings 3" charset="2"/>
+              <a:buChar char=""/>
+              <a:tabLst/>
+              <a:defRPr/>
+            </a:pPr>
+            <a:r>
+              <a:rPr kumimoji="0" lang="en-US" sz="1400" b="0" i="0" u="none" strike="noStrike" kern="1200" cap="none" spc="-1" normalizeH="0" baseline="0" noProof="0" dirty="0">
+                <a:ln>
+                  <a:noFill/>
+                </a:ln>
+                <a:solidFill>
+                  <a:srgbClr val="404040"/>
+                </a:solidFill>
+                <a:effectLst/>
+                <a:uLnTx/>
+                <a:uFill>
+                  <a:solidFill>
+                    <a:srgbClr val="FFFFFF"/>
+                  </a:solidFill>
+                </a:uFill>
+                <a:latin typeface="Trebuchet MS"/>
+                <a:ea typeface="+mn-ea"/>
+                <a:cs typeface="+mn-cs"/>
+              </a:rPr>
+              <a:t>Additional Sensors &amp; Modules</a:t>
+            </a:r>
+          </a:p>
+          <a:p>
+            <a:pPr marL="800280" lvl="1" indent="-342360">
+              <a:spcBef>
+                <a:spcPts val="1001"/>
+              </a:spcBef>
+              <a:buClr>
+                <a:srgbClr val="90C226"/>
+              </a:buClr>
+              <a:buSzPct val="80000"/>
+              <a:buFont typeface="Wingdings 3" charset="2"/>
+              <a:buChar char=""/>
+            </a:pPr>
+            <a:r>
+              <a:rPr lang="en-US" sz="1400" spc="-1" dirty="0">
+                <a:solidFill>
+                  <a:srgbClr val="404040"/>
+                </a:solidFill>
+                <a:uFill>
+                  <a:solidFill>
+                    <a:srgbClr val="FFFFFF"/>
+                  </a:solidFill>
+                </a:uFill>
+                <a:latin typeface="Trebuchet MS"/>
+              </a:rPr>
+              <a:t>Soil Moisture </a:t>
+            </a:r>
+          </a:p>
+          <a:p>
+            <a:pPr marL="800280" lvl="1" indent="-342360">
+              <a:spcBef>
+                <a:spcPts val="1001"/>
+              </a:spcBef>
+              <a:buClr>
+                <a:srgbClr val="90C226"/>
+              </a:buClr>
+              <a:buSzPct val="80000"/>
+              <a:buFont typeface="Wingdings 3" charset="2"/>
+              <a:buChar char=""/>
+            </a:pPr>
+            <a:r>
+              <a:rPr kumimoji="0" lang="en-US" sz="1400" b="0" i="0" u="none" strike="noStrike" kern="1200" cap="none" spc="-1" normalizeH="0" baseline="0" noProof="0" dirty="0">
+                <a:ln>
+                  <a:noFill/>
+                </a:ln>
+                <a:solidFill>
+                  <a:srgbClr val="404040"/>
+                </a:solidFill>
+                <a:effectLst/>
+                <a:uLnTx/>
+                <a:uFill>
+                  <a:solidFill>
+                    <a:srgbClr val="FFFFFF"/>
+                  </a:solidFill>
+                </a:uFill>
+                <a:latin typeface="Trebuchet MS"/>
+                <a:ea typeface="+mn-ea"/>
+                <a:cs typeface="+mn-cs"/>
+              </a:rPr>
+              <a:t>Irrigation</a:t>
+            </a:r>
+            <a:endParaRPr kumimoji="0" lang="en-US" sz="1400" b="0" i="0" u="none" strike="noStrike" kern="1200" cap="none" spc="-1" normalizeH="0" baseline="0" noProof="0" dirty="0">
+              <a:ln>
+                <a:noFill/>
+              </a:ln>
+              <a:solidFill>
+                <a:srgbClr val="000000"/>
+              </a:solidFill>
+              <a:effectLst/>
+              <a:uLnTx/>
+              <a:uFill>
+                <a:solidFill>
+                  <a:srgbClr val="FFFFFF"/>
+                </a:solidFill>
+              </a:uFill>
+              <a:latin typeface="Arial"/>
+              <a:ea typeface="+mn-ea"/>
+              <a:cs typeface="+mn-cs"/>
+            </a:endParaRPr>
+          </a:p>
+          <a:p>
+            <a:pPr marL="343080" marR="0" lvl="0" indent="-342360" algn="l" defTabSz="914400" rtl="0" eaLnBrk="1" fontAlgn="auto" latinLnBrk="0" hangingPunct="1">
+              <a:lnSpc>
+                <a:spcPct val="100000"/>
+              </a:lnSpc>
+              <a:spcBef>
+                <a:spcPts val="1001"/>
+              </a:spcBef>
+              <a:spcAft>
+                <a:spcPts val="0"/>
+              </a:spcAft>
+              <a:buClr>
+                <a:srgbClr val="90C226"/>
+              </a:buClr>
+              <a:buSzPct val="80000"/>
+              <a:buFont typeface="Wingdings 3" charset="2"/>
+              <a:buChar char=""/>
+              <a:tabLst/>
+              <a:defRPr/>
+            </a:pPr>
+            <a:r>
+              <a:rPr lang="en-US" sz="1400" spc="-1" dirty="0">
+                <a:solidFill>
+                  <a:srgbClr val="404040"/>
+                </a:solidFill>
+                <a:uFill>
+                  <a:solidFill>
+                    <a:srgbClr val="FFFFFF"/>
+                  </a:solidFill>
+                </a:uFill>
+                <a:latin typeface="Trebuchet MS"/>
+              </a:rPr>
+              <a:t>Modular Controllers &amp; Lights</a:t>
+            </a:r>
+          </a:p>
+          <a:p>
+            <a:pPr marL="343080" indent="-342360">
+              <a:spcBef>
+                <a:spcPts val="1001"/>
+              </a:spcBef>
+              <a:buClr>
+                <a:srgbClr val="90C226"/>
+              </a:buClr>
+              <a:buSzPct val="80000"/>
+              <a:buFont typeface="Wingdings 3" charset="2"/>
+              <a:buChar char=""/>
+            </a:pPr>
+            <a:r>
+              <a:rPr lang="en-US" sz="1400" spc="-1" dirty="0">
+                <a:solidFill>
+                  <a:srgbClr val="404040"/>
+                </a:solidFill>
+                <a:uFill>
+                  <a:solidFill>
+                    <a:srgbClr val="FFFFFF"/>
+                  </a:solidFill>
+                </a:uFill>
+                <a:latin typeface="Trebuchet MS"/>
+              </a:rPr>
+              <a:t>Larger </a:t>
+            </a:r>
+            <a:r>
+              <a:rPr lang="en-US" sz="1400" spc="-1">
+                <a:solidFill>
+                  <a:srgbClr val="404040"/>
+                </a:solidFill>
+                <a:uFill>
+                  <a:solidFill>
+                    <a:srgbClr val="FFFFFF"/>
+                  </a:solidFill>
+                </a:uFill>
+                <a:latin typeface="Trebuchet MS"/>
+              </a:rPr>
+              <a:t>Distributed Systems</a:t>
+            </a:r>
+            <a:endParaRPr kumimoji="0" lang="en-US" sz="1400" b="0" i="0" u="none" strike="noStrike" kern="1200" cap="none" spc="-1" normalizeH="0" baseline="0" noProof="0" dirty="0">
+              <a:ln>
+                <a:noFill/>
+              </a:ln>
+              <a:solidFill>
+                <a:srgbClr val="000000"/>
+              </a:solidFill>
+              <a:effectLst/>
+              <a:uLnTx/>
+              <a:uFill>
+                <a:solidFill>
+                  <a:srgbClr val="FFFFFF"/>
+                </a:solidFill>
+              </a:uFill>
+              <a:latin typeface="Arial"/>
+              <a:ea typeface="+mn-ea"/>
+              <a:cs typeface="+mn-cs"/>
+            </a:endParaRPr>
+          </a:p>
+          <a:p>
+            <a:pPr marL="343080" marR="0" lvl="0" indent="-342360" algn="l" defTabSz="914400" rtl="0" eaLnBrk="1" fontAlgn="auto" latinLnBrk="0" hangingPunct="1">
+              <a:lnSpc>
+                <a:spcPct val="100000"/>
+              </a:lnSpc>
+              <a:spcBef>
+                <a:spcPts val="1001"/>
+              </a:spcBef>
+              <a:spcAft>
+                <a:spcPts val="0"/>
+              </a:spcAft>
+              <a:buClr>
+                <a:srgbClr val="90C226"/>
+              </a:buClr>
+              <a:buSzPct val="80000"/>
+              <a:buFont typeface="Wingdings 3" charset="2"/>
+              <a:buChar char=""/>
+              <a:tabLst/>
+              <a:defRPr/>
+            </a:pPr>
+            <a:endParaRPr kumimoji="0" lang="en-US" sz="1400" b="0" i="0" u="none" strike="noStrike" kern="1200" cap="none" spc="-1" normalizeH="0" baseline="0" noProof="0" dirty="0">
+              <a:ln>
+                <a:noFill/>
+              </a:ln>
+              <a:solidFill>
+                <a:srgbClr val="000000"/>
+              </a:solidFill>
+              <a:effectLst/>
+              <a:uLnTx/>
+              <a:uFill>
+                <a:solidFill>
+                  <a:srgbClr val="FFFFFF"/>
+                </a:solidFill>
+              </a:uFill>
+              <a:latin typeface="Arial"/>
+              <a:ea typeface="+mn-ea"/>
+              <a:cs typeface="+mn-cs"/>
+            </a:endParaRPr>
+          </a:p>
+          <a:p>
+            <a:pPr marL="0" marR="0" lvl="0" indent="0" algn="l" defTabSz="914400" rtl="0" eaLnBrk="1" fontAlgn="auto" latinLnBrk="0" hangingPunct="1">
+              <a:lnSpc>
+                <a:spcPct val="100000"/>
+              </a:lnSpc>
+              <a:spcBef>
+                <a:spcPts val="1001"/>
+              </a:spcBef>
+              <a:spcAft>
+                <a:spcPts val="0"/>
+              </a:spcAft>
+              <a:buClrTx/>
+              <a:buSzTx/>
+              <a:buFontTx/>
+              <a:buNone/>
+              <a:tabLst/>
+              <a:defRPr/>
+            </a:pPr>
+            <a:endParaRPr kumimoji="0" lang="en-US" sz="1400" b="0" i="0" u="none" strike="noStrike" kern="1200" cap="none" spc="-1" normalizeH="0" baseline="0" noProof="0" dirty="0">
+              <a:ln>
+                <a:noFill/>
+              </a:ln>
+              <a:solidFill>
+                <a:srgbClr val="000000"/>
+              </a:solidFill>
+              <a:effectLst/>
+              <a:uLnTx/>
+              <a:uFill>
+                <a:solidFill>
+                  <a:srgbClr val="FFFFFF"/>
+                </a:solidFill>
+              </a:uFill>
+              <a:latin typeface="Arial"/>
+              <a:ea typeface="+mn-ea"/>
+              <a:cs typeface="+mn-cs"/>
+            </a:endParaRPr>
+          </a:p>
+          <a:p>
+            <a:pPr marL="0" marR="0" lvl="0" indent="0" algn="l" defTabSz="914400" rtl="0" eaLnBrk="1" fontAlgn="auto" latinLnBrk="0" hangingPunct="1">
+              <a:lnSpc>
+                <a:spcPct val="100000"/>
+              </a:lnSpc>
+              <a:spcBef>
+                <a:spcPts val="1001"/>
+              </a:spcBef>
+              <a:spcAft>
+                <a:spcPts val="0"/>
+              </a:spcAft>
+              <a:buClrTx/>
+              <a:buSzTx/>
+              <a:buFontTx/>
+              <a:buNone/>
+              <a:tabLst/>
+              <a:defRPr/>
+            </a:pPr>
+            <a:endParaRPr kumimoji="0" lang="en-US" sz="1400" b="0" i="0" u="none" strike="noStrike" kern="1200" cap="none" spc="-1" normalizeH="0" baseline="0" noProof="0" dirty="0">
+              <a:ln>
+                <a:noFill/>
+              </a:ln>
+              <a:solidFill>
+                <a:srgbClr val="000000"/>
+              </a:solidFill>
+              <a:effectLst/>
+              <a:uLnTx/>
+              <a:uFill>
+                <a:solidFill>
+                  <a:srgbClr val="FFFFFF"/>
+                </a:solidFill>
+              </a:uFill>
+              <a:latin typeface="Arial"/>
+              <a:ea typeface="+mn-ea"/>
+              <a:cs typeface="+mn-cs"/>
+            </a:endParaRPr>
+          </a:p>
+        </p:txBody>
+      </p:sp>
+    </p:spTree>
+    <p:extLst>
+      <p:ext uri="{BB962C8B-B14F-4D97-AF65-F5344CB8AC3E}">
+        <p14:creationId xmlns:p14="http://schemas.microsoft.com/office/powerpoint/2010/main" val="2593800503"/>
+      </p:ext>
+    </p:extLst>
   </p:cSld>
   <p:clrMapOvr>
     <a:masterClrMapping/>
@@ -17625,10 +18549,15 @@
           </a:p>
           <a:p>
             <a:r>
-              <a:rPr lang="en-US"/>
-              <a:t>Conclusion</a:t>
-            </a:r>
-            <a:endParaRPr lang="en-US" dirty="0"/>
+              <a:rPr lang="en-US" dirty="0"/>
+              <a:t>Conclusion </a:t>
+            </a:r>
+          </a:p>
+          <a:p>
+            <a:r>
+              <a:rPr lang="en-US" dirty="0"/>
+              <a:t>Stretch Goals &amp; Additions </a:t>
+            </a:r>
           </a:p>
           <a:p>
             <a:pPr lvl="2"/>
@@ -17668,6 +18597,159 @@
       </p:grpSpPr>
       <p:sp>
         <p:nvSpPr>
+          <p:cNvPr id="2" name="Title 1">
+            <a:extLst>
+              <a:ext uri="{FF2B5EF4-FFF2-40B4-BE49-F238E27FC236}">
+                <a16:creationId xmlns:a16="http://schemas.microsoft.com/office/drawing/2014/main" id="{A7AAC5CE-532A-4E41-B0E2-69EBB015937F}"/>
+              </a:ext>
+            </a:extLst>
+          </p:cNvPr>
+          <p:cNvSpPr>
+            <a:spLocks noGrp="1"/>
+          </p:cNvSpPr>
+          <p:nvPr>
+            <p:ph type="title"/>
+          </p:nvPr>
+        </p:nvSpPr>
+        <p:spPr/>
+        <p:txBody>
+          <a:bodyPr/>
+          <a:lstStyle/>
+          <a:p>
+            <a:r>
+              <a:rPr lang="en-US" dirty="0"/>
+              <a:t>The Problem</a:t>
+            </a:r>
+          </a:p>
+        </p:txBody>
+      </p:sp>
+      <p:sp>
+        <p:nvSpPr>
+          <p:cNvPr id="3" name="Content Placeholder 2">
+            <a:extLst>
+              <a:ext uri="{FF2B5EF4-FFF2-40B4-BE49-F238E27FC236}">
+                <a16:creationId xmlns:a16="http://schemas.microsoft.com/office/drawing/2014/main" id="{3F658CDD-677C-4222-A880-B4D44335F2C0}"/>
+              </a:ext>
+            </a:extLst>
+          </p:cNvPr>
+          <p:cNvSpPr>
+            <a:spLocks noGrp="1"/>
+          </p:cNvSpPr>
+          <p:nvPr>
+            <p:ph idx="1"/>
+          </p:nvPr>
+        </p:nvSpPr>
+        <p:spPr/>
+        <p:txBody>
+          <a:bodyPr>
+            <a:normAutofit lnSpcReduction="10000"/>
+          </a:bodyPr>
+          <a:lstStyle/>
+          <a:p>
+            <a:r>
+              <a:rPr lang="en-US" dirty="0"/>
+              <a:t>NW Winter Conditions</a:t>
+            </a:r>
+          </a:p>
+          <a:p>
+            <a:pPr lvl="1"/>
+            <a:r>
+              <a:rPr lang="en-US" dirty="0"/>
+              <a:t>Cold &amp; Dark</a:t>
+            </a:r>
+          </a:p>
+          <a:p>
+            <a:pPr lvl="1"/>
+            <a:r>
+              <a:rPr lang="en-US" dirty="0"/>
+              <a:t>Not ideal for plants</a:t>
+            </a:r>
+            <a:br>
+              <a:rPr lang="en-US" dirty="0"/>
+            </a:br>
+            <a:endParaRPr lang="en-US" dirty="0"/>
+          </a:p>
+          <a:p>
+            <a:endParaRPr lang="en-US" dirty="0"/>
+          </a:p>
+          <a:p>
+            <a:r>
+              <a:rPr lang="en-US" dirty="0"/>
+              <a:t>Growing Indoors</a:t>
+            </a:r>
+          </a:p>
+          <a:p>
+            <a:pPr lvl="1"/>
+            <a:r>
+              <a:rPr lang="en-US" dirty="0"/>
+              <a:t>Controlled Environment</a:t>
+            </a:r>
+          </a:p>
+          <a:p>
+            <a:pPr lvl="1"/>
+            <a:r>
+              <a:rPr lang="en-US" dirty="0"/>
+              <a:t>Human Schedules</a:t>
+            </a:r>
+          </a:p>
+          <a:p>
+            <a:pPr lvl="1"/>
+            <a:r>
+              <a:rPr lang="en-US" dirty="0"/>
+              <a:t>Current Systems</a:t>
+            </a:r>
+          </a:p>
+          <a:p>
+            <a:pPr lvl="2"/>
+            <a:r>
+              <a:rPr lang="en-US" dirty="0"/>
+              <a:t>Expensive</a:t>
+            </a:r>
+          </a:p>
+          <a:p>
+            <a:pPr lvl="2"/>
+            <a:r>
+              <a:rPr lang="en-US" dirty="0"/>
+              <a:t>Little Customization</a:t>
+            </a:r>
+          </a:p>
+          <a:p>
+            <a:endParaRPr lang="en-US" dirty="0"/>
+          </a:p>
+        </p:txBody>
+      </p:sp>
+    </p:spTree>
+    <p:extLst>
+      <p:ext uri="{BB962C8B-B14F-4D97-AF65-F5344CB8AC3E}">
+        <p14:creationId xmlns:p14="http://schemas.microsoft.com/office/powerpoint/2010/main" val="3954915719"/>
+      </p:ext>
+    </p:extLst>
+  </p:cSld>
+  <p:clrMapOvr>
+    <a:masterClrMapping/>
+  </p:clrMapOvr>
+</p:sld>
+</file>
+
+<file path=ppt/slides/slide4.xml><?xml version="1.0" encoding="utf-8"?>
+<p:sld xmlns:a="http://schemas.openxmlformats.org/drawingml/2006/main" xmlns:r="http://schemas.openxmlformats.org/officeDocument/2006/relationships" xmlns:p="http://schemas.openxmlformats.org/presentationml/2006/main">
+  <p:cSld>
+    <p:spTree>
+      <p:nvGrpSpPr>
+        <p:cNvPr id="1" name=""/>
+        <p:cNvGrpSpPr/>
+        <p:nvPr/>
+      </p:nvGrpSpPr>
+      <p:grpSpPr>
+        <a:xfrm>
+          <a:off x="0" y="0"/>
+          <a:ext cx="0" cy="0"/>
+          <a:chOff x="0" y="0"/>
+          <a:chExt cx="0" cy="0"/>
+        </a:xfrm>
+      </p:grpSpPr>
+      <p:sp>
+        <p:nvSpPr>
           <p:cNvPr id="120" name="CustomShape 1"/>
           <p:cNvSpPr/>
           <p:nvPr/>
@@ -17701,35 +18783,61 @@
           <a:bodyPr lIns="90000" tIns="45000" rIns="90000" bIns="45000"/>
           <a:lstStyle/>
           <a:p>
-            <a:pPr>
+            <a:pPr marL="0" marR="0" lvl="0" indent="0" algn="l" defTabSz="914400" rtl="0" eaLnBrk="1" fontAlgn="auto" latinLnBrk="0" hangingPunct="1">
               <a:lnSpc>
                 <a:spcPct val="100000"/>
               </a:lnSpc>
+              <a:spcBef>
+                <a:spcPts val="0"/>
+              </a:spcBef>
+              <a:spcAft>
+                <a:spcPts val="0"/>
+              </a:spcAft>
+              <a:buClrTx/>
+              <a:buSzTx/>
+              <a:buFontTx/>
+              <a:buNone/>
+              <a:tabLst/>
+              <a:defRPr/>
             </a:pPr>
             <a:r>
-              <a:rPr lang="en-US" sz="3600" spc="-1" dirty="0">
+              <a:rPr kumimoji="0" lang="en-US" sz="3600" b="0" i="0" u="none" strike="noStrike" kern="1200" cap="none" spc="-1" normalizeH="0" baseline="0" noProof="0" dirty="0">
+                <a:ln>
+                  <a:noFill/>
+                </a:ln>
                 <a:solidFill>
                   <a:srgbClr val="90C226"/>
                 </a:solidFill>
+                <a:effectLst/>
+                <a:uLnTx/>
                 <a:uFill>
                   <a:solidFill>
                     <a:srgbClr val="FFFFFF"/>
                   </a:solidFill>
                 </a:uFill>
                 <a:latin typeface="Trebuchet MS"/>
+                <a:ea typeface="+mn-ea"/>
+                <a:cs typeface="+mn-cs"/>
               </a:rPr>
-              <a:t>Problem &amp; Solution</a:t>
-            </a:r>
-            <a:endParaRPr lang="en-US" sz="3600" b="0" strike="noStrike" spc="-1" dirty="0">
+              <a:t>System Solution</a:t>
+            </a:r>
+            <a:endParaRPr kumimoji="0" lang="en-US" sz="3600" b="0" i="0" u="none" strike="noStrike" kern="1200" cap="none" spc="-1" normalizeH="0" baseline="0" noProof="0" dirty="0">
+              <a:ln>
+                <a:noFill/>
+              </a:ln>
               <a:solidFill>
                 <a:srgbClr val="000000"/>
               </a:solidFill>
+              <a:effectLst/>
+              <a:uLnTx/>
               <a:uFill>
                 <a:solidFill>
                   <a:srgbClr val="FFFFFF"/>
                 </a:solidFill>
               </a:uFill>
               <a:latin typeface="Arial"/>
+              <a:ea typeface="+mn-ea"/>
+              <a:cs typeface="+mn-cs"/>
             </a:endParaRPr>
           </a:p>
         </p:txBody>
@@ -17806,8 +18914,8 @@
         </p:nvSpPr>
         <p:spPr>
           <a:xfrm>
-            <a:off x="677160" y="1463040"/>
-            <a:ext cx="8596080" cy="4785480"/>
+            <a:off x="757060" y="2244275"/>
+            <a:ext cx="8596080" cy="3552843"/>
           </a:xfrm>
           <a:prstGeom prst="rect">
             <a:avLst/>
@@ -17821,327 +18929,415 @@
           <a:bodyPr lIns="90000" tIns="45000" rIns="90000" bIns="45000"/>
           <a:lstStyle/>
           <a:p>
-            <a:r>
-              <a:rPr lang="en-US" sz="1800" b="0" strike="noStrike" spc="-1" dirty="0">
-                <a:solidFill>
-                  <a:srgbClr val="000000"/>
-                </a:solidFill>
-                <a:uFill>
-                  <a:solidFill>
-                    <a:srgbClr val="FFFFFF"/>
-                  </a:solidFill>
-                </a:uFill>
-                <a:latin typeface="Arial"/>
+            <a:pPr marL="342900" marR="0" lvl="0" indent="-342900" algn="l" defTabSz="457200" rtl="0" eaLnBrk="1" fontAlgn="auto" latinLnBrk="0" hangingPunct="1">
+              <a:lnSpc>
+                <a:spcPct val="100000"/>
+              </a:lnSpc>
+              <a:spcBef>
+                <a:spcPts val="1000"/>
+              </a:spcBef>
+              <a:spcAft>
+                <a:spcPts val="0"/>
+              </a:spcAft>
+              <a:buClr>
+                <a:srgbClr val="90C226"/>
+              </a:buClr>
+              <a:buSzPct val="80000"/>
+              <a:buFont typeface="Wingdings 3" charset="2"/>
+              <a:buChar char=""/>
+              <a:tabLst/>
+              <a:defRPr/>
+            </a:pPr>
+            <a:r>
+              <a:rPr kumimoji="0" lang="en-US" sz="1800" b="0" i="0" u="none" strike="noStrike" kern="1200" cap="none" spc="0" normalizeH="0" baseline="0" noProof="0" dirty="0">
+                <a:ln>
+                  <a:noFill/>
+                </a:ln>
+                <a:solidFill>
+                  <a:prstClr val="black">
+                    <a:lumMod val="75000"/>
+                    <a:lumOff val="25000"/>
+                  </a:prstClr>
+                </a:solidFill>
+                <a:effectLst/>
+                <a:uLnTx/>
+                <a:uFillTx/>
+                <a:latin typeface="Trebuchet MS" panose="020B0603020202020204"/>
+                <a:ea typeface="+mn-ea"/>
+                <a:cs typeface="+mn-cs"/>
               </a:rPr>
-              <a:t>The Problem:</a:t>
-            </a:r>
-          </a:p>
-          <a:p>
-            <a:r>
-              <a:rPr lang="en-US" spc="-1" dirty="0">
-                <a:solidFill>
-                  <a:srgbClr val="000000"/>
-                </a:solidFill>
-                <a:uFill>
-                  <a:solidFill>
-                    <a:srgbClr val="FFFFFF"/>
-                  </a:solidFill>
-                </a:uFill>
-                <a:latin typeface="Arial"/>
+              <a:t>RGB LEDs</a:t>
+            </a:r>
+          </a:p>
+          <a:p>
+            <a:pPr marL="742950" marR="0" lvl="1" indent="-285750" algn="l" defTabSz="457200" rtl="0" eaLnBrk="1" fontAlgn="auto" latinLnBrk="0" hangingPunct="1">
+              <a:lnSpc>
+                <a:spcPct val="100000"/>
+              </a:lnSpc>
+              <a:spcBef>
+                <a:spcPts val="1000"/>
+              </a:spcBef>
+              <a:spcAft>
+                <a:spcPts val="0"/>
+              </a:spcAft>
+              <a:buClr>
+                <a:srgbClr val="90C226"/>
+              </a:buClr>
+              <a:buSzPct val="80000"/>
+              <a:buFont typeface="Wingdings 3" charset="2"/>
+              <a:buChar char=""/>
+              <a:tabLst/>
+              <a:defRPr/>
+            </a:pPr>
+            <a:r>
+              <a:rPr kumimoji="0" lang="en-US" sz="1600" b="0" i="0" u="none" strike="noStrike" kern="1200" cap="none" spc="0" normalizeH="0" baseline="0" noProof="0" dirty="0">
+                <a:ln>
+                  <a:noFill/>
+                </a:ln>
+                <a:solidFill>
+                  <a:prstClr val="black">
+                    <a:lumMod val="75000"/>
+                    <a:lumOff val="25000"/>
+                  </a:prstClr>
+                </a:solidFill>
+                <a:effectLst/>
+                <a:uLnTx/>
+                <a:uFillTx/>
+                <a:latin typeface="Trebuchet MS" panose="020B0603020202020204"/>
+                <a:ea typeface="+mn-ea"/>
+                <a:cs typeface="+mn-cs"/>
               </a:rPr>
-              <a:t>	Conditions Outside</a:t>
-            </a:r>
-            <a:endParaRPr lang="en-US" sz="1800" b="0" strike="noStrike" spc="-1" dirty="0">
+              <a:t>Variable Colors</a:t>
+            </a:r>
+          </a:p>
+          <a:p>
+            <a:pPr marL="742950" marR="0" lvl="1" indent="-285750" algn="l" defTabSz="457200" rtl="0" eaLnBrk="1" fontAlgn="auto" latinLnBrk="0" hangingPunct="1">
+              <a:lnSpc>
+                <a:spcPct val="100000"/>
+              </a:lnSpc>
+              <a:spcBef>
+                <a:spcPts val="1000"/>
+              </a:spcBef>
+              <a:spcAft>
+                <a:spcPts val="0"/>
+              </a:spcAft>
+              <a:buClr>
+                <a:srgbClr val="90C226"/>
+              </a:buClr>
+              <a:buSzPct val="80000"/>
+              <a:buFont typeface="Wingdings 3" charset="2"/>
+              <a:buChar char=""/>
+              <a:tabLst/>
+              <a:defRPr/>
+            </a:pPr>
+            <a:r>
+              <a:rPr kumimoji="0" lang="en-US" sz="1600" b="0" i="0" u="none" strike="noStrike" kern="1200" cap="none" spc="0" normalizeH="0" baseline="0" noProof="0" dirty="0">
+                <a:ln>
+                  <a:noFill/>
+                </a:ln>
+                <a:solidFill>
+                  <a:prstClr val="black">
+                    <a:lumMod val="75000"/>
+                    <a:lumOff val="25000"/>
+                  </a:prstClr>
+                </a:solidFill>
+                <a:effectLst/>
+                <a:uLnTx/>
+                <a:uFillTx/>
+                <a:latin typeface="Trebuchet MS" panose="020B0603020202020204"/>
+                <a:ea typeface="+mn-ea"/>
+                <a:cs typeface="+mn-cs"/>
+              </a:rPr>
+              <a:t>Ideal Light Output</a:t>
+            </a:r>
+            <a:br>
+              <a:rPr kumimoji="0" lang="en-US" sz="1600" b="0" i="0" u="none" strike="noStrike" kern="1200" cap="none" spc="0" normalizeH="0" baseline="0" noProof="0" dirty="0">
+                <a:ln>
+                  <a:noFill/>
+                </a:ln>
+                <a:solidFill>
+                  <a:prstClr val="black">
+                    <a:lumMod val="75000"/>
+                    <a:lumOff val="25000"/>
+                  </a:prstClr>
+                </a:solidFill>
+                <a:effectLst/>
+                <a:uLnTx/>
+                <a:uFillTx/>
+                <a:latin typeface="Trebuchet MS" panose="020B0603020202020204"/>
+                <a:ea typeface="+mn-ea"/>
+                <a:cs typeface="+mn-cs"/>
+              </a:rPr>
+            </a:br>
+            <a:endParaRPr kumimoji="0" lang="en-US" sz="1800" b="0" i="0" u="none" strike="noStrike" kern="1200" cap="none" spc="0" normalizeH="0" baseline="0" noProof="0" dirty="0">
+              <a:ln>
+                <a:noFill/>
+              </a:ln>
               <a:solidFill>
-                <a:srgbClr val="000000"/>
+                <a:prstClr val="black">
+                  <a:lumMod val="75000"/>
+                  <a:lumOff val="25000"/>
+                </a:prstClr>
               </a:solidFill>
-              <a:uFill>
-                <a:solidFill>
-                  <a:srgbClr val="FFFFFF"/>
-                </a:solidFill>
-              </a:uFill>
-              <a:latin typeface="Arial"/>
+              <a:effectLst/>
+              <a:uLnTx/>
+              <a:uFillTx/>
+              <a:latin typeface="Trebuchet MS" panose="020B0603020202020204"/>
+              <a:ea typeface="+mn-ea"/>
+              <a:cs typeface="+mn-cs"/>
             </a:endParaRPr>
           </a:p>
           <a:p>
-            <a:pPr lvl="2"/>
-            <a:r>
-              <a:rPr lang="en-US" b="0" strike="noStrike" spc="-1" dirty="0">
-                <a:solidFill>
-                  <a:srgbClr val="000000"/>
-                </a:solidFill>
-                <a:uFill>
-                  <a:solidFill>
-                    <a:srgbClr val="FFFFFF"/>
-                  </a:solidFill>
-                </a:uFill>
-                <a:latin typeface="Arial"/>
+            <a:pPr marL="342900" marR="0" lvl="0" indent="-342900" algn="l" defTabSz="457200" rtl="0" eaLnBrk="1" fontAlgn="auto" latinLnBrk="0" hangingPunct="1">
+              <a:lnSpc>
+                <a:spcPct val="100000"/>
+              </a:lnSpc>
+              <a:spcBef>
+                <a:spcPts val="1000"/>
+              </a:spcBef>
+              <a:spcAft>
+                <a:spcPts val="0"/>
+              </a:spcAft>
+              <a:buClr>
+                <a:srgbClr val="90C226"/>
+              </a:buClr>
+              <a:buSzPct val="80000"/>
+              <a:buFont typeface="Wingdings 3" charset="2"/>
+              <a:buChar char=""/>
+              <a:tabLst/>
+              <a:defRPr/>
+            </a:pPr>
+            <a:r>
+              <a:rPr kumimoji="0" lang="en-US" sz="1800" b="0" i="0" u="none" strike="noStrike" kern="1200" cap="none" spc="0" normalizeH="0" baseline="0" noProof="0" dirty="0">
+                <a:ln>
+                  <a:noFill/>
+                </a:ln>
+                <a:solidFill>
+                  <a:prstClr val="black">
+                    <a:lumMod val="75000"/>
+                    <a:lumOff val="25000"/>
+                  </a:prstClr>
+                </a:solidFill>
+                <a:effectLst/>
+                <a:uLnTx/>
+                <a:uFillTx/>
+                <a:latin typeface="Trebuchet MS" panose="020B0603020202020204"/>
+                <a:ea typeface="+mn-ea"/>
+                <a:cs typeface="+mn-cs"/>
               </a:rPr>
-              <a:t>	Winter is dark and cold</a:t>
-            </a:r>
-          </a:p>
-          <a:p>
-            <a:pPr lvl="2"/>
-            <a:r>
-              <a:rPr lang="en-US" b="0" strike="noStrike" spc="-1" dirty="0">
-                <a:solidFill>
-                  <a:srgbClr val="000000"/>
-                </a:solidFill>
-                <a:uFill>
-                  <a:solidFill>
-                    <a:srgbClr val="FFFFFF"/>
-                  </a:solidFill>
-                </a:uFill>
-                <a:latin typeface="Arial"/>
+              <a:t>Micro Controllers</a:t>
+            </a:r>
+          </a:p>
+          <a:p>
+            <a:pPr marL="742950" marR="0" lvl="1" indent="-285750" algn="l" defTabSz="457200" rtl="0" eaLnBrk="1" fontAlgn="auto" latinLnBrk="0" hangingPunct="1">
+              <a:lnSpc>
+                <a:spcPct val="100000"/>
+              </a:lnSpc>
+              <a:spcBef>
+                <a:spcPts val="1000"/>
+              </a:spcBef>
+              <a:spcAft>
+                <a:spcPts val="0"/>
+              </a:spcAft>
+              <a:buClr>
+                <a:srgbClr val="90C226"/>
+              </a:buClr>
+              <a:buSzPct val="80000"/>
+              <a:buFont typeface="Wingdings 3" charset="2"/>
+              <a:buChar char=""/>
+              <a:tabLst/>
+              <a:defRPr/>
+            </a:pPr>
+            <a:r>
+              <a:rPr kumimoji="0" lang="en-US" sz="1600" b="0" i="0" u="none" strike="noStrike" kern="1200" cap="none" spc="0" normalizeH="0" baseline="0" noProof="0" dirty="0">
+                <a:ln>
+                  <a:noFill/>
+                </a:ln>
+                <a:solidFill>
+                  <a:prstClr val="black">
+                    <a:lumMod val="75000"/>
+                    <a:lumOff val="25000"/>
+                  </a:prstClr>
+                </a:solidFill>
+                <a:effectLst/>
+                <a:uLnTx/>
+                <a:uFillTx/>
+                <a:latin typeface="Trebuchet MS" panose="020B0603020202020204"/>
+                <a:ea typeface="+mn-ea"/>
+                <a:cs typeface="+mn-cs"/>
               </a:rPr>
-              <a:t>	Hard to grow plants</a:t>
-            </a:r>
-          </a:p>
-          <a:p>
-            <a:pPr lvl="2"/>
-            <a:endParaRPr lang="en-US" b="0" strike="noStrike" spc="-1" dirty="0">
+              <a:t>Customization</a:t>
+            </a:r>
+          </a:p>
+          <a:p>
+            <a:pPr marL="742950" marR="0" lvl="1" indent="-285750" algn="l" defTabSz="457200" rtl="0" eaLnBrk="1" fontAlgn="auto" latinLnBrk="0" hangingPunct="1">
+              <a:lnSpc>
+                <a:spcPct val="100000"/>
+              </a:lnSpc>
+              <a:spcBef>
+                <a:spcPts val="1000"/>
+              </a:spcBef>
+              <a:spcAft>
+                <a:spcPts val="0"/>
+              </a:spcAft>
+              <a:buClr>
+                <a:srgbClr val="90C226"/>
+              </a:buClr>
+              <a:buSzPct val="80000"/>
+              <a:buFont typeface="Wingdings 3" charset="2"/>
+              <a:buChar char=""/>
+              <a:tabLst/>
+              <a:defRPr/>
+            </a:pPr>
+            <a:r>
+              <a:rPr kumimoji="0" lang="en-US" sz="1600" b="0" i="0" u="none" strike="noStrike" kern="1200" cap="none" spc="0" normalizeH="0" baseline="0" noProof="0" dirty="0">
+                <a:ln>
+                  <a:noFill/>
+                </a:ln>
+                <a:solidFill>
+                  <a:prstClr val="black">
+                    <a:lumMod val="75000"/>
+                    <a:lumOff val="25000"/>
+                  </a:prstClr>
+                </a:solidFill>
+                <a:effectLst/>
+                <a:uLnTx/>
+                <a:uFillTx/>
+                <a:latin typeface="Trebuchet MS" panose="020B0603020202020204"/>
+                <a:ea typeface="+mn-ea"/>
+                <a:cs typeface="+mn-cs"/>
+              </a:rPr>
+              <a:t>Automation</a:t>
+            </a:r>
+          </a:p>
+          <a:p>
+            <a:pPr marL="1143000" marR="0" lvl="2" indent="-228600" algn="l" defTabSz="457200" rtl="0" eaLnBrk="1" fontAlgn="auto" latinLnBrk="0" hangingPunct="1">
+              <a:lnSpc>
+                <a:spcPct val="100000"/>
+              </a:lnSpc>
+              <a:spcBef>
+                <a:spcPts val="1000"/>
+              </a:spcBef>
+              <a:spcAft>
+                <a:spcPts val="0"/>
+              </a:spcAft>
+              <a:buClr>
+                <a:srgbClr val="90C226"/>
+              </a:buClr>
+              <a:buSzPct val="80000"/>
+              <a:buFont typeface="Wingdings 3" charset="2"/>
+              <a:buChar char=""/>
+              <a:tabLst/>
+              <a:defRPr/>
+            </a:pPr>
+            <a:r>
+              <a:rPr kumimoji="0" lang="en-US" sz="1400" b="0" i="0" u="none" strike="noStrike" kern="1200" cap="none" spc="0" normalizeH="0" baseline="0" noProof="0" dirty="0">
+                <a:ln>
+                  <a:noFill/>
+                </a:ln>
+                <a:solidFill>
+                  <a:prstClr val="black">
+                    <a:lumMod val="75000"/>
+                    <a:lumOff val="25000"/>
+                  </a:prstClr>
+                </a:solidFill>
+                <a:effectLst/>
+                <a:uLnTx/>
+                <a:uFillTx/>
+                <a:latin typeface="Trebuchet MS" panose="020B0603020202020204"/>
+                <a:ea typeface="+mn-ea"/>
+                <a:cs typeface="+mn-cs"/>
+              </a:rPr>
+              <a:t>Scheduling</a:t>
+            </a:r>
+          </a:p>
+          <a:p>
+            <a:pPr marL="1143000" marR="0" lvl="2" indent="-228600" algn="l" defTabSz="457200" rtl="0" eaLnBrk="1" fontAlgn="auto" latinLnBrk="0" hangingPunct="1">
+              <a:lnSpc>
+                <a:spcPct val="100000"/>
+              </a:lnSpc>
+              <a:spcBef>
+                <a:spcPts val="1000"/>
+              </a:spcBef>
+              <a:spcAft>
+                <a:spcPts val="0"/>
+              </a:spcAft>
+              <a:buClr>
+                <a:srgbClr val="90C226"/>
+              </a:buClr>
+              <a:buSzPct val="80000"/>
+              <a:buFont typeface="Wingdings 3" charset="2"/>
+              <a:buChar char=""/>
+              <a:tabLst/>
+              <a:defRPr/>
+            </a:pPr>
+            <a:r>
+              <a:rPr kumimoji="0" lang="en-US" sz="1400" b="0" i="0" u="none" strike="noStrike" kern="1200" cap="none" spc="0" normalizeH="0" baseline="0" noProof="0" dirty="0">
+                <a:ln>
+                  <a:noFill/>
+                </a:ln>
+                <a:solidFill>
+                  <a:prstClr val="black">
+                    <a:lumMod val="75000"/>
+                    <a:lumOff val="25000"/>
+                  </a:prstClr>
+                </a:solidFill>
+                <a:effectLst/>
+                <a:uLnTx/>
+                <a:uFillTx/>
+                <a:latin typeface="Trebuchet MS" panose="020B0603020202020204"/>
+                <a:ea typeface="+mn-ea"/>
+                <a:cs typeface="+mn-cs"/>
+              </a:rPr>
+              <a:t>Redundancy</a:t>
+            </a:r>
+          </a:p>
+          <a:p>
+            <a:pPr marL="228600" marR="0" lvl="0" indent="-228600" algn="l" defTabSz="457200" rtl="0" eaLnBrk="1" fontAlgn="auto" latinLnBrk="0" hangingPunct="1">
+              <a:lnSpc>
+                <a:spcPct val="100000"/>
+              </a:lnSpc>
+              <a:spcBef>
+                <a:spcPts val="1000"/>
+              </a:spcBef>
+              <a:spcAft>
+                <a:spcPts val="0"/>
+              </a:spcAft>
+              <a:buClr>
+                <a:srgbClr val="90C226"/>
+              </a:buClr>
+              <a:buSzPct val="80000"/>
+              <a:buFont typeface="Wingdings 3" charset="2"/>
+              <a:buChar char=""/>
+              <a:tabLst/>
+              <a:defRPr/>
+            </a:pPr>
+            <a:endParaRPr kumimoji="0" lang="en-US" sz="1400" b="0" i="0" u="none" strike="noStrike" kern="1200" cap="none" spc="0" normalizeH="0" baseline="0" noProof="0" dirty="0">
+              <a:ln>
+                <a:noFill/>
+              </a:ln>
               <a:solidFill>
-                <a:srgbClr val="000000"/>
+                <a:prstClr val="black">
+                  <a:lumMod val="75000"/>
+                  <a:lumOff val="25000"/>
+                </a:prstClr>
               </a:solidFill>
-              <a:uFill>
-                <a:solidFill>
-                  <a:srgbClr val="FFFFFF"/>
-                </a:solidFill>
-              </a:uFill>
-              <a:latin typeface="Arial"/>
+              <a:effectLst/>
+              <a:uLnTx/>
+              <a:uFillTx/>
+              <a:latin typeface="Trebuchet MS" panose="020B0603020202020204"/>
+              <a:ea typeface="+mn-ea"/>
+              <a:cs typeface="+mn-cs"/>
             </a:endParaRPr>
           </a:p>
-          <a:p>
-            <a:pPr lvl="2"/>
-            <a:r>
-              <a:rPr lang="en-US" spc="-1" dirty="0">
-                <a:solidFill>
-                  <a:srgbClr val="000000"/>
-                </a:solidFill>
-                <a:uFill>
-                  <a:solidFill>
-                    <a:srgbClr val="FFFFFF"/>
-                  </a:solidFill>
-                </a:uFill>
-                <a:latin typeface="Arial"/>
-              </a:rPr>
-              <a:t>Growing Indoors</a:t>
-            </a:r>
-          </a:p>
-          <a:p>
-            <a:pPr lvl="2"/>
-            <a:r>
-              <a:rPr lang="en-US" b="0" strike="noStrike" spc="-1" dirty="0">
-                <a:solidFill>
-                  <a:srgbClr val="000000"/>
-                </a:solidFill>
-                <a:uFill>
-                  <a:solidFill>
-                    <a:srgbClr val="FFFFFF"/>
-                  </a:solidFill>
-                </a:uFill>
-                <a:latin typeface="Arial"/>
-              </a:rPr>
-              <a:t>	Human Schedules</a:t>
-            </a:r>
-          </a:p>
-          <a:p>
-            <a:pPr lvl="2"/>
-            <a:r>
-              <a:rPr lang="en-US" spc="-1" dirty="0">
-                <a:solidFill>
-                  <a:srgbClr val="000000"/>
-                </a:solidFill>
-                <a:uFill>
-                  <a:solidFill>
-                    <a:srgbClr val="FFFFFF"/>
-                  </a:solidFill>
-                </a:uFill>
-                <a:latin typeface="Arial"/>
-              </a:rPr>
-              <a:t>	Current Systems</a:t>
-            </a:r>
-          </a:p>
-          <a:p>
-            <a:pPr lvl="2"/>
-            <a:r>
-              <a:rPr lang="en-US" b="0" strike="noStrike" spc="-1" dirty="0">
-                <a:solidFill>
-                  <a:srgbClr val="000000"/>
-                </a:solidFill>
-                <a:uFill>
-                  <a:solidFill>
-                    <a:srgbClr val="FFFFFF"/>
-                  </a:solidFill>
-                </a:uFill>
-                <a:latin typeface="Arial"/>
-              </a:rPr>
-              <a:t>		Customization</a:t>
-            </a:r>
-          </a:p>
-          <a:p>
-            <a:pPr lvl="2"/>
-            <a:r>
-              <a:rPr lang="en-US" spc="-1" dirty="0">
-                <a:solidFill>
-                  <a:srgbClr val="000000"/>
-                </a:solidFill>
-                <a:uFill>
-                  <a:solidFill>
-                    <a:srgbClr val="FFFFFF"/>
-                  </a:solidFill>
-                </a:uFill>
-                <a:latin typeface="Arial"/>
-              </a:rPr>
-              <a:t>		Price</a:t>
-            </a:r>
-            <a:endParaRPr lang="en-US" b="0" strike="noStrike" spc="-1" dirty="0">
-              <a:solidFill>
-                <a:srgbClr val="000000"/>
-              </a:solidFill>
-              <a:uFill>
-                <a:solidFill>
-                  <a:srgbClr val="FFFFFF"/>
-                </a:solidFill>
-              </a:uFill>
-              <a:latin typeface="Arial"/>
-            </a:endParaRPr>
-          </a:p>
-          <a:p>
-            <a:endParaRPr lang="en-US" sz="1800" b="0" strike="noStrike" spc="-1" dirty="0">
-              <a:solidFill>
-                <a:srgbClr val="000000"/>
-              </a:solidFill>
-              <a:uFill>
-                <a:solidFill>
-                  <a:srgbClr val="FFFFFF"/>
-                </a:solidFill>
-              </a:uFill>
-              <a:latin typeface="Arial"/>
-            </a:endParaRPr>
-          </a:p>
-          <a:p>
-            <a:endParaRPr lang="en-US" sz="1800" b="0" strike="noStrike" spc="-1" dirty="0">
-              <a:solidFill>
-                <a:srgbClr val="000000"/>
-              </a:solidFill>
-              <a:uFill>
-                <a:solidFill>
-                  <a:srgbClr val="FFFFFF"/>
-                </a:solidFill>
-              </a:uFill>
-              <a:latin typeface="Arial"/>
-            </a:endParaRPr>
-          </a:p>
-          <a:p>
-            <a:r>
-              <a:rPr lang="en-US" sz="1800" b="0" strike="noStrike" spc="-1" dirty="0">
-                <a:solidFill>
-                  <a:srgbClr val="000000"/>
-                </a:solidFill>
-                <a:uFill>
-                  <a:solidFill>
-                    <a:srgbClr val="FFFFFF"/>
-                  </a:solidFill>
-                </a:uFill>
-                <a:latin typeface="Arial"/>
-              </a:rPr>
-              <a:t>Our Project:</a:t>
-            </a:r>
-          </a:p>
-          <a:p>
-            <a:r>
-              <a:rPr lang="en-US" sz="1800" b="0" strike="noStrike" spc="-1" dirty="0">
-                <a:solidFill>
-                  <a:srgbClr val="000000"/>
-                </a:solidFill>
-                <a:uFill>
-                  <a:solidFill>
-                    <a:srgbClr val="FFFFFF"/>
-                  </a:solidFill>
-                </a:uFill>
-                <a:latin typeface="Arial"/>
-              </a:rPr>
-              <a:t>	RGB lighting system indoor growth system</a:t>
-            </a:r>
-          </a:p>
-          <a:p>
-            <a:r>
-              <a:rPr lang="en-US" sz="1800" b="0" strike="noStrike" spc="-1" dirty="0">
-                <a:solidFill>
-                  <a:srgbClr val="000000"/>
-                </a:solidFill>
-                <a:uFill>
-                  <a:solidFill>
-                    <a:srgbClr val="FFFFFF"/>
-                  </a:solidFill>
-                </a:uFill>
-                <a:latin typeface="Arial"/>
-              </a:rPr>
-              <a:t>	RGB lighting is used to simulate different type of plant growth</a:t>
-            </a:r>
-          </a:p>
-          <a:p>
-            <a:r>
-              <a:rPr lang="en-US" sz="1800" b="0" strike="noStrike" spc="-1" dirty="0">
-                <a:solidFill>
-                  <a:srgbClr val="000000"/>
-                </a:solidFill>
-                <a:uFill>
-                  <a:solidFill>
-                    <a:srgbClr val="FFFFFF"/>
-                  </a:solidFill>
-                </a:uFill>
-                <a:latin typeface="Arial"/>
-              </a:rPr>
-              <a:t>	</a:t>
-            </a:r>
-          </a:p>
-          <a:p>
-            <a:r>
-              <a:rPr lang="en-US" sz="1800" b="0" strike="noStrike" spc="-1" dirty="0">
-                <a:solidFill>
-                  <a:srgbClr val="000000"/>
-                </a:solidFill>
-                <a:uFill>
-                  <a:solidFill>
-                    <a:srgbClr val="FFFFFF"/>
-                  </a:solidFill>
-                </a:uFill>
-                <a:latin typeface="Arial"/>
-              </a:rPr>
-              <a:t> </a:t>
-            </a:r>
-          </a:p>
-          <a:p>
-            <a:endParaRPr lang="en-US" sz="1800" b="0" strike="noStrike" spc="-1" dirty="0">
-              <a:solidFill>
-                <a:srgbClr val="000000"/>
-              </a:solidFill>
-              <a:uFill>
-                <a:solidFill>
-                  <a:srgbClr val="FFFFFF"/>
-                </a:solidFill>
-              </a:uFill>
-              <a:latin typeface="Arial"/>
-            </a:endParaRPr>
-          </a:p>
-          <a:p>
-            <a:endParaRPr lang="en-US" sz="1800" b="0" strike="noStrike" spc="-1" dirty="0">
-              <a:solidFill>
-                <a:srgbClr val="000000"/>
-              </a:solidFill>
-              <a:uFill>
-                <a:solidFill>
-                  <a:srgbClr val="FFFFFF"/>
-                </a:solidFill>
-              </a:uFill>
-              <a:latin typeface="Arial"/>
-            </a:endParaRPr>
-          </a:p>
         </p:txBody>
       </p:sp>
     </p:spTree>
+    <p:extLst>
+      <p:ext uri="{BB962C8B-B14F-4D97-AF65-F5344CB8AC3E}">
+        <p14:creationId xmlns:p14="http://schemas.microsoft.com/office/powerpoint/2010/main" val="1922166277"/>
+      </p:ext>
+    </p:extLst>
   </p:cSld>
   <p:clrMapOvr>
     <a:masterClrMapping/>
@@ -18176,7 +19372,7 @@
 </p:sld>
 </file>
 
-<file path=ppt/slides/slide4.xml><?xml version="1.0" encoding="utf-8"?>
+<file path=ppt/slides/slide5.xml><?xml version="1.0" encoding="utf-8"?>
 <p:sld xmlns:a="http://schemas.openxmlformats.org/drawingml/2006/main" xmlns:r="http://schemas.openxmlformats.org/officeDocument/2006/relationships" xmlns:p="http://schemas.openxmlformats.org/presentationml/2006/main">
   <p:cSld>
     <p:spTree>
@@ -18344,7 +19540,7 @@
 </p:sld>
 </file>
 
-<file path=ppt/slides/slide5.xml><?xml version="1.0" encoding="utf-8"?>
+<file path=ppt/slides/slide6.xml><?xml version="1.0" encoding="utf-8"?>
 <p:sld xmlns:a="http://schemas.openxmlformats.org/drawingml/2006/main" xmlns:r="http://schemas.openxmlformats.org/officeDocument/2006/relationships" xmlns:p="http://schemas.openxmlformats.org/presentationml/2006/main">
   <p:cSld>
     <p:spTree>
@@ -18828,7 +20024,7 @@
 </p:sld>
 </file>
 
-<file path=ppt/slides/slide6.xml><?xml version="1.0" encoding="utf-8"?>
+<file path=ppt/slides/slide7.xml><?xml version="1.0" encoding="utf-8"?>
 <p:sld xmlns:a="http://schemas.openxmlformats.org/drawingml/2006/main" xmlns:r="http://schemas.openxmlformats.org/officeDocument/2006/relationships" xmlns:p="http://schemas.openxmlformats.org/presentationml/2006/main">
   <p:cSld>
     <p:spTree>
@@ -18994,7 +20190,7 @@
 </p:sld>
 </file>
 
-<file path=ppt/slides/slide7.xml><?xml version="1.0" encoding="utf-8"?>
+<file path=ppt/slides/slide8.xml><?xml version="1.0" encoding="utf-8"?>
 <p:sld xmlns:a="http://schemas.openxmlformats.org/drawingml/2006/main" xmlns:r="http://schemas.openxmlformats.org/officeDocument/2006/relationships" xmlns:p="http://schemas.openxmlformats.org/presentationml/2006/main">
   <p:cSld>
     <p:spTree>
@@ -19160,7 +20356,7 @@
 </p:sld>
 </file>
 
-<file path=ppt/slides/slide8.xml><?xml version="1.0" encoding="utf-8"?>
+<file path=ppt/slides/slide9.xml><?xml version="1.0" encoding="utf-8"?>
 <p:sld xmlns:a="http://schemas.openxmlformats.org/drawingml/2006/main" xmlns:r="http://schemas.openxmlformats.org/officeDocument/2006/relationships" xmlns:p="http://schemas.openxmlformats.org/presentationml/2006/main">
   <p:cSld>
     <p:spTree>
@@ -19314,199 +20510,6 @@
         </p:spPr>
       </p:pic>
     </p:spTree>
-  </p:cSld>
-  <p:clrMapOvr>
-    <a:masterClrMapping/>
-  </p:clrMapOvr>
-  <p:timing>
-    <p:tnLst>
-      <p:par>
-        <p:cTn id="1" dur="indefinite" restart="never" nodeType="tmRoot">
-          <p:childTnLst>
-            <p:seq>
-              <p:cTn id="2" nodeType="mainSeq"/>
-              <p:prevCondLst>
-                <p:cond evt="onPrev" delay="0">
-                  <p:tgtEl>
-                    <p:sldTgt/>
-                  </p:tgtEl>
-                </p:cond>
-              </p:prevCondLst>
-              <p:nextCondLst>
-                <p:cond evt="onNext" delay="0">
-                  <p:tgtEl>
-                    <p:sldTgt/>
-                  </p:tgtEl>
-                </p:cond>
-              </p:nextCondLst>
-            </p:seq>
-          </p:childTnLst>
-        </p:cTn>
-      </p:par>
-    </p:tnLst>
-  </p:timing>
-</p:sld>
-</file>
-
-<file path=ppt/slides/slide9.xml><?xml version="1.0" encoding="utf-8"?>
-<p:sld xmlns:a="http://schemas.openxmlformats.org/drawingml/2006/main" xmlns:r="http://schemas.openxmlformats.org/officeDocument/2006/relationships" xmlns:p="http://schemas.openxmlformats.org/presentationml/2006/main">
-  <p:cSld>
-    <p:spTree>
-      <p:nvGrpSpPr>
-        <p:cNvPr id="1" name=""/>
-        <p:cNvGrpSpPr/>
-        <p:nvPr/>
-      </p:nvGrpSpPr>
-      <p:grpSpPr>
-        <a:xfrm>
-          <a:off x="0" y="0"/>
-          <a:ext cx="0" cy="0"/>
-          <a:chOff x="0" y="0"/>
-          <a:chExt cx="0" cy="0"/>
-        </a:xfrm>
-      </p:grpSpPr>
-      <p:sp>
-        <p:nvSpPr>
-          <p:cNvPr id="135" name="CustomShape 1"/>
-          <p:cNvSpPr/>
-          <p:nvPr/>
-        </p:nvSpPr>
-        <p:spPr>
-          <a:xfrm>
-            <a:off x="677160" y="609480"/>
-            <a:ext cx="8596080" cy="1320120"/>
-          </a:xfrm>
-          <a:prstGeom prst="rect">
-            <a:avLst/>
-          </a:prstGeom>
-          <a:noFill/>
-          <a:ln>
-            <a:noFill/>
-          </a:ln>
-        </p:spPr>
-        <p:style>
-          <a:lnRef idx="0">
-            <a:scrgbClr r="0" g="0" b="0"/>
-          </a:lnRef>
-          <a:fillRef idx="0">
-            <a:scrgbClr r="0" g="0" b="0"/>
-          </a:fillRef>
-          <a:effectRef idx="0">
-            <a:scrgbClr r="0" g="0" b="0"/>
-          </a:effectRef>
-          <a:fontRef idx="minor"/>
-        </p:style>
-        <p:txBody>
-          <a:bodyPr lIns="90000" tIns="45000" rIns="90000" bIns="45000"/>
-          <a:lstStyle/>
-          <a:p>
-            <a:pPr>
-              <a:lnSpc>
-                <a:spcPct val="100000"/>
-              </a:lnSpc>
-            </a:pPr>
-            <a:r>
-              <a:rPr lang="en-US" sz="3600" b="0" strike="noStrike" spc="-1">
-                <a:solidFill>
-                  <a:srgbClr val="90C226"/>
-                </a:solidFill>
-                <a:uFill>
-                  <a:solidFill>
-                    <a:srgbClr val="FFFFFF"/>
-                  </a:solidFill>
-                </a:uFill>
-                <a:latin typeface="Trebuchet MS"/>
-              </a:rPr>
-              <a:t>System Architecture</a:t>
-            </a:r>
-            <a:endParaRPr lang="en-US" sz="3600" b="0" strike="noStrike" spc="-1">
-              <a:solidFill>
-                <a:srgbClr val="000000"/>
-              </a:solidFill>
-              <a:uFill>
-                <a:solidFill>
-                  <a:srgbClr val="FFFFFF"/>
-                </a:solidFill>
-              </a:uFill>
-              <a:latin typeface="Arial"/>
-            </a:endParaRPr>
-          </a:p>
-        </p:txBody>
-      </p:sp>
-      <p:sp>
-        <p:nvSpPr>
-          <p:cNvPr id="136" name="CustomShape 2"/>
-          <p:cNvSpPr/>
-          <p:nvPr/>
-        </p:nvSpPr>
-        <p:spPr>
-          <a:xfrm>
-            <a:off x="677160" y="2160720"/>
-            <a:ext cx="8596080" cy="3880080"/>
-          </a:xfrm>
-          <a:prstGeom prst="rect">
-            <a:avLst/>
-          </a:prstGeom>
-          <a:noFill/>
-          <a:ln>
-            <a:noFill/>
-          </a:ln>
-        </p:spPr>
-        <p:style>
-          <a:lnRef idx="0">
-            <a:scrgbClr r="0" g="0" b="0"/>
-          </a:lnRef>
-          <a:fillRef idx="0">
-            <a:scrgbClr r="0" g="0" b="0"/>
-          </a:fillRef>
-          <a:effectRef idx="0">
-            <a:scrgbClr r="0" g="0" b="0"/>
-          </a:effectRef>
-          <a:fontRef idx="minor"/>
-        </p:style>
-      </p:sp>
-      <p:pic>
-        <p:nvPicPr>
-          <p:cNvPr id="3" name="Picture 2">
-            <a:extLst>
-              <a:ext uri="{FF2B5EF4-FFF2-40B4-BE49-F238E27FC236}">
-                <a16:creationId xmlns:a16="http://schemas.microsoft.com/office/drawing/2014/main" id="{E723A669-9447-498A-933D-1CC50385868E}"/>
-              </a:ext>
-            </a:extLst>
-          </p:cNvPr>
-          <p:cNvPicPr>
-            <a:picLocks noChangeAspect="1"/>
-          </p:cNvPicPr>
-          <p:nvPr/>
-        </p:nvPicPr>
-        <p:blipFill>
-          <a:blip r:embed="rId2">
-            <a:extLst>
-              <a:ext uri="{28A0092B-C50C-407E-A947-70E740481C1C}">
-                <a14:useLocalDpi xmlns:a14="http://schemas.microsoft.com/office/drawing/2010/main" val="0"/>
-              </a:ext>
-            </a:extLst>
-          </a:blip>
-          <a:stretch>
-            <a:fillRect/>
-          </a:stretch>
-        </p:blipFill>
-        <p:spPr>
-          <a:xfrm>
-            <a:off x="1074137" y="1337090"/>
-            <a:ext cx="7400997" cy="5130103"/>
-          </a:xfrm>
-          <a:prstGeom prst="rect">
-            <a:avLst/>
-          </a:prstGeom>
-        </p:spPr>
-      </p:pic>
-    </p:spTree>
-    <p:extLst>
-      <p:ext uri="{BB962C8B-B14F-4D97-AF65-F5344CB8AC3E}">
-        <p14:creationId xmlns:p14="http://schemas.microsoft.com/office/powerpoint/2010/main" val="2420000067"/>
-      </p:ext>
-    </p:extLst>
   </p:cSld>
   <p:clrMapOvr>
     <a:masterClrMapping/>

</xml_diff>